<commit_message>
results inclusion in ppt
</commit_message>
<xml_diff>
--- a/Social benefits of slow food.pptx
+++ b/Social benefits of slow food.pptx
@@ -3600,7 +3600,7 @@
         <p:spPr bwMode="auto">
           <a:xfrm>
             <a:off x="5076056" y="2274047"/>
-            <a:ext cx="3456384" cy="978513"/>
+            <a:ext cx="3528392" cy="978513"/>
           </a:xfrm>
           <a:prstGeom prst="rect">
             <a:avLst/>
@@ -4338,6 +4338,90 @@
       </p:sp>
       <p:sp>
         <p:nvSpPr>
+          <p:cNvPr id="19" name="ZoneTexte 18"/>
+          <p:cNvSpPr txBox="1"/>
+          <p:nvPr/>
+        </p:nvSpPr>
+        <p:spPr>
+          <a:xfrm>
+            <a:off x="4716016" y="4077072"/>
+            <a:ext cx="734496" cy="369332"/>
+          </a:xfrm>
+          <a:prstGeom prst="rect">
+            <a:avLst/>
+          </a:prstGeom>
+          <a:solidFill>
+            <a:schemeClr val="bg1"/>
+          </a:solidFill>
+        </p:spPr>
+        <p:txBody>
+          <a:bodyPr wrap="none" rtlCol="0">
+            <a:spAutoFit/>
+          </a:bodyPr>
+          <a:lstStyle/>
+          <a:p>
+            <a:r>
+              <a:rPr lang="fr-FR" dirty="0" smtClean="0"/>
+              <a:t>= </a:t>
+            </a:r>
+            <a:r>
+              <a:rPr lang="fr-FR" dirty="0" smtClean="0"/>
+              <a:t>0     </a:t>
+            </a:r>
+            <a:endParaRPr lang="fr-FR" dirty="0"/>
+          </a:p>
+        </p:txBody>
+      </p:sp>
+      <p:sp>
+        <p:nvSpPr>
+          <p:cNvPr id="4" name="Ellipse 3"/>
+          <p:cNvSpPr/>
+          <p:nvPr/>
+        </p:nvSpPr>
+        <p:spPr>
+          <a:xfrm>
+            <a:off x="7012715" y="2708920"/>
+            <a:ext cx="511613" cy="216024"/>
+          </a:xfrm>
+          <a:prstGeom prst="ellipse">
+            <a:avLst/>
+          </a:prstGeom>
+          <a:solidFill>
+            <a:schemeClr val="bg1"/>
+          </a:solidFill>
+          <a:ln>
+            <a:solidFill>
+              <a:schemeClr val="bg1"/>
+            </a:solidFill>
+          </a:ln>
+        </p:spPr>
+        <p:style>
+          <a:lnRef idx="2">
+            <a:schemeClr val="accent1">
+              <a:shade val="50000"/>
+            </a:schemeClr>
+          </a:lnRef>
+          <a:fillRef idx="1">
+            <a:schemeClr val="accent1"/>
+          </a:fillRef>
+          <a:effectRef idx="0">
+            <a:schemeClr val="accent1"/>
+          </a:effectRef>
+          <a:fontRef idx="minor">
+            <a:schemeClr val="lt1"/>
+          </a:fontRef>
+        </p:style>
+        <p:txBody>
+          <a:bodyPr rtlCol="0" anchor="ctr"/>
+          <a:lstStyle/>
+          <a:p>
+            <a:pPr algn="ctr"/>
+            <a:endParaRPr lang="fr-FR"/>
+          </a:p>
+        </p:txBody>
+      </p:sp>
+      <p:sp>
+        <p:nvSpPr>
           <p:cNvPr id="20" name="ZoneTexte 19"/>
           <p:cNvSpPr txBox="1"/>
           <p:nvPr/>
@@ -4390,15 +4474,13 @@
         </p:nvSpPr>
         <p:spPr>
           <a:xfrm>
-            <a:off x="6897063" y="2611113"/>
+            <a:off x="6993286" y="2627620"/>
             <a:ext cx="603050" cy="369332"/>
           </a:xfrm>
           <a:prstGeom prst="rect">
             <a:avLst/>
           </a:prstGeom>
-          <a:solidFill>
-            <a:schemeClr val="bg1"/>
-          </a:solidFill>
+          <a:noFill/>
         </p:spPr>
         <p:txBody>
           <a:bodyPr wrap="none" rtlCol="0">
@@ -4459,70 +4541,149 @@
           <a:chExt cx="0" cy="0"/>
         </a:xfrm>
       </p:grpSpPr>
-      <p:pic>
-        <p:nvPicPr>
-          <p:cNvPr id="2050" name="Picture 2"/>
-          <p:cNvPicPr>
-            <a:picLocks noChangeAspect="1" noChangeArrowheads="1"/>
-          </p:cNvPicPr>
+      <p:grpSp>
+        <p:nvGrpSpPr>
+          <p:cNvPr id="16" name="Groupe 15"/>
+          <p:cNvGrpSpPr/>
           <p:nvPr/>
-        </p:nvPicPr>
-        <p:blipFill>
-          <a:blip r:embed="rId2">
-            <a:extLst>
-              <a:ext uri="{28A0092B-C50C-407E-A947-70E740481C1C}">
-                <a14:useLocalDpi xmlns:a14="http://schemas.microsoft.com/office/drawing/2010/main" val="0"/>
-              </a:ext>
-            </a:extLst>
-          </a:blip>
-          <a:srcRect/>
-          <a:stretch>
-            <a:fillRect/>
-          </a:stretch>
-        </p:blipFill>
-        <p:spPr bwMode="auto">
+        </p:nvGrpSpPr>
+        <p:grpSpPr>
           <a:xfrm>
             <a:off x="7369242" y="548680"/>
             <a:ext cx="1661769" cy="1371297"/>
+            <a:chOff x="7369242" y="548680"/>
+            <a:chExt cx="1661769" cy="1371297"/>
           </a:xfrm>
-          <a:prstGeom prst="rect">
-            <a:avLst/>
-          </a:prstGeom>
-          <a:noFill/>
-          <a:ln>
+        </p:grpSpPr>
+        <p:pic>
+          <p:nvPicPr>
+            <p:cNvPr id="2050" name="Picture 2"/>
+            <p:cNvPicPr>
+              <a:picLocks noChangeAspect="1" noChangeArrowheads="1"/>
+            </p:cNvPicPr>
+            <p:nvPr/>
+          </p:nvPicPr>
+          <p:blipFill>
+            <a:blip r:embed="rId2">
+              <a:extLst>
+                <a:ext uri="{28A0092B-C50C-407E-A947-70E740481C1C}">
+                  <a14:useLocalDpi xmlns:a14="http://schemas.microsoft.com/office/drawing/2010/main" val="0"/>
+                </a:ext>
+              </a:extLst>
+            </a:blip>
+            <a:srcRect/>
+            <a:stretch>
+              <a:fillRect/>
+            </a:stretch>
+          </p:blipFill>
+          <p:spPr bwMode="auto">
+            <a:xfrm>
+              <a:off x="7369242" y="548680"/>
+              <a:ext cx="1661769" cy="1371297"/>
+            </a:xfrm>
+            <a:prstGeom prst="rect">
+              <a:avLst/>
+            </a:prstGeom>
             <a:noFill/>
-          </a:ln>
-          <a:effectLst/>
-          <a:extLst>
-            <a:ext uri="{909E8E84-426E-40DD-AFC4-6F175D3DCCD1}">
-              <a14:hiddenFill xmlns:a14="http://schemas.microsoft.com/office/drawing/2010/main">
-                <a:solidFill>
-                  <a:schemeClr val="accent1"/>
-                </a:solidFill>
-              </a14:hiddenFill>
-            </a:ext>
-            <a:ext uri="{91240B29-F687-4F45-9708-019B960494DF}">
-              <a14:hiddenLine xmlns:a14="http://schemas.microsoft.com/office/drawing/2010/main" w="9525">
-                <a:solidFill>
-                  <a:schemeClr val="tx1"/>
-                </a:solidFill>
-                <a:miter lim="800000"/>
-                <a:headEnd/>
-                <a:tailEnd/>
-              </a14:hiddenLine>
-            </a:ext>
-            <a:ext uri="{AF507438-7753-43E0-B8FC-AC1667EBCBE1}">
-              <a14:hiddenEffects xmlns:a14="http://schemas.microsoft.com/office/drawing/2010/main">
-                <a:effectLst>
-                  <a:outerShdw dist="35921" dir="2700000" algn="ctr" rotWithShape="0">
-                    <a:schemeClr val="bg2"/>
-                  </a:outerShdw>
-                </a:effectLst>
-              </a14:hiddenEffects>
-            </a:ext>
-          </a:extLst>
-        </p:spPr>
-      </p:pic>
+            <a:ln>
+              <a:noFill/>
+            </a:ln>
+            <a:effectLst/>
+            <a:extLst>
+              <a:ext uri="{909E8E84-426E-40DD-AFC4-6F175D3DCCD1}">
+                <a14:hiddenFill xmlns:a14="http://schemas.microsoft.com/office/drawing/2010/main">
+                  <a:solidFill>
+                    <a:schemeClr val="accent1"/>
+                  </a:solidFill>
+                </a14:hiddenFill>
+              </a:ext>
+              <a:ext uri="{91240B29-F687-4F45-9708-019B960494DF}">
+                <a14:hiddenLine xmlns:a14="http://schemas.microsoft.com/office/drawing/2010/main" w="9525">
+                  <a:solidFill>
+                    <a:schemeClr val="tx1"/>
+                  </a:solidFill>
+                  <a:miter lim="800000"/>
+                  <a:headEnd/>
+                  <a:tailEnd/>
+                </a14:hiddenLine>
+              </a:ext>
+              <a:ext uri="{AF507438-7753-43E0-B8FC-AC1667EBCBE1}">
+                <a14:hiddenEffects xmlns:a14="http://schemas.microsoft.com/office/drawing/2010/main">
+                  <a:effectLst>
+                    <a:outerShdw dist="35921" dir="2700000" algn="ctr" rotWithShape="0">
+                      <a:schemeClr val="bg2"/>
+                    </a:outerShdw>
+                  </a:effectLst>
+                </a14:hiddenEffects>
+              </a:ext>
+            </a:extLst>
+          </p:spPr>
+        </p:pic>
+        <p:pic>
+          <p:nvPicPr>
+            <p:cNvPr id="2051" name="Picture 3"/>
+            <p:cNvPicPr>
+              <a:picLocks noChangeAspect="1" noChangeArrowheads="1"/>
+            </p:cNvPicPr>
+            <p:nvPr/>
+          </p:nvPicPr>
+          <p:blipFill>
+            <a:blip r:embed="rId3">
+              <a:extLst>
+                <a:ext uri="{28A0092B-C50C-407E-A947-70E740481C1C}">
+                  <a14:useLocalDpi xmlns:a14="http://schemas.microsoft.com/office/drawing/2010/main" val="0"/>
+                </a:ext>
+              </a:extLst>
+            </a:blip>
+            <a:srcRect/>
+            <a:stretch>
+              <a:fillRect/>
+            </a:stretch>
+          </p:blipFill>
+          <p:spPr bwMode="auto">
+            <a:xfrm>
+              <a:off x="8546295" y="601451"/>
+              <a:ext cx="391052" cy="195526"/>
+            </a:xfrm>
+            <a:prstGeom prst="rect">
+              <a:avLst/>
+            </a:prstGeom>
+            <a:noFill/>
+            <a:ln>
+              <a:noFill/>
+            </a:ln>
+            <a:effectLst/>
+            <a:extLst>
+              <a:ext uri="{909E8E84-426E-40DD-AFC4-6F175D3DCCD1}">
+                <a14:hiddenFill xmlns:a14="http://schemas.microsoft.com/office/drawing/2010/main">
+                  <a:solidFill>
+                    <a:schemeClr val="accent1"/>
+                  </a:solidFill>
+                </a14:hiddenFill>
+              </a:ext>
+              <a:ext uri="{91240B29-F687-4F45-9708-019B960494DF}">
+                <a14:hiddenLine xmlns:a14="http://schemas.microsoft.com/office/drawing/2010/main" w="9525">
+                  <a:solidFill>
+                    <a:schemeClr val="tx1"/>
+                  </a:solidFill>
+                  <a:miter lim="800000"/>
+                  <a:headEnd/>
+                  <a:tailEnd/>
+                </a14:hiddenLine>
+              </a:ext>
+              <a:ext uri="{AF507438-7753-43E0-B8FC-AC1667EBCBE1}">
+                <a14:hiddenEffects xmlns:a14="http://schemas.microsoft.com/office/drawing/2010/main">
+                  <a:effectLst>
+                    <a:outerShdw dist="35921" dir="2700000" algn="ctr" rotWithShape="0">
+                      <a:schemeClr val="bg2"/>
+                    </a:outerShdw>
+                  </a:effectLst>
+                </a14:hiddenEffects>
+              </a:ext>
+            </a:extLst>
+          </p:spPr>
+        </p:pic>
+      </p:grpSp>
       <p:sp>
         <p:nvSpPr>
           <p:cNvPr id="5" name="Rectangle 4"/>
@@ -4849,12 +5010,16 @@
               <a:t>      </a:t>
             </a:r>
             <a:r>
-              <a:rPr lang="fr-FR" dirty="0" err="1" smtClean="0"/>
+              <a:rPr lang="fr-FR" i="1" dirty="0" err="1" smtClean="0"/>
               <a:t>humanInformedRatio</a:t>
             </a:r>
             <a:r>
+              <a:rPr lang="fr-FR" i="1" dirty="0" smtClean="0"/>
+              <a:t>=0.0</a:t>
+            </a:r>
+            <a:r>
               <a:rPr lang="fr-FR" dirty="0" smtClean="0"/>
-              <a:t>=0.0)</a:t>
+              <a:t>)</a:t>
             </a:r>
           </a:p>
           <a:p>
@@ -5299,7 +5464,7 @@
         </p:nvSpPr>
         <p:spPr>
           <a:xfrm>
-            <a:off x="5984883" y="3340735"/>
+            <a:off x="5941671" y="3710067"/>
             <a:ext cx="2855141" cy="369332"/>
           </a:xfrm>
           <a:prstGeom prst="rect">
@@ -5353,70 +5518,139 @@
           </a:p>
         </p:txBody>
       </p:sp>
-      <p:pic>
-        <p:nvPicPr>
-          <p:cNvPr id="2051" name="Picture 3"/>
-          <p:cNvPicPr>
-            <a:picLocks noChangeAspect="1" noChangeArrowheads="1"/>
-          </p:cNvPicPr>
+      <p:grpSp>
+        <p:nvGrpSpPr>
+          <p:cNvPr id="15" name="Groupe 14"/>
+          <p:cNvGrpSpPr/>
           <p:nvPr/>
-        </p:nvPicPr>
-        <p:blipFill>
-          <a:blip r:embed="rId3">
-            <a:extLst>
-              <a:ext uri="{28A0092B-C50C-407E-A947-70E740481C1C}">
-                <a14:useLocalDpi xmlns:a14="http://schemas.microsoft.com/office/drawing/2010/main" val="0"/>
-              </a:ext>
-            </a:extLst>
-          </a:blip>
-          <a:srcRect/>
-          <a:stretch>
-            <a:fillRect/>
-          </a:stretch>
-        </p:blipFill>
-        <p:spPr bwMode="auto">
+        </p:nvGrpSpPr>
+        <p:grpSpPr>
           <a:xfrm>
-            <a:off x="8546295" y="601451"/>
-            <a:ext cx="391052" cy="195526"/>
+            <a:off x="2267745" y="2420889"/>
+            <a:ext cx="6718352" cy="2016223"/>
+            <a:chOff x="2267745" y="2420889"/>
+            <a:chExt cx="6718352" cy="2016223"/>
           </a:xfrm>
-          <a:prstGeom prst="rect">
-            <a:avLst/>
-          </a:prstGeom>
-          <a:noFill/>
-          <a:ln>
+        </p:grpSpPr>
+        <p:sp>
+          <p:nvSpPr>
+            <p:cNvPr id="11" name="ZoneTexte 10"/>
+            <p:cNvSpPr txBox="1"/>
+            <p:nvPr/>
+          </p:nvSpPr>
+          <p:spPr>
+            <a:xfrm>
+              <a:off x="6017271" y="3174505"/>
+              <a:ext cx="2968826" cy="369332"/>
+            </a:xfrm>
+            <a:prstGeom prst="rect">
+              <a:avLst/>
+            </a:prstGeom>
             <a:noFill/>
-          </a:ln>
-          <a:effectLst/>
-          <a:extLst>
-            <a:ext uri="{909E8E84-426E-40DD-AFC4-6F175D3DCCD1}">
-              <a14:hiddenFill xmlns:a14="http://schemas.microsoft.com/office/drawing/2010/main">
-                <a:solidFill>
-                  <a:schemeClr val="accent1"/>
-                </a:solidFill>
-              </a14:hiddenFill>
-            </a:ext>
-            <a:ext uri="{91240B29-F687-4F45-9708-019B960494DF}">
-              <a14:hiddenLine xmlns:a14="http://schemas.microsoft.com/office/drawing/2010/main" w="9525">
-                <a:solidFill>
-                  <a:schemeClr val="tx1"/>
-                </a:solidFill>
-                <a:miter lim="800000"/>
-                <a:headEnd/>
-                <a:tailEnd/>
-              </a14:hiddenLine>
-            </a:ext>
-            <a:ext uri="{AF507438-7753-43E0-B8FC-AC1667EBCBE1}">
-              <a14:hiddenEffects xmlns:a14="http://schemas.microsoft.com/office/drawing/2010/main">
-                <a:effectLst>
-                  <a:outerShdw dist="35921" dir="2700000" algn="ctr" rotWithShape="0">
-                    <a:schemeClr val="bg2"/>
-                  </a:outerShdw>
-                </a:effectLst>
-              </a14:hiddenEffects>
-            </a:ext>
-          </a:extLst>
-        </p:spPr>
-      </p:pic>
+          </p:spPr>
+          <p:txBody>
+            <a:bodyPr wrap="none" rtlCol="0">
+              <a:spAutoFit/>
+            </a:bodyPr>
+            <a:lstStyle/>
+            <a:p>
+              <a:r>
+                <a:rPr lang="fr-FR" i="1" dirty="0" err="1" smtClean="0"/>
+                <a:t>Modified</a:t>
+              </a:r>
+              <a:r>
+                <a:rPr lang="fr-FR" i="1" dirty="0" smtClean="0"/>
+                <a:t> the </a:t>
+              </a:r>
+              <a:r>
+                <a:rPr lang="fr-FR" i="1" dirty="0" err="1" smtClean="0"/>
+                <a:t>informed</a:t>
+              </a:r>
+              <a:r>
+                <a:rPr lang="fr-FR" i="1" dirty="0" smtClean="0"/>
+                <a:t> agents</a:t>
+              </a:r>
+              <a:endParaRPr lang="fr-FR" i="1" dirty="0"/>
+            </a:p>
+          </p:txBody>
+        </p:sp>
+        <p:cxnSp>
+          <p:nvCxnSpPr>
+            <p:cNvPr id="7" name="Connecteur droit avec flèche 6"/>
+            <p:cNvCxnSpPr>
+              <a:stCxn id="11" idx="1"/>
+            </p:cNvCxnSpPr>
+            <p:nvPr/>
+          </p:nvCxnSpPr>
+          <p:spPr>
+            <a:xfrm flipH="1" flipV="1">
+              <a:off x="2267745" y="2420889"/>
+              <a:ext cx="3749526" cy="938282"/>
+            </a:xfrm>
+            <a:prstGeom prst="straightConnector1">
+              <a:avLst/>
+            </a:prstGeom>
+            <a:ln>
+              <a:solidFill>
+                <a:schemeClr val="tx1"/>
+              </a:solidFill>
+              <a:tailEnd type="arrow"/>
+            </a:ln>
+          </p:spPr>
+          <p:style>
+            <a:lnRef idx="1">
+              <a:schemeClr val="accent1"/>
+            </a:lnRef>
+            <a:fillRef idx="0">
+              <a:schemeClr val="accent1"/>
+            </a:fillRef>
+            <a:effectRef idx="0">
+              <a:schemeClr val="accent1"/>
+            </a:effectRef>
+            <a:fontRef idx="minor">
+              <a:schemeClr val="tx1"/>
+            </a:fontRef>
+          </p:style>
+        </p:cxnSp>
+        <p:cxnSp>
+          <p:nvCxnSpPr>
+            <p:cNvPr id="14" name="Connecteur droit avec flèche 13"/>
+            <p:cNvCxnSpPr>
+              <a:stCxn id="11" idx="1"/>
+            </p:cNvCxnSpPr>
+            <p:nvPr/>
+          </p:nvCxnSpPr>
+          <p:spPr>
+            <a:xfrm flipH="1">
+              <a:off x="3275857" y="3359171"/>
+              <a:ext cx="2741414" cy="1077941"/>
+            </a:xfrm>
+            <a:prstGeom prst="straightConnector1">
+              <a:avLst/>
+            </a:prstGeom>
+            <a:ln>
+              <a:solidFill>
+                <a:schemeClr val="tx1"/>
+              </a:solidFill>
+              <a:tailEnd type="arrow"/>
+            </a:ln>
+          </p:spPr>
+          <p:style>
+            <a:lnRef idx="1">
+              <a:schemeClr val="accent1"/>
+            </a:lnRef>
+            <a:fillRef idx="0">
+              <a:schemeClr val="accent1"/>
+            </a:fillRef>
+            <a:effectRef idx="0">
+              <a:schemeClr val="accent1"/>
+            </a:effectRef>
+            <a:fontRef idx="minor">
+              <a:schemeClr val="tx1"/>
+            </a:fontRef>
+          </p:style>
+        </p:cxnSp>
+      </p:grpSp>
     </p:spTree>
     <p:extLst>
       <p:ext uri="{BB962C8B-B14F-4D97-AF65-F5344CB8AC3E}">
@@ -5531,7 +5765,7 @@
                                           </p:stCondLst>
                                         </p:cTn>
                                         <p:tgtEl>
-                                          <p:spTgt spid="2050"/>
+                                          <p:spTgt spid="16"/>
                                         </p:tgtEl>
                                         <p:attrNameLst>
                                           <p:attrName>style.visibility</p:attrName>
@@ -5545,7 +5779,7 @@
                                       <p:cBhvr>
                                         <p:cTn id="13" dur="500"/>
                                         <p:tgtEl>
-                                          <p:spTgt spid="2050"/>
+                                          <p:spTgt spid="16"/>
                                         </p:tgtEl>
                                       </p:cBhvr>
                                     </p:animEffect>
@@ -5659,7 +5893,7 @@
                             </p:stCondLst>
                             <p:childTnLst>
                               <p:par>
-                                <p:cTn id="24" presetID="10" presetClass="entr" presetSubtype="0" fill="hold" grpId="0" nodeType="clickEffect">
+                                <p:cTn id="24" presetID="10" presetClass="entr" presetSubtype="0" fill="hold" nodeType="clickEffect">
                                   <p:stCondLst>
                                     <p:cond delay="0"/>
                                   </p:stCondLst>
@@ -5667,6 +5901,59 @@
                                     <p:set>
                                       <p:cBhvr>
                                         <p:cTn id="25" dur="1" fill="hold">
+                                          <p:stCondLst>
+                                            <p:cond delay="0"/>
+                                          </p:stCondLst>
+                                        </p:cTn>
+                                        <p:tgtEl>
+                                          <p:spTgt spid="15"/>
+                                        </p:tgtEl>
+                                        <p:attrNameLst>
+                                          <p:attrName>style.visibility</p:attrName>
+                                        </p:attrNameLst>
+                                      </p:cBhvr>
+                                      <p:to>
+                                        <p:strVal val="visible"/>
+                                      </p:to>
+                                    </p:set>
+                                    <p:animEffect transition="in" filter="fade">
+                                      <p:cBhvr>
+                                        <p:cTn id="26" dur="500"/>
+                                        <p:tgtEl>
+                                          <p:spTgt spid="15"/>
+                                        </p:tgtEl>
+                                      </p:cBhvr>
+                                    </p:animEffect>
+                                  </p:childTnLst>
+                                </p:cTn>
+                              </p:par>
+                            </p:childTnLst>
+                          </p:cTn>
+                        </p:par>
+                      </p:childTnLst>
+                    </p:cTn>
+                  </p:par>
+                  <p:par>
+                    <p:cTn id="27" fill="hold">
+                      <p:stCondLst>
+                        <p:cond delay="indefinite"/>
+                      </p:stCondLst>
+                      <p:childTnLst>
+                        <p:par>
+                          <p:cTn id="28" fill="hold">
+                            <p:stCondLst>
+                              <p:cond delay="0"/>
+                            </p:stCondLst>
+                            <p:childTnLst>
+                              <p:par>
+                                <p:cTn id="29" presetID="10" presetClass="entr" presetSubtype="0" fill="hold" grpId="0" nodeType="clickEffect">
+                                  <p:stCondLst>
+                                    <p:cond delay="0"/>
+                                  </p:stCondLst>
+                                  <p:childTnLst>
+                                    <p:set>
+                                      <p:cBhvr>
+                                        <p:cTn id="30" dur="1" fill="hold">
                                           <p:stCondLst>
                                             <p:cond delay="0"/>
                                           </p:stCondLst>
@@ -5684,7 +5971,7 @@
                                     </p:set>
                                     <p:animEffect transition="in" filter="fade">
                                       <p:cBhvr>
-                                        <p:cTn id="26" dur="500"/>
+                                        <p:cTn id="31" dur="500"/>
                                         <p:tgtEl>
                                           <p:spTgt spid="10"/>
                                         </p:tgtEl>
@@ -5748,6 +6035,198 @@
           <a:chExt cx="0" cy="0"/>
         </a:xfrm>
       </p:grpSpPr>
+      <p:pic>
+        <p:nvPicPr>
+          <p:cNvPr id="6" name="Picture 5"/>
+          <p:cNvPicPr>
+            <a:picLocks noChangeAspect="1" noChangeArrowheads="1"/>
+          </p:cNvPicPr>
+          <p:nvPr/>
+        </p:nvPicPr>
+        <p:blipFill>
+          <a:blip r:embed="rId2">
+            <a:extLst>
+              <a:ext uri="{28A0092B-C50C-407E-A947-70E740481C1C}">
+                <a14:useLocalDpi xmlns:a14="http://schemas.microsoft.com/office/drawing/2010/main" val="0"/>
+              </a:ext>
+            </a:extLst>
+          </a:blip>
+          <a:srcRect/>
+          <a:stretch>
+            <a:fillRect/>
+          </a:stretch>
+        </p:blipFill>
+        <p:spPr bwMode="auto">
+          <a:xfrm>
+            <a:off x="7979990" y="3193157"/>
+            <a:ext cx="552450" cy="523875"/>
+          </a:xfrm>
+          <a:prstGeom prst="rect">
+            <a:avLst/>
+          </a:prstGeom>
+          <a:noFill/>
+          <a:ln>
+            <a:noFill/>
+          </a:ln>
+          <a:effectLst/>
+          <a:extLst>
+            <a:ext uri="{909E8E84-426E-40DD-AFC4-6F175D3DCCD1}">
+              <a14:hiddenFill xmlns:a14="http://schemas.microsoft.com/office/drawing/2010/main">
+                <a:solidFill>
+                  <a:schemeClr val="accent1"/>
+                </a:solidFill>
+              </a14:hiddenFill>
+            </a:ext>
+            <a:ext uri="{91240B29-F687-4F45-9708-019B960494DF}">
+              <a14:hiddenLine xmlns:a14="http://schemas.microsoft.com/office/drawing/2010/main" w="9525">
+                <a:solidFill>
+                  <a:schemeClr val="tx1"/>
+                </a:solidFill>
+                <a:miter lim="800000"/>
+                <a:headEnd/>
+                <a:tailEnd/>
+              </a14:hiddenLine>
+            </a:ext>
+            <a:ext uri="{AF507438-7753-43E0-B8FC-AC1667EBCBE1}">
+              <a14:hiddenEffects xmlns:a14="http://schemas.microsoft.com/office/drawing/2010/main">
+                <a:effectLst>
+                  <a:outerShdw dist="35921" dir="2700000" algn="ctr" rotWithShape="0">
+                    <a:schemeClr val="bg2"/>
+                  </a:outerShdw>
+                </a:effectLst>
+              </a14:hiddenEffects>
+            </a:ext>
+          </a:extLst>
+        </p:spPr>
+      </p:pic>
+      <p:pic>
+        <p:nvPicPr>
+          <p:cNvPr id="5" name="Picture 5"/>
+          <p:cNvPicPr>
+            <a:picLocks noChangeAspect="1" noChangeArrowheads="1"/>
+          </p:cNvPicPr>
+          <p:nvPr/>
+        </p:nvPicPr>
+        <p:blipFill>
+          <a:blip r:embed="rId2">
+            <a:extLst>
+              <a:ext uri="{28A0092B-C50C-407E-A947-70E740481C1C}">
+                <a14:useLocalDpi xmlns:a14="http://schemas.microsoft.com/office/drawing/2010/main" val="0"/>
+              </a:ext>
+            </a:extLst>
+          </a:blip>
+          <a:srcRect/>
+          <a:stretch>
+            <a:fillRect/>
+          </a:stretch>
+        </p:blipFill>
+        <p:spPr bwMode="auto">
+          <a:xfrm>
+            <a:off x="7979990" y="2708920"/>
+            <a:ext cx="552450" cy="523875"/>
+          </a:xfrm>
+          <a:prstGeom prst="rect">
+            <a:avLst/>
+          </a:prstGeom>
+          <a:noFill/>
+          <a:ln>
+            <a:noFill/>
+          </a:ln>
+          <a:effectLst/>
+          <a:extLst>
+            <a:ext uri="{909E8E84-426E-40DD-AFC4-6F175D3DCCD1}">
+              <a14:hiddenFill xmlns:a14="http://schemas.microsoft.com/office/drawing/2010/main">
+                <a:solidFill>
+                  <a:schemeClr val="accent1"/>
+                </a:solidFill>
+              </a14:hiddenFill>
+            </a:ext>
+            <a:ext uri="{91240B29-F687-4F45-9708-019B960494DF}">
+              <a14:hiddenLine xmlns:a14="http://schemas.microsoft.com/office/drawing/2010/main" w="9525">
+                <a:solidFill>
+                  <a:schemeClr val="tx1"/>
+                </a:solidFill>
+                <a:miter lim="800000"/>
+                <a:headEnd/>
+                <a:tailEnd/>
+              </a14:hiddenLine>
+            </a:ext>
+            <a:ext uri="{AF507438-7753-43E0-B8FC-AC1667EBCBE1}">
+              <a14:hiddenEffects xmlns:a14="http://schemas.microsoft.com/office/drawing/2010/main">
+                <a:effectLst>
+                  <a:outerShdw dist="35921" dir="2700000" algn="ctr" rotWithShape="0">
+                    <a:schemeClr val="bg2"/>
+                  </a:outerShdw>
+                </a:effectLst>
+              </a14:hiddenEffects>
+            </a:ext>
+          </a:extLst>
+        </p:spPr>
+      </p:pic>
+      <p:pic>
+        <p:nvPicPr>
+          <p:cNvPr id="4" name="Picture 5"/>
+          <p:cNvPicPr>
+            <a:picLocks noChangeAspect="1" noChangeArrowheads="1"/>
+          </p:cNvPicPr>
+          <p:nvPr/>
+        </p:nvPicPr>
+        <p:blipFill>
+          <a:blip r:embed="rId2">
+            <a:extLst>
+              <a:ext uri="{28A0092B-C50C-407E-A947-70E740481C1C}">
+                <a14:useLocalDpi xmlns:a14="http://schemas.microsoft.com/office/drawing/2010/main" val="0"/>
+              </a:ext>
+            </a:extLst>
+          </a:blip>
+          <a:srcRect/>
+          <a:stretch>
+            <a:fillRect/>
+          </a:stretch>
+        </p:blipFill>
+        <p:spPr bwMode="auto">
+          <a:xfrm>
+            <a:off x="7979990" y="2204864"/>
+            <a:ext cx="552450" cy="523875"/>
+          </a:xfrm>
+          <a:prstGeom prst="rect">
+            <a:avLst/>
+          </a:prstGeom>
+          <a:noFill/>
+          <a:ln>
+            <a:noFill/>
+          </a:ln>
+          <a:effectLst/>
+          <a:extLst>
+            <a:ext uri="{909E8E84-426E-40DD-AFC4-6F175D3DCCD1}">
+              <a14:hiddenFill xmlns:a14="http://schemas.microsoft.com/office/drawing/2010/main">
+                <a:solidFill>
+                  <a:schemeClr val="accent1"/>
+                </a:solidFill>
+              </a14:hiddenFill>
+            </a:ext>
+            <a:ext uri="{91240B29-F687-4F45-9708-019B960494DF}">
+              <a14:hiddenLine xmlns:a14="http://schemas.microsoft.com/office/drawing/2010/main" w="9525">
+                <a:solidFill>
+                  <a:schemeClr val="tx1"/>
+                </a:solidFill>
+                <a:miter lim="800000"/>
+                <a:headEnd/>
+                <a:tailEnd/>
+              </a14:hiddenLine>
+            </a:ext>
+            <a:ext uri="{AF507438-7753-43E0-B8FC-AC1667EBCBE1}">
+              <a14:hiddenEffects xmlns:a14="http://schemas.microsoft.com/office/drawing/2010/main">
+                <a:effectLst>
+                  <a:outerShdw dist="35921" dir="2700000" algn="ctr" rotWithShape="0">
+                    <a:schemeClr val="bg2"/>
+                  </a:outerShdw>
+                </a:effectLst>
+              </a14:hiddenEffects>
+            </a:ext>
+          </a:extLst>
+        </p:spPr>
+      </p:pic>
       <p:sp>
         <p:nvSpPr>
           <p:cNvPr id="2" name="Titre 1"/>
@@ -5799,8 +6278,44 @@
           <a:p>
             <a:pPr lvl="1"/>
             <a:r>
-              <a:rPr lang="en-US" dirty="0" err="1" smtClean="0"/>
+              <a:rPr lang="en-US" dirty="0" err="1" smtClean="0">
+                <a:solidFill>
+                  <a:srgbClr val="FF0000"/>
+                </a:solidFill>
+              </a:rPr>
               <a:t>nbSlow</a:t>
+            </a:r>
+            <a:r>
+              <a:rPr lang="en-US" dirty="0" smtClean="0">
+                <a:solidFill>
+                  <a:srgbClr val="FF0000"/>
+                </a:solidFill>
+              </a:rPr>
+              <a:t> </a:t>
+            </a:r>
+            <a:r>
+              <a:rPr lang="en-US" dirty="0"/>
+              <a:t>in (0 to 125 by </a:t>
+            </a:r>
+            <a:r>
+              <a:rPr lang="en-US" dirty="0" smtClean="0"/>
+              <a:t>25</a:t>
+            </a:r>
+            <a:r>
+              <a:rPr lang="en-US" dirty="0" smtClean="0"/>
+              <a:t>) 	(Number of         )</a:t>
+            </a:r>
+            <a:endParaRPr lang="en-US" dirty="0" smtClean="0"/>
+          </a:p>
+          <a:p>
+            <a:pPr lvl="1"/>
+            <a:r>
+              <a:rPr lang="en-US" dirty="0" smtClean="0">
+                <a:solidFill>
+                  <a:srgbClr val="FF0000"/>
+                </a:solidFill>
+              </a:rPr>
+              <a:t>hRs1</a:t>
             </a:r>
             <a:r>
               <a:rPr lang="en-US" dirty="0" smtClean="0"/>
@@ -5808,41 +6323,43 @@
             </a:r>
             <a:r>
               <a:rPr lang="en-US" dirty="0"/>
-              <a:t>in (0 to 125 by </a:t>
+              <a:t>in (0.1 to 0.4 by 0.1</a:t>
             </a:r>
             <a:r>
               <a:rPr lang="en-US" dirty="0" smtClean="0"/>
-              <a:t>25)</a:t>
-            </a:r>
+              <a:t>)		(Run speed of     )</a:t>
+            </a:r>
+            <a:endParaRPr lang="en-US" dirty="0" smtClean="0"/>
           </a:p>
           <a:p>
             <a:pPr lvl="1"/>
             <a:r>
+              <a:rPr lang="en-US" dirty="0" smtClean="0">
+                <a:solidFill>
+                  <a:srgbClr val="FF0000"/>
+                </a:solidFill>
+              </a:rPr>
+              <a:t>hIp1</a:t>
+            </a:r>
+            <a:r>
               <a:rPr lang="en-US" dirty="0" smtClean="0"/>
-              <a:t>hRs1 </a:t>
-            </a:r>
-            <a:r>
-              <a:rPr lang="en-US" dirty="0"/>
-              <a:t>in (0.1 to 0.4 by 0.1</a:t>
-            </a:r>
-            <a:r>
-              <a:rPr lang="en-US" dirty="0" smtClean="0"/>
-              <a:t>)</a:t>
-            </a:r>
-          </a:p>
-          <a:p>
-            <a:pPr lvl="1"/>
-            <a:r>
-              <a:rPr lang="en-US" dirty="0" smtClean="0"/>
-              <a:t>hIp1 </a:t>
+              <a:t> </a:t>
             </a:r>
             <a:r>
               <a:rPr lang="en-US" dirty="0"/>
               <a:t>in (0.1 to 1.0 by 0.1</a:t>
             </a:r>
             <a:r>
+              <a:rPr lang="en-US" dirty="0"/>
+              <a:t>) </a:t>
+            </a:r>
+            <a:r>
               <a:rPr lang="en-US" dirty="0" smtClean="0"/>
-              <a:t>)</a:t>
+              <a:t>             (P(inform)   </a:t>
+            </a:r>
+            <a:r>
+              <a:rPr lang="en-US" dirty="0"/>
+              <a:t>of     )</a:t>
             </a:r>
             <a:endParaRPr lang="fr-FR" dirty="0"/>
           </a:p>
@@ -5904,83 +6421,2225 @@
               <a:rPr lang="fr-FR" dirty="0" err="1" smtClean="0"/>
               <a:t>Results</a:t>
             </a:r>
+            <a:r>
+              <a:rPr lang="fr-FR" dirty="0" smtClean="0"/>
+              <a:t> 1</a:t>
+            </a:r>
             <a:endParaRPr lang="fr-FR" dirty="0"/>
           </a:p>
         </p:txBody>
       </p:sp>
-      <p:sp>
-        <p:nvSpPr>
-          <p:cNvPr id="3" name="Espace réservé du contenu 2"/>
-          <p:cNvSpPr>
-            <a:spLocks noGrp="1"/>
-          </p:cNvSpPr>
-          <p:nvPr>
-            <p:ph idx="1"/>
-          </p:nvPr>
-        </p:nvSpPr>
-        <p:spPr/>
-        <p:txBody>
-          <a:bodyPr/>
-          <a:lstStyle/>
-          <a:p>
-            <a:endParaRPr lang="fr-FR"/>
-          </a:p>
-        </p:txBody>
-      </p:sp>
-      <p:pic>
-        <p:nvPicPr>
-          <p:cNvPr id="1026" name="Picture 2"/>
-          <p:cNvPicPr>
-            <a:picLocks noChangeAspect="1" noChangeArrowheads="1"/>
-          </p:cNvPicPr>
+      <p:grpSp>
+        <p:nvGrpSpPr>
+          <p:cNvPr id="46" name="Groupe 45"/>
+          <p:cNvGrpSpPr/>
           <p:nvPr/>
-        </p:nvPicPr>
-        <p:blipFill>
-          <a:blip r:embed="rId2">
-            <a:extLst>
-              <a:ext uri="{28A0092B-C50C-407E-A947-70E740481C1C}">
-                <a14:useLocalDpi xmlns:a14="http://schemas.microsoft.com/office/drawing/2010/main" val="0"/>
-              </a:ext>
-            </a:extLst>
-          </a:blip>
-          <a:srcRect/>
-          <a:stretch>
-            <a:fillRect/>
-          </a:stretch>
-        </p:blipFill>
-        <p:spPr bwMode="auto">
+        </p:nvGrpSpPr>
+        <p:grpSpPr>
           <a:xfrm>
-            <a:off x="899592" y="764704"/>
-            <a:ext cx="1181100" cy="847725"/>
+            <a:off x="6732240" y="332656"/>
+            <a:ext cx="2381113" cy="1718486"/>
+            <a:chOff x="6799399" y="332656"/>
+            <a:chExt cx="2381113" cy="1718486"/>
           </a:xfrm>
-          <a:prstGeom prst="rect">
-            <a:avLst/>
-          </a:prstGeom>
-          <a:noFill/>
-          <a:ln>
+        </p:grpSpPr>
+        <p:sp>
+          <p:nvSpPr>
+            <p:cNvPr id="45" name="Rectangle 44"/>
+            <p:cNvSpPr/>
+            <p:nvPr/>
+          </p:nvSpPr>
+          <p:spPr>
+            <a:xfrm>
+              <a:off x="6799399" y="332656"/>
+              <a:ext cx="2344601" cy="1718486"/>
+            </a:xfrm>
+            <a:prstGeom prst="rect">
+              <a:avLst/>
+            </a:prstGeom>
             <a:noFill/>
-          </a:ln>
-          <a:extLst>
-            <a:ext uri="{909E8E84-426E-40DD-AFC4-6F175D3DCCD1}">
-              <a14:hiddenFill xmlns:a14="http://schemas.microsoft.com/office/drawing/2010/main">
-                <a:solidFill>
-                  <a:schemeClr val="accent1"/>
-                </a:solidFill>
-              </a14:hiddenFill>
-            </a:ext>
-            <a:ext uri="{91240B29-F687-4F45-9708-019B960494DF}">
-              <a14:hiddenLine xmlns:a14="http://schemas.microsoft.com/office/drawing/2010/main" w="9525">
+            <a:ln>
+              <a:solidFill>
+                <a:schemeClr val="tx1"/>
+              </a:solidFill>
+            </a:ln>
+          </p:spPr>
+          <p:style>
+            <a:lnRef idx="2">
+              <a:schemeClr val="accent1">
+                <a:shade val="50000"/>
+              </a:schemeClr>
+            </a:lnRef>
+            <a:fillRef idx="1">
+              <a:schemeClr val="accent1"/>
+            </a:fillRef>
+            <a:effectRef idx="0">
+              <a:schemeClr val="accent1"/>
+            </a:effectRef>
+            <a:fontRef idx="minor">
+              <a:schemeClr val="lt1"/>
+            </a:fontRef>
+          </p:style>
+          <p:txBody>
+            <a:bodyPr rtlCol="0" anchor="ctr"/>
+            <a:lstStyle/>
+            <a:p>
+              <a:pPr algn="ctr"/>
+              <a:endParaRPr lang="fr-FR"/>
+            </a:p>
+          </p:txBody>
+        </p:sp>
+        <p:grpSp>
+          <p:nvGrpSpPr>
+            <p:cNvPr id="44" name="Groupe 43"/>
+            <p:cNvGrpSpPr/>
+            <p:nvPr/>
+          </p:nvGrpSpPr>
+          <p:grpSpPr>
+            <a:xfrm>
+              <a:off x="6961483" y="476672"/>
+              <a:ext cx="2219029" cy="1448621"/>
+              <a:chOff x="6921072" y="476672"/>
+              <a:chExt cx="2219029" cy="1448621"/>
+            </a:xfrm>
+          </p:grpSpPr>
+          <p:pic>
+            <p:nvPicPr>
+              <p:cNvPr id="1029" name="Picture 5"/>
+              <p:cNvPicPr>
+                <a:picLocks noChangeAspect="1" noChangeArrowheads="1"/>
+              </p:cNvPicPr>
+              <p:nvPr/>
+            </p:nvPicPr>
+            <p:blipFill>
+              <a:blip r:embed="rId2">
+                <a:extLst>
+                  <a:ext uri="{28A0092B-C50C-407E-A947-70E740481C1C}">
+                    <a14:useLocalDpi xmlns:a14="http://schemas.microsoft.com/office/drawing/2010/main" val="0"/>
+                  </a:ext>
+                </a:extLst>
+              </a:blip>
+              <a:srcRect/>
+              <a:stretch>
+                <a:fillRect/>
+              </a:stretch>
+            </p:blipFill>
+            <p:spPr bwMode="auto">
+              <a:xfrm>
+                <a:off x="7354773" y="1016114"/>
+                <a:ext cx="552450" cy="523875"/>
+              </a:xfrm>
+              <a:prstGeom prst="rect">
+                <a:avLst/>
+              </a:prstGeom>
+              <a:noFill/>
+              <a:ln>
+                <a:noFill/>
+              </a:ln>
+              <a:effectLst/>
+              <a:extLst>
+                <a:ext uri="{909E8E84-426E-40DD-AFC4-6F175D3DCCD1}">
+                  <a14:hiddenFill xmlns:a14="http://schemas.microsoft.com/office/drawing/2010/main">
+                    <a:solidFill>
+                      <a:schemeClr val="accent1"/>
+                    </a:solidFill>
+                  </a14:hiddenFill>
+                </a:ext>
+                <a:ext uri="{91240B29-F687-4F45-9708-019B960494DF}">
+                  <a14:hiddenLine xmlns:a14="http://schemas.microsoft.com/office/drawing/2010/main" w="9525">
+                    <a:solidFill>
+                      <a:schemeClr val="tx1"/>
+                    </a:solidFill>
+                    <a:miter lim="800000"/>
+                    <a:headEnd/>
+                    <a:tailEnd/>
+                  </a14:hiddenLine>
+                </a:ext>
+                <a:ext uri="{AF507438-7753-43E0-B8FC-AC1667EBCBE1}">
+                  <a14:hiddenEffects xmlns:a14="http://schemas.microsoft.com/office/drawing/2010/main">
+                    <a:effectLst>
+                      <a:outerShdw dist="35921" dir="2700000" algn="ctr" rotWithShape="0">
+                        <a:schemeClr val="bg2"/>
+                      </a:outerShdw>
+                    </a:effectLst>
+                  </a14:hiddenEffects>
+                </a:ext>
+              </a:extLst>
+            </p:spPr>
+          </p:pic>
+          <p:pic>
+            <p:nvPicPr>
+              <p:cNvPr id="1030" name="Picture 6"/>
+              <p:cNvPicPr>
+                <a:picLocks noChangeAspect="1" noChangeArrowheads="1"/>
+              </p:cNvPicPr>
+              <p:nvPr/>
+            </p:nvPicPr>
+            <p:blipFill>
+              <a:blip r:embed="rId3" cstate="print">
+                <a:extLst>
+                  <a:ext uri="{28A0092B-C50C-407E-A947-70E740481C1C}">
+                    <a14:useLocalDpi xmlns:a14="http://schemas.microsoft.com/office/drawing/2010/main" val="0"/>
+                  </a:ext>
+                </a:extLst>
+              </a:blip>
+              <a:srcRect/>
+              <a:stretch>
+                <a:fillRect/>
+              </a:stretch>
+            </p:blipFill>
+            <p:spPr bwMode="auto">
+              <a:xfrm>
+                <a:off x="7417930" y="730345"/>
+                <a:ext cx="426135" cy="389954"/>
+              </a:xfrm>
+              <a:prstGeom prst="rect">
+                <a:avLst/>
+              </a:prstGeom>
+              <a:noFill/>
+              <a:ln>
+                <a:noFill/>
+              </a:ln>
+              <a:extLst>
+                <a:ext uri="{909E8E84-426E-40DD-AFC4-6F175D3DCCD1}">
+                  <a14:hiddenFill xmlns:a14="http://schemas.microsoft.com/office/drawing/2010/main">
+                    <a:solidFill>
+                      <a:schemeClr val="accent1"/>
+                    </a:solidFill>
+                  </a14:hiddenFill>
+                </a:ext>
+                <a:ext uri="{91240B29-F687-4F45-9708-019B960494DF}">
+                  <a14:hiddenLine xmlns:a14="http://schemas.microsoft.com/office/drawing/2010/main" w="9525">
+                    <a:solidFill>
+                      <a:schemeClr val="tx1"/>
+                    </a:solidFill>
+                    <a:miter lim="800000"/>
+                    <a:headEnd/>
+                    <a:tailEnd/>
+                  </a14:hiddenLine>
+                </a:ext>
+              </a:extLst>
+            </p:spPr>
+          </p:pic>
+          <p:cxnSp>
+            <p:nvCxnSpPr>
+              <p:cNvPr id="37" name="Connecteur droit 36"/>
+              <p:cNvCxnSpPr/>
+              <p:nvPr/>
+            </p:nvCxnSpPr>
+            <p:spPr>
+              <a:xfrm>
+                <a:off x="6921073" y="728169"/>
+                <a:ext cx="417941" cy="0"/>
+              </a:xfrm>
+              <a:prstGeom prst="line">
+                <a:avLst/>
+              </a:prstGeom>
+              <a:ln w="38100">
                 <a:solidFill>
                   <a:schemeClr val="tx1"/>
                 </a:solidFill>
-                <a:miter lim="800000"/>
-                <a:headEnd/>
-                <a:tailEnd/>
-              </a14:hiddenLine>
-            </a:ext>
-          </a:extLst>
-        </p:spPr>
-      </p:pic>
+              </a:ln>
+            </p:spPr>
+            <p:style>
+              <a:lnRef idx="1">
+                <a:schemeClr val="accent1"/>
+              </a:lnRef>
+              <a:fillRef idx="0">
+                <a:schemeClr val="accent1"/>
+              </a:fillRef>
+              <a:effectRef idx="0">
+                <a:schemeClr val="accent1"/>
+              </a:effectRef>
+              <a:fontRef idx="minor">
+                <a:schemeClr val="tx1"/>
+              </a:fontRef>
+            </p:style>
+          </p:cxnSp>
+          <p:sp>
+            <p:nvSpPr>
+              <p:cNvPr id="38" name="ZoneTexte 37"/>
+              <p:cNvSpPr txBox="1"/>
+              <p:nvPr/>
+            </p:nvSpPr>
+            <p:spPr>
+              <a:xfrm>
+                <a:off x="7412666" y="476672"/>
+                <a:ext cx="423514" cy="369332"/>
+              </a:xfrm>
+              <a:prstGeom prst="rect">
+                <a:avLst/>
+              </a:prstGeom>
+              <a:noFill/>
+            </p:spPr>
+            <p:txBody>
+              <a:bodyPr wrap="none" rtlCol="0">
+                <a:spAutoFit/>
+              </a:bodyPr>
+              <a:lstStyle/>
+              <a:p>
+                <a:r>
+                  <a:rPr lang="fr-FR" dirty="0" smtClean="0"/>
+                  <a:t>All</a:t>
+                </a:r>
+                <a:endParaRPr lang="fr-FR" dirty="0"/>
+              </a:p>
+            </p:txBody>
+          </p:sp>
+          <p:cxnSp>
+            <p:nvCxnSpPr>
+              <p:cNvPr id="42" name="Connecteur droit 41"/>
+              <p:cNvCxnSpPr/>
+              <p:nvPr/>
+            </p:nvCxnSpPr>
+            <p:spPr>
+              <a:xfrm>
+                <a:off x="6921072" y="1268760"/>
+                <a:ext cx="417941" cy="0"/>
+              </a:xfrm>
+              <a:prstGeom prst="line">
+                <a:avLst/>
+              </a:prstGeom>
+              <a:ln w="38100">
+                <a:solidFill>
+                  <a:srgbClr val="FF0000"/>
+                </a:solidFill>
+              </a:ln>
+            </p:spPr>
+            <p:style>
+              <a:lnRef idx="1">
+                <a:schemeClr val="accent1"/>
+              </a:lnRef>
+              <a:fillRef idx="0">
+                <a:schemeClr val="accent1"/>
+              </a:fillRef>
+              <a:effectRef idx="0">
+                <a:schemeClr val="accent1"/>
+              </a:effectRef>
+              <a:fontRef idx="minor">
+                <a:schemeClr val="tx1"/>
+              </a:fontRef>
+            </p:style>
+          </p:cxnSp>
+          <p:cxnSp>
+            <p:nvCxnSpPr>
+              <p:cNvPr id="43" name="Connecteur droit 42"/>
+              <p:cNvCxnSpPr/>
+              <p:nvPr/>
+            </p:nvCxnSpPr>
+            <p:spPr>
+              <a:xfrm>
+                <a:off x="6922717" y="980728"/>
+                <a:ext cx="417941" cy="0"/>
+              </a:xfrm>
+              <a:prstGeom prst="line">
+                <a:avLst/>
+              </a:prstGeom>
+              <a:ln w="38100">
+                <a:solidFill>
+                  <a:srgbClr val="00B050"/>
+                </a:solidFill>
+              </a:ln>
+            </p:spPr>
+            <p:style>
+              <a:lnRef idx="1">
+                <a:schemeClr val="accent1"/>
+              </a:lnRef>
+              <a:fillRef idx="0">
+                <a:schemeClr val="accent1"/>
+              </a:fillRef>
+              <a:effectRef idx="0">
+                <a:schemeClr val="accent1"/>
+              </a:effectRef>
+              <a:fontRef idx="minor">
+                <a:schemeClr val="tx1"/>
+              </a:fontRef>
+            </p:style>
+          </p:cxnSp>
+          <p:cxnSp>
+            <p:nvCxnSpPr>
+              <p:cNvPr id="47" name="Connecteur droit 46"/>
+              <p:cNvCxnSpPr/>
+              <p:nvPr/>
+            </p:nvCxnSpPr>
+            <p:spPr>
+              <a:xfrm>
+                <a:off x="6945939" y="1694064"/>
+                <a:ext cx="417941" cy="0"/>
+              </a:xfrm>
+              <a:prstGeom prst="line">
+                <a:avLst/>
+              </a:prstGeom>
+              <a:ln w="38100">
+                <a:solidFill>
+                  <a:schemeClr val="bg1">
+                    <a:lumMod val="65000"/>
+                  </a:schemeClr>
+                </a:solidFill>
+              </a:ln>
+            </p:spPr>
+            <p:style>
+              <a:lnRef idx="1">
+                <a:schemeClr val="accent1"/>
+              </a:lnRef>
+              <a:fillRef idx="0">
+                <a:schemeClr val="accent1"/>
+              </a:fillRef>
+              <a:effectRef idx="0">
+                <a:schemeClr val="accent1"/>
+              </a:effectRef>
+              <a:fontRef idx="minor">
+                <a:schemeClr val="tx1"/>
+              </a:fontRef>
+            </p:style>
+          </p:cxnSp>
+          <p:pic>
+            <p:nvPicPr>
+              <p:cNvPr id="48" name="Picture 3"/>
+              <p:cNvPicPr>
+                <a:picLocks noChangeAspect="1" noChangeArrowheads="1"/>
+              </p:cNvPicPr>
+              <p:nvPr/>
+            </p:nvPicPr>
+            <p:blipFill>
+              <a:blip r:embed="rId4">
+                <a:extLst>
+                  <a:ext uri="{BEBA8EAE-BF5A-486C-A8C5-ECC9F3942E4B}">
+                    <a14:imgProps xmlns:a14="http://schemas.microsoft.com/office/drawing/2010/main">
+                      <a14:imgLayer r:embed="rId5">
+                        <a14:imgEffect>
+                          <a14:saturation sat="0"/>
+                        </a14:imgEffect>
+                      </a14:imgLayer>
+                    </a14:imgProps>
+                  </a:ext>
+                  <a:ext uri="{28A0092B-C50C-407E-A947-70E740481C1C}">
+                    <a14:useLocalDpi xmlns:a14="http://schemas.microsoft.com/office/drawing/2010/main" val="0"/>
+                  </a:ext>
+                </a:extLst>
+              </a:blip>
+              <a:srcRect/>
+              <a:stretch>
+                <a:fillRect/>
+              </a:stretch>
+            </p:blipFill>
+            <p:spPr bwMode="auto">
+              <a:xfrm>
+                <a:off x="7407547" y="1496668"/>
+                <a:ext cx="404813" cy="428625"/>
+              </a:xfrm>
+              <a:prstGeom prst="rect">
+                <a:avLst/>
+              </a:prstGeom>
+              <a:noFill/>
+              <a:ln>
+                <a:noFill/>
+              </a:ln>
+              <a:effectLst/>
+              <a:extLst>
+                <a:ext uri="{909E8E84-426E-40DD-AFC4-6F175D3DCCD1}">
+                  <a14:hiddenFill xmlns:a14="http://schemas.microsoft.com/office/drawing/2010/main">
+                    <a:solidFill>
+                      <a:schemeClr val="accent1"/>
+                    </a:solidFill>
+                  </a14:hiddenFill>
+                </a:ext>
+                <a:ext uri="{91240B29-F687-4F45-9708-019B960494DF}">
+                  <a14:hiddenLine xmlns:a14="http://schemas.microsoft.com/office/drawing/2010/main" w="9525">
+                    <a:solidFill>
+                      <a:schemeClr val="tx1"/>
+                    </a:solidFill>
+                    <a:miter lim="800000"/>
+                    <a:headEnd/>
+                    <a:tailEnd/>
+                  </a14:hiddenLine>
+                </a:ext>
+                <a:ext uri="{AF507438-7753-43E0-B8FC-AC1667EBCBE1}">
+                  <a14:hiddenEffects xmlns:a14="http://schemas.microsoft.com/office/drawing/2010/main">
+                    <a:effectLst>
+                      <a:outerShdw dist="35921" dir="2700000" algn="ctr" rotWithShape="0">
+                        <a:schemeClr val="bg2"/>
+                      </a:outerShdw>
+                    </a:effectLst>
+                  </a14:hiddenEffects>
+                </a:ext>
+              </a:extLst>
+            </p:spPr>
+          </p:pic>
+          <p:sp>
+            <p:nvSpPr>
+              <p:cNvPr id="40" name="Accolade fermante 39"/>
+              <p:cNvSpPr/>
+              <p:nvPr/>
+            </p:nvSpPr>
+            <p:spPr>
+              <a:xfrm>
+                <a:off x="7781562" y="541594"/>
+                <a:ext cx="462846" cy="879643"/>
+              </a:xfrm>
+              <a:prstGeom prst="rightBrace">
+                <a:avLst/>
+              </a:prstGeom>
+            </p:spPr>
+            <p:style>
+              <a:lnRef idx="1">
+                <a:schemeClr val="accent1"/>
+              </a:lnRef>
+              <a:fillRef idx="0">
+                <a:schemeClr val="accent1"/>
+              </a:fillRef>
+              <a:effectRef idx="0">
+                <a:schemeClr val="accent1"/>
+              </a:effectRef>
+              <a:fontRef idx="minor">
+                <a:schemeClr val="tx1"/>
+              </a:fontRef>
+            </p:style>
+            <p:txBody>
+              <a:bodyPr rtlCol="0" anchor="ctr"/>
+              <a:lstStyle/>
+              <a:p>
+                <a:pPr algn="ctr"/>
+                <a:endParaRPr lang="fr-FR"/>
+              </a:p>
+            </p:txBody>
+          </p:sp>
+          <p:sp>
+            <p:nvSpPr>
+              <p:cNvPr id="41" name="ZoneTexte 40"/>
+              <p:cNvSpPr txBox="1"/>
+              <p:nvPr/>
+            </p:nvSpPr>
+            <p:spPr>
+              <a:xfrm>
+                <a:off x="8172400" y="764704"/>
+                <a:ext cx="967701" cy="369332"/>
+              </a:xfrm>
+              <a:prstGeom prst="rect">
+                <a:avLst/>
+              </a:prstGeom>
+              <a:noFill/>
+            </p:spPr>
+            <p:txBody>
+              <a:bodyPr wrap="none" rtlCol="0">
+                <a:spAutoFit/>
+              </a:bodyPr>
+              <a:lstStyle/>
+              <a:p>
+                <a:r>
+                  <a:rPr lang="fr-FR" dirty="0" err="1" smtClean="0"/>
+                  <a:t>Rescued</a:t>
+                </a:r>
+                <a:endParaRPr lang="fr-FR" dirty="0"/>
+              </a:p>
+            </p:txBody>
+          </p:sp>
+          <p:sp>
+            <p:nvSpPr>
+              <p:cNvPr id="51" name="ZoneTexte 50"/>
+              <p:cNvSpPr txBox="1"/>
+              <p:nvPr/>
+            </p:nvSpPr>
+            <p:spPr>
+              <a:xfrm>
+                <a:off x="7978130" y="1547500"/>
+                <a:ext cx="1130374" cy="369332"/>
+              </a:xfrm>
+              <a:prstGeom prst="rect">
+                <a:avLst/>
+              </a:prstGeom>
+              <a:noFill/>
+            </p:spPr>
+            <p:txBody>
+              <a:bodyPr wrap="none" rtlCol="0">
+                <a:spAutoFit/>
+              </a:bodyPr>
+              <a:lstStyle/>
+              <a:p>
+                <a:r>
+                  <a:rPr lang="fr-FR" dirty="0" err="1" smtClean="0"/>
+                  <a:t>Zombified</a:t>
+                </a:r>
+                <a:endParaRPr lang="fr-FR" dirty="0"/>
+              </a:p>
+            </p:txBody>
+          </p:sp>
+        </p:grpSp>
+      </p:grpSp>
+      <p:grpSp>
+        <p:nvGrpSpPr>
+          <p:cNvPr id="58" name="Groupe 57"/>
+          <p:cNvGrpSpPr/>
+          <p:nvPr/>
+        </p:nvGrpSpPr>
+        <p:grpSpPr>
+          <a:xfrm>
+            <a:off x="251520" y="980729"/>
+            <a:ext cx="3038995" cy="2491648"/>
+            <a:chOff x="251520" y="980729"/>
+            <a:chExt cx="3038995" cy="2491648"/>
+          </a:xfrm>
+        </p:grpSpPr>
+        <p:grpSp>
+          <p:nvGrpSpPr>
+            <p:cNvPr id="56" name="Groupe 55"/>
+            <p:cNvGrpSpPr/>
+            <p:nvPr/>
+          </p:nvGrpSpPr>
+          <p:grpSpPr>
+            <a:xfrm>
+              <a:off x="251520" y="980729"/>
+              <a:ext cx="3038995" cy="2491648"/>
+              <a:chOff x="251520" y="980729"/>
+              <a:chExt cx="3038995" cy="2491648"/>
+            </a:xfrm>
+          </p:grpSpPr>
+          <p:pic>
+            <p:nvPicPr>
+              <p:cNvPr id="1026" name="Picture 2"/>
+              <p:cNvPicPr>
+                <a:picLocks noChangeAspect="1" noChangeArrowheads="1"/>
+              </p:cNvPicPr>
+              <p:nvPr/>
+            </p:nvPicPr>
+            <p:blipFill>
+              <a:blip r:embed="rId6">
+                <a:extLst>
+                  <a:ext uri="{28A0092B-C50C-407E-A947-70E740481C1C}">
+                    <a14:useLocalDpi xmlns:a14="http://schemas.microsoft.com/office/drawing/2010/main" val="0"/>
+                  </a:ext>
+                </a:extLst>
+              </a:blip>
+              <a:srcRect/>
+              <a:stretch>
+                <a:fillRect/>
+              </a:stretch>
+            </p:blipFill>
+            <p:spPr bwMode="auto">
+              <a:xfrm>
+                <a:off x="251520" y="1259081"/>
+                <a:ext cx="589010" cy="422757"/>
+              </a:xfrm>
+              <a:prstGeom prst="rect">
+                <a:avLst/>
+              </a:prstGeom>
+              <a:noFill/>
+              <a:ln>
+                <a:noFill/>
+              </a:ln>
+              <a:extLst>
+                <a:ext uri="{909E8E84-426E-40DD-AFC4-6F175D3DCCD1}">
+                  <a14:hiddenFill xmlns:a14="http://schemas.microsoft.com/office/drawing/2010/main">
+                    <a:solidFill>
+                      <a:schemeClr val="accent1"/>
+                    </a:solidFill>
+                  </a14:hiddenFill>
+                </a:ext>
+                <a:ext uri="{91240B29-F687-4F45-9708-019B960494DF}">
+                  <a14:hiddenLine xmlns:a14="http://schemas.microsoft.com/office/drawing/2010/main" w="9525">
+                    <a:solidFill>
+                      <a:schemeClr val="tx1"/>
+                    </a:solidFill>
+                    <a:miter lim="800000"/>
+                    <a:headEnd/>
+                    <a:tailEnd/>
+                  </a14:hiddenLine>
+                </a:ext>
+              </a:extLst>
+            </p:spPr>
+          </p:pic>
+          <p:pic>
+            <p:nvPicPr>
+              <p:cNvPr id="1031" name="Picture 7"/>
+              <p:cNvPicPr>
+                <a:picLocks noChangeAspect="1" noChangeArrowheads="1"/>
+              </p:cNvPicPr>
+              <p:nvPr/>
+            </p:nvPicPr>
+            <p:blipFill>
+              <a:blip r:embed="rId7" cstate="print">
+                <a:extLst>
+                  <a:ext uri="{28A0092B-C50C-407E-A947-70E740481C1C}">
+                    <a14:useLocalDpi xmlns:a14="http://schemas.microsoft.com/office/drawing/2010/main" val="0"/>
+                  </a:ext>
+                </a:extLst>
+              </a:blip>
+              <a:srcRect/>
+              <a:stretch>
+                <a:fillRect/>
+              </a:stretch>
+            </p:blipFill>
+            <p:spPr bwMode="auto">
+              <a:xfrm>
+                <a:off x="632234" y="1573709"/>
+                <a:ext cx="2594187" cy="1898668"/>
+              </a:xfrm>
+              <a:prstGeom prst="rect">
+                <a:avLst/>
+              </a:prstGeom>
+              <a:noFill/>
+              <a:ln>
+                <a:noFill/>
+              </a:ln>
+              <a:effectLst/>
+              <a:extLst>
+                <a:ext uri="{909E8E84-426E-40DD-AFC4-6F175D3DCCD1}">
+                  <a14:hiddenFill xmlns:a14="http://schemas.microsoft.com/office/drawing/2010/main">
+                    <a:solidFill>
+                      <a:schemeClr val="accent1"/>
+                    </a:solidFill>
+                  </a14:hiddenFill>
+                </a:ext>
+                <a:ext uri="{91240B29-F687-4F45-9708-019B960494DF}">
+                  <a14:hiddenLine xmlns:a14="http://schemas.microsoft.com/office/drawing/2010/main" w="9525">
+                    <a:solidFill>
+                      <a:schemeClr val="tx1"/>
+                    </a:solidFill>
+                    <a:miter lim="800000"/>
+                    <a:headEnd/>
+                    <a:tailEnd/>
+                  </a14:hiddenLine>
+                </a:ext>
+                <a:ext uri="{AF507438-7753-43E0-B8FC-AC1667EBCBE1}">
+                  <a14:hiddenEffects xmlns:a14="http://schemas.microsoft.com/office/drawing/2010/main">
+                    <a:effectLst>
+                      <a:outerShdw dist="35921" dir="2700000" algn="ctr" rotWithShape="0">
+                        <a:schemeClr val="bg2"/>
+                      </a:outerShdw>
+                    </a:effectLst>
+                  </a14:hiddenEffects>
+                </a:ext>
+              </a:extLst>
+            </p:spPr>
+          </p:pic>
+          <p:pic>
+            <p:nvPicPr>
+              <p:cNvPr id="1027" name="Picture 3"/>
+              <p:cNvPicPr>
+                <a:picLocks noChangeAspect="1" noChangeArrowheads="1"/>
+              </p:cNvPicPr>
+              <p:nvPr/>
+            </p:nvPicPr>
+            <p:blipFill>
+              <a:blip r:embed="rId8" cstate="print">
+                <a:extLst>
+                  <a:ext uri="{BEBA8EAE-BF5A-486C-A8C5-ECC9F3942E4B}">
+                    <a14:imgProps xmlns:a14="http://schemas.microsoft.com/office/drawing/2010/main">
+                      <a14:imgLayer r:embed="rId9">
+                        <a14:imgEffect>
+                          <a14:saturation sat="0"/>
+                        </a14:imgEffect>
+                      </a14:imgLayer>
+                    </a14:imgProps>
+                  </a:ext>
+                  <a:ext uri="{28A0092B-C50C-407E-A947-70E740481C1C}">
+                    <a14:useLocalDpi xmlns:a14="http://schemas.microsoft.com/office/drawing/2010/main" val="0"/>
+                  </a:ext>
+                </a:extLst>
+              </a:blip>
+              <a:srcRect/>
+              <a:stretch>
+                <a:fillRect/>
+              </a:stretch>
+            </p:blipFill>
+            <p:spPr bwMode="auto">
+              <a:xfrm>
+                <a:off x="2987824" y="1253214"/>
+                <a:ext cx="302691" cy="320496"/>
+              </a:xfrm>
+              <a:prstGeom prst="rect">
+                <a:avLst/>
+              </a:prstGeom>
+              <a:noFill/>
+              <a:ln>
+                <a:noFill/>
+              </a:ln>
+              <a:effectLst/>
+              <a:extLst>
+                <a:ext uri="{909E8E84-426E-40DD-AFC4-6F175D3DCCD1}">
+                  <a14:hiddenFill xmlns:a14="http://schemas.microsoft.com/office/drawing/2010/main">
+                    <a:solidFill>
+                      <a:schemeClr val="accent1"/>
+                    </a:solidFill>
+                  </a14:hiddenFill>
+                </a:ext>
+                <a:ext uri="{91240B29-F687-4F45-9708-019B960494DF}">
+                  <a14:hiddenLine xmlns:a14="http://schemas.microsoft.com/office/drawing/2010/main" w="9525">
+                    <a:solidFill>
+                      <a:schemeClr val="tx1"/>
+                    </a:solidFill>
+                    <a:miter lim="800000"/>
+                    <a:headEnd/>
+                    <a:tailEnd/>
+                  </a14:hiddenLine>
+                </a:ext>
+                <a:ext uri="{AF507438-7753-43E0-B8FC-AC1667EBCBE1}">
+                  <a14:hiddenEffects xmlns:a14="http://schemas.microsoft.com/office/drawing/2010/main">
+                    <a:effectLst>
+                      <a:outerShdw dist="35921" dir="2700000" algn="ctr" rotWithShape="0">
+                        <a:schemeClr val="bg2"/>
+                      </a:outerShdw>
+                    </a:effectLst>
+                  </a14:hiddenEffects>
+                </a:ext>
+              </a:extLst>
+            </p:spPr>
+          </p:pic>
+          <p:sp>
+            <p:nvSpPr>
+              <p:cNvPr id="7" name="ZoneTexte 6"/>
+              <p:cNvSpPr txBox="1"/>
+              <p:nvPr/>
+            </p:nvSpPr>
+            <p:spPr>
+              <a:xfrm>
+                <a:off x="1471239" y="1124745"/>
+                <a:ext cx="508473" cy="369332"/>
+              </a:xfrm>
+              <a:prstGeom prst="rect">
+                <a:avLst/>
+              </a:prstGeom>
+              <a:noFill/>
+            </p:spPr>
+            <p:txBody>
+              <a:bodyPr wrap="none" rtlCol="0">
+                <a:spAutoFit/>
+              </a:bodyPr>
+              <a:lstStyle/>
+              <a:p>
+                <a:r>
+                  <a:rPr lang="fr-FR" dirty="0" smtClean="0"/>
+                  <a:t>No </a:t>
+                </a:r>
+                <a:endParaRPr lang="fr-FR" dirty="0"/>
+              </a:p>
+            </p:txBody>
+          </p:sp>
+          <p:grpSp>
+            <p:nvGrpSpPr>
+              <p:cNvPr id="34" name="Groupe 33"/>
+              <p:cNvGrpSpPr/>
+              <p:nvPr/>
+            </p:nvGrpSpPr>
+            <p:grpSpPr>
+              <a:xfrm>
+                <a:off x="1835696" y="980729"/>
+                <a:ext cx="648073" cy="576063"/>
+                <a:chOff x="7369242" y="548680"/>
+                <a:chExt cx="1661769" cy="1371297"/>
+              </a:xfrm>
+            </p:grpSpPr>
+            <p:pic>
+              <p:nvPicPr>
+                <p:cNvPr id="35" name="Picture 2"/>
+                <p:cNvPicPr>
+                  <a:picLocks noChangeAspect="1" noChangeArrowheads="1"/>
+                </p:cNvPicPr>
+                <p:nvPr/>
+              </p:nvPicPr>
+              <p:blipFill>
+                <a:blip r:embed="rId10" cstate="print">
+                  <a:extLst>
+                    <a:ext uri="{28A0092B-C50C-407E-A947-70E740481C1C}">
+                      <a14:useLocalDpi xmlns:a14="http://schemas.microsoft.com/office/drawing/2010/main" val="0"/>
+                    </a:ext>
+                  </a:extLst>
+                </a:blip>
+                <a:srcRect/>
+                <a:stretch>
+                  <a:fillRect/>
+                </a:stretch>
+              </p:blipFill>
+              <p:spPr bwMode="auto">
+                <a:xfrm>
+                  <a:off x="7369242" y="548680"/>
+                  <a:ext cx="1661769" cy="1371297"/>
+                </a:xfrm>
+                <a:prstGeom prst="rect">
+                  <a:avLst/>
+                </a:prstGeom>
+                <a:noFill/>
+                <a:ln>
+                  <a:noFill/>
+                </a:ln>
+                <a:effectLst/>
+                <a:extLst>
+                  <a:ext uri="{909E8E84-426E-40DD-AFC4-6F175D3DCCD1}">
+                    <a14:hiddenFill xmlns:a14="http://schemas.microsoft.com/office/drawing/2010/main">
+                      <a:solidFill>
+                        <a:schemeClr val="accent1"/>
+                      </a:solidFill>
+                    </a14:hiddenFill>
+                  </a:ext>
+                  <a:ext uri="{91240B29-F687-4F45-9708-019B960494DF}">
+                    <a14:hiddenLine xmlns:a14="http://schemas.microsoft.com/office/drawing/2010/main" w="9525">
+                      <a:solidFill>
+                        <a:schemeClr val="tx1"/>
+                      </a:solidFill>
+                      <a:miter lim="800000"/>
+                      <a:headEnd/>
+                      <a:tailEnd/>
+                    </a14:hiddenLine>
+                  </a:ext>
+                  <a:ext uri="{AF507438-7753-43E0-B8FC-AC1667EBCBE1}">
+                    <a14:hiddenEffects xmlns:a14="http://schemas.microsoft.com/office/drawing/2010/main">
+                      <a:effectLst>
+                        <a:outerShdw dist="35921" dir="2700000" algn="ctr" rotWithShape="0">
+                          <a:schemeClr val="bg2"/>
+                        </a:outerShdw>
+                      </a:effectLst>
+                    </a14:hiddenEffects>
+                  </a:ext>
+                </a:extLst>
+              </p:spPr>
+            </p:pic>
+            <p:pic>
+              <p:nvPicPr>
+                <p:cNvPr id="36" name="Picture 3"/>
+                <p:cNvPicPr>
+                  <a:picLocks noChangeAspect="1" noChangeArrowheads="1"/>
+                </p:cNvPicPr>
+                <p:nvPr/>
+              </p:nvPicPr>
+              <p:blipFill>
+                <a:blip r:embed="rId11" cstate="print">
+                  <a:extLst>
+                    <a:ext uri="{28A0092B-C50C-407E-A947-70E740481C1C}">
+                      <a14:useLocalDpi xmlns:a14="http://schemas.microsoft.com/office/drawing/2010/main" val="0"/>
+                    </a:ext>
+                  </a:extLst>
+                </a:blip>
+                <a:srcRect/>
+                <a:stretch>
+                  <a:fillRect/>
+                </a:stretch>
+              </p:blipFill>
+              <p:spPr bwMode="auto">
+                <a:xfrm>
+                  <a:off x="8546295" y="601451"/>
+                  <a:ext cx="391052" cy="195526"/>
+                </a:xfrm>
+                <a:prstGeom prst="rect">
+                  <a:avLst/>
+                </a:prstGeom>
+                <a:noFill/>
+                <a:ln>
+                  <a:noFill/>
+                </a:ln>
+                <a:effectLst/>
+                <a:extLst>
+                  <a:ext uri="{909E8E84-426E-40DD-AFC4-6F175D3DCCD1}">
+                    <a14:hiddenFill xmlns:a14="http://schemas.microsoft.com/office/drawing/2010/main">
+                      <a:solidFill>
+                        <a:schemeClr val="accent1"/>
+                      </a:solidFill>
+                    </a14:hiddenFill>
+                  </a:ext>
+                  <a:ext uri="{91240B29-F687-4F45-9708-019B960494DF}">
+                    <a14:hiddenLine xmlns:a14="http://schemas.microsoft.com/office/drawing/2010/main" w="9525">
+                      <a:solidFill>
+                        <a:schemeClr val="tx1"/>
+                      </a:solidFill>
+                      <a:miter lim="800000"/>
+                      <a:headEnd/>
+                      <a:tailEnd/>
+                    </a14:hiddenLine>
+                  </a:ext>
+                  <a:ext uri="{AF507438-7753-43E0-B8FC-AC1667EBCBE1}">
+                    <a14:hiddenEffects xmlns:a14="http://schemas.microsoft.com/office/drawing/2010/main">
+                      <a:effectLst>
+                        <a:outerShdw dist="35921" dir="2700000" algn="ctr" rotWithShape="0">
+                          <a:schemeClr val="bg2"/>
+                        </a:outerShdw>
+                      </a:effectLst>
+                    </a14:hiddenEffects>
+                  </a:ext>
+                </a:extLst>
+              </p:spPr>
+            </p:pic>
+          </p:grpSp>
+        </p:grpSp>
+        <p:cxnSp>
+          <p:nvCxnSpPr>
+            <p:cNvPr id="6" name="Connecteur droit avec flèche 5"/>
+            <p:cNvCxnSpPr/>
+            <p:nvPr/>
+          </p:nvCxnSpPr>
+          <p:spPr>
+            <a:xfrm flipV="1">
+              <a:off x="3112310" y="1628385"/>
+              <a:ext cx="0" cy="1505840"/>
+            </a:xfrm>
+            <a:prstGeom prst="straightConnector1">
+              <a:avLst/>
+            </a:prstGeom>
+            <a:ln w="38100">
+              <a:solidFill>
+                <a:schemeClr val="bg1">
+                  <a:lumMod val="50000"/>
+                </a:schemeClr>
+              </a:solidFill>
+              <a:tailEnd type="arrow"/>
+            </a:ln>
+          </p:spPr>
+          <p:style>
+            <a:lnRef idx="1">
+              <a:schemeClr val="accent1"/>
+            </a:lnRef>
+            <a:fillRef idx="0">
+              <a:schemeClr val="accent1"/>
+            </a:fillRef>
+            <a:effectRef idx="0">
+              <a:schemeClr val="accent1"/>
+            </a:effectRef>
+            <a:fontRef idx="minor">
+              <a:schemeClr val="tx1"/>
+            </a:fontRef>
+          </p:style>
+        </p:cxnSp>
+      </p:grpSp>
+      <p:grpSp>
+        <p:nvGrpSpPr>
+          <p:cNvPr id="57" name="Groupe 56"/>
+          <p:cNvGrpSpPr/>
+          <p:nvPr/>
+        </p:nvGrpSpPr>
+        <p:grpSpPr>
+          <a:xfrm>
+            <a:off x="3478934" y="1392164"/>
+            <a:ext cx="3019526" cy="2469790"/>
+            <a:chOff x="3478934" y="1392164"/>
+            <a:chExt cx="3019526" cy="2469790"/>
+          </a:xfrm>
+        </p:grpSpPr>
+        <p:pic>
+          <p:nvPicPr>
+            <p:cNvPr id="25" name="Picture 2"/>
+            <p:cNvPicPr>
+              <a:picLocks noChangeAspect="1" noChangeArrowheads="1"/>
+            </p:cNvPicPr>
+            <p:nvPr/>
+          </p:nvPicPr>
+          <p:blipFill>
+            <a:blip r:embed="rId6">
+              <a:extLst>
+                <a:ext uri="{28A0092B-C50C-407E-A947-70E740481C1C}">
+                  <a14:useLocalDpi xmlns:a14="http://schemas.microsoft.com/office/drawing/2010/main" val="0"/>
+                </a:ext>
+              </a:extLst>
+            </a:blip>
+            <a:srcRect/>
+            <a:stretch>
+              <a:fillRect/>
+            </a:stretch>
+          </p:blipFill>
+          <p:spPr bwMode="auto">
+            <a:xfrm>
+              <a:off x="3478934" y="1566083"/>
+              <a:ext cx="589010" cy="422757"/>
+            </a:xfrm>
+            <a:prstGeom prst="rect">
+              <a:avLst/>
+            </a:prstGeom>
+            <a:noFill/>
+            <a:ln>
+              <a:noFill/>
+            </a:ln>
+            <a:extLst>
+              <a:ext uri="{909E8E84-426E-40DD-AFC4-6F175D3DCCD1}">
+                <a14:hiddenFill xmlns:a14="http://schemas.microsoft.com/office/drawing/2010/main">
+                  <a:solidFill>
+                    <a:schemeClr val="accent1"/>
+                  </a:solidFill>
+                </a14:hiddenFill>
+              </a:ext>
+              <a:ext uri="{91240B29-F687-4F45-9708-019B960494DF}">
+                <a14:hiddenLine xmlns:a14="http://schemas.microsoft.com/office/drawing/2010/main" w="9525">
+                  <a:solidFill>
+                    <a:schemeClr val="tx1"/>
+                  </a:solidFill>
+                  <a:miter lim="800000"/>
+                  <a:headEnd/>
+                  <a:tailEnd/>
+                </a14:hiddenLine>
+              </a:ext>
+            </a:extLst>
+          </p:spPr>
+        </p:pic>
+        <p:pic>
+          <p:nvPicPr>
+            <p:cNvPr id="1032" name="Picture 8"/>
+            <p:cNvPicPr>
+              <a:picLocks noChangeAspect="1" noChangeArrowheads="1"/>
+            </p:cNvPicPr>
+            <p:nvPr/>
+          </p:nvPicPr>
+          <p:blipFill>
+            <a:blip r:embed="rId12" cstate="print">
+              <a:extLst>
+                <a:ext uri="{28A0092B-C50C-407E-A947-70E740481C1C}">
+                  <a14:useLocalDpi xmlns:a14="http://schemas.microsoft.com/office/drawing/2010/main" val="0"/>
+                </a:ext>
+              </a:extLst>
+            </a:blip>
+            <a:srcRect/>
+            <a:stretch>
+              <a:fillRect/>
+            </a:stretch>
+          </p:blipFill>
+          <p:spPr bwMode="auto">
+            <a:xfrm>
+              <a:off x="3818514" y="1894062"/>
+              <a:ext cx="2640338" cy="1967892"/>
+            </a:xfrm>
+            <a:prstGeom prst="rect">
+              <a:avLst/>
+            </a:prstGeom>
+            <a:noFill/>
+            <a:ln>
+              <a:noFill/>
+            </a:ln>
+            <a:extLst>
+              <a:ext uri="{909E8E84-426E-40DD-AFC4-6F175D3DCCD1}">
+                <a14:hiddenFill xmlns:a14="http://schemas.microsoft.com/office/drawing/2010/main">
+                  <a:solidFill>
+                    <a:schemeClr val="accent1"/>
+                  </a:solidFill>
+                </a14:hiddenFill>
+              </a:ext>
+              <a:ext uri="{91240B29-F687-4F45-9708-019B960494DF}">
+                <a14:hiddenLine xmlns:a14="http://schemas.microsoft.com/office/drawing/2010/main" w="9525">
+                  <a:solidFill>
+                    <a:schemeClr val="tx1"/>
+                  </a:solidFill>
+                  <a:miter lim="800000"/>
+                  <a:headEnd/>
+                  <a:tailEnd/>
+                </a14:hiddenLine>
+              </a:ext>
+            </a:extLst>
+          </p:spPr>
+        </p:pic>
+        <p:grpSp>
+          <p:nvGrpSpPr>
+            <p:cNvPr id="22" name="Groupe 21"/>
+            <p:cNvGrpSpPr/>
+            <p:nvPr/>
+          </p:nvGrpSpPr>
+          <p:grpSpPr>
+            <a:xfrm>
+              <a:off x="5116123" y="1392164"/>
+              <a:ext cx="648073" cy="576063"/>
+              <a:chOff x="7369242" y="548680"/>
+              <a:chExt cx="1661769" cy="1371297"/>
+            </a:xfrm>
+          </p:grpSpPr>
+          <p:pic>
+            <p:nvPicPr>
+              <p:cNvPr id="23" name="Picture 2"/>
+              <p:cNvPicPr>
+                <a:picLocks noChangeAspect="1" noChangeArrowheads="1"/>
+              </p:cNvPicPr>
+              <p:nvPr/>
+            </p:nvPicPr>
+            <p:blipFill>
+              <a:blip r:embed="rId10" cstate="print">
+                <a:extLst>
+                  <a:ext uri="{28A0092B-C50C-407E-A947-70E740481C1C}">
+                    <a14:useLocalDpi xmlns:a14="http://schemas.microsoft.com/office/drawing/2010/main" val="0"/>
+                  </a:ext>
+                </a:extLst>
+              </a:blip>
+              <a:srcRect/>
+              <a:stretch>
+                <a:fillRect/>
+              </a:stretch>
+            </p:blipFill>
+            <p:spPr bwMode="auto">
+              <a:xfrm>
+                <a:off x="7369242" y="548680"/>
+                <a:ext cx="1661769" cy="1371297"/>
+              </a:xfrm>
+              <a:prstGeom prst="rect">
+                <a:avLst/>
+              </a:prstGeom>
+              <a:noFill/>
+              <a:ln>
+                <a:noFill/>
+              </a:ln>
+              <a:effectLst/>
+              <a:extLst>
+                <a:ext uri="{909E8E84-426E-40DD-AFC4-6F175D3DCCD1}">
+                  <a14:hiddenFill xmlns:a14="http://schemas.microsoft.com/office/drawing/2010/main">
+                    <a:solidFill>
+                      <a:schemeClr val="accent1"/>
+                    </a:solidFill>
+                  </a14:hiddenFill>
+                </a:ext>
+                <a:ext uri="{91240B29-F687-4F45-9708-019B960494DF}">
+                  <a14:hiddenLine xmlns:a14="http://schemas.microsoft.com/office/drawing/2010/main" w="9525">
+                    <a:solidFill>
+                      <a:schemeClr val="tx1"/>
+                    </a:solidFill>
+                    <a:miter lim="800000"/>
+                    <a:headEnd/>
+                    <a:tailEnd/>
+                  </a14:hiddenLine>
+                </a:ext>
+                <a:ext uri="{AF507438-7753-43E0-B8FC-AC1667EBCBE1}">
+                  <a14:hiddenEffects xmlns:a14="http://schemas.microsoft.com/office/drawing/2010/main">
+                    <a:effectLst>
+                      <a:outerShdw dist="35921" dir="2700000" algn="ctr" rotWithShape="0">
+                        <a:schemeClr val="bg2"/>
+                      </a:outerShdw>
+                    </a:effectLst>
+                  </a14:hiddenEffects>
+                </a:ext>
+              </a:extLst>
+            </p:spPr>
+          </p:pic>
+          <p:pic>
+            <p:nvPicPr>
+              <p:cNvPr id="24" name="Picture 3"/>
+              <p:cNvPicPr>
+                <a:picLocks noChangeAspect="1" noChangeArrowheads="1"/>
+              </p:cNvPicPr>
+              <p:nvPr/>
+            </p:nvPicPr>
+            <p:blipFill>
+              <a:blip r:embed="rId11" cstate="print">
+                <a:extLst>
+                  <a:ext uri="{28A0092B-C50C-407E-A947-70E740481C1C}">
+                    <a14:useLocalDpi xmlns:a14="http://schemas.microsoft.com/office/drawing/2010/main" val="0"/>
+                  </a:ext>
+                </a:extLst>
+              </a:blip>
+              <a:srcRect/>
+              <a:stretch>
+                <a:fillRect/>
+              </a:stretch>
+            </p:blipFill>
+            <p:spPr bwMode="auto">
+              <a:xfrm>
+                <a:off x="8546295" y="601451"/>
+                <a:ext cx="391052" cy="195526"/>
+              </a:xfrm>
+              <a:prstGeom prst="rect">
+                <a:avLst/>
+              </a:prstGeom>
+              <a:noFill/>
+              <a:ln>
+                <a:noFill/>
+              </a:ln>
+              <a:effectLst/>
+              <a:extLst>
+                <a:ext uri="{909E8E84-426E-40DD-AFC4-6F175D3DCCD1}">
+                  <a14:hiddenFill xmlns:a14="http://schemas.microsoft.com/office/drawing/2010/main">
+                    <a:solidFill>
+                      <a:schemeClr val="accent1"/>
+                    </a:solidFill>
+                  </a14:hiddenFill>
+                </a:ext>
+                <a:ext uri="{91240B29-F687-4F45-9708-019B960494DF}">
+                  <a14:hiddenLine xmlns:a14="http://schemas.microsoft.com/office/drawing/2010/main" w="9525">
+                    <a:solidFill>
+                      <a:schemeClr val="tx1"/>
+                    </a:solidFill>
+                    <a:miter lim="800000"/>
+                    <a:headEnd/>
+                    <a:tailEnd/>
+                  </a14:hiddenLine>
+                </a:ext>
+                <a:ext uri="{AF507438-7753-43E0-B8FC-AC1667EBCBE1}">
+                  <a14:hiddenEffects xmlns:a14="http://schemas.microsoft.com/office/drawing/2010/main">
+                    <a:effectLst>
+                      <a:outerShdw dist="35921" dir="2700000" algn="ctr" rotWithShape="0">
+                        <a:schemeClr val="bg2"/>
+                      </a:outerShdw>
+                    </a:effectLst>
+                  </a14:hiddenEffects>
+                </a:ext>
+              </a:extLst>
+            </p:spPr>
+          </p:pic>
+        </p:grpSp>
+        <p:sp>
+          <p:nvSpPr>
+            <p:cNvPr id="31" name="ZoneTexte 30"/>
+            <p:cNvSpPr txBox="1"/>
+            <p:nvPr/>
+          </p:nvSpPr>
+          <p:spPr>
+            <a:xfrm>
+              <a:off x="4697419" y="1535284"/>
+              <a:ext cx="418704" cy="369332"/>
+            </a:xfrm>
+            <a:prstGeom prst="rect">
+              <a:avLst/>
+            </a:prstGeom>
+            <a:noFill/>
+          </p:spPr>
+          <p:txBody>
+            <a:bodyPr wrap="none" rtlCol="0">
+              <a:spAutoFit/>
+            </a:bodyPr>
+            <a:lstStyle/>
+            <a:p>
+              <a:r>
+                <a:rPr lang="fr-FR" dirty="0" smtClean="0"/>
+                <a:t>25</a:t>
+              </a:r>
+              <a:endParaRPr lang="fr-FR" dirty="0"/>
+            </a:p>
+          </p:txBody>
+        </p:sp>
+        <p:cxnSp>
+          <p:nvCxnSpPr>
+            <p:cNvPr id="62" name="Connecteur droit avec flèche 61"/>
+            <p:cNvCxnSpPr/>
+            <p:nvPr/>
+          </p:nvCxnSpPr>
+          <p:spPr>
+            <a:xfrm flipV="1">
+              <a:off x="6320255" y="2003971"/>
+              <a:ext cx="0" cy="1505840"/>
+            </a:xfrm>
+            <a:prstGeom prst="straightConnector1">
+              <a:avLst/>
+            </a:prstGeom>
+            <a:ln w="38100">
+              <a:solidFill>
+                <a:schemeClr val="bg1">
+                  <a:lumMod val="50000"/>
+                </a:schemeClr>
+              </a:solidFill>
+              <a:tailEnd type="arrow"/>
+            </a:ln>
+          </p:spPr>
+          <p:style>
+            <a:lnRef idx="1">
+              <a:schemeClr val="accent1"/>
+            </a:lnRef>
+            <a:fillRef idx="0">
+              <a:schemeClr val="accent1"/>
+            </a:fillRef>
+            <a:effectRef idx="0">
+              <a:schemeClr val="accent1"/>
+            </a:effectRef>
+            <a:fontRef idx="minor">
+              <a:schemeClr val="tx1"/>
+            </a:fontRef>
+          </p:style>
+        </p:cxnSp>
+        <p:pic>
+          <p:nvPicPr>
+            <p:cNvPr id="63" name="Picture 3"/>
+            <p:cNvPicPr>
+              <a:picLocks noChangeAspect="1" noChangeArrowheads="1"/>
+            </p:cNvPicPr>
+            <p:nvPr/>
+          </p:nvPicPr>
+          <p:blipFill>
+            <a:blip r:embed="rId8" cstate="print">
+              <a:extLst>
+                <a:ext uri="{BEBA8EAE-BF5A-486C-A8C5-ECC9F3942E4B}">
+                  <a14:imgProps xmlns:a14="http://schemas.microsoft.com/office/drawing/2010/main">
+                    <a14:imgLayer r:embed="rId9">
+                      <a14:imgEffect>
+                        <a14:saturation sat="0"/>
+                      </a14:imgEffect>
+                    </a14:imgLayer>
+                  </a14:imgProps>
+                </a:ext>
+                <a:ext uri="{28A0092B-C50C-407E-A947-70E740481C1C}">
+                  <a14:useLocalDpi xmlns:a14="http://schemas.microsoft.com/office/drawing/2010/main" val="0"/>
+                </a:ext>
+              </a:extLst>
+            </a:blip>
+            <a:srcRect/>
+            <a:stretch>
+              <a:fillRect/>
+            </a:stretch>
+          </p:blipFill>
+          <p:spPr bwMode="auto">
+            <a:xfrm>
+              <a:off x="6195769" y="1628800"/>
+              <a:ext cx="302691" cy="320496"/>
+            </a:xfrm>
+            <a:prstGeom prst="rect">
+              <a:avLst/>
+            </a:prstGeom>
+            <a:noFill/>
+            <a:ln>
+              <a:noFill/>
+            </a:ln>
+            <a:effectLst/>
+            <a:extLst>
+              <a:ext uri="{909E8E84-426E-40DD-AFC4-6F175D3DCCD1}">
+                <a14:hiddenFill xmlns:a14="http://schemas.microsoft.com/office/drawing/2010/main">
+                  <a:solidFill>
+                    <a:schemeClr val="accent1"/>
+                  </a:solidFill>
+                </a14:hiddenFill>
+              </a:ext>
+              <a:ext uri="{91240B29-F687-4F45-9708-019B960494DF}">
+                <a14:hiddenLine xmlns:a14="http://schemas.microsoft.com/office/drawing/2010/main" w="9525">
+                  <a:solidFill>
+                    <a:schemeClr val="tx1"/>
+                  </a:solidFill>
+                  <a:miter lim="800000"/>
+                  <a:headEnd/>
+                  <a:tailEnd/>
+                </a14:hiddenLine>
+              </a:ext>
+              <a:ext uri="{AF507438-7753-43E0-B8FC-AC1667EBCBE1}">
+                <a14:hiddenEffects xmlns:a14="http://schemas.microsoft.com/office/drawing/2010/main">
+                  <a:effectLst>
+                    <a:outerShdw dist="35921" dir="2700000" algn="ctr" rotWithShape="0">
+                      <a:schemeClr val="bg2"/>
+                    </a:outerShdw>
+                  </a:effectLst>
+                </a14:hiddenEffects>
+              </a:ext>
+            </a:extLst>
+          </p:spPr>
+        </p:pic>
+      </p:grpSp>
+      <p:grpSp>
+        <p:nvGrpSpPr>
+          <p:cNvPr id="53" name="Groupe 52"/>
+          <p:cNvGrpSpPr/>
+          <p:nvPr/>
+        </p:nvGrpSpPr>
+        <p:grpSpPr>
+          <a:xfrm>
+            <a:off x="1331640" y="3792224"/>
+            <a:ext cx="3014742" cy="2517096"/>
+            <a:chOff x="1331640" y="3792224"/>
+            <a:chExt cx="3014742" cy="2517096"/>
+          </a:xfrm>
+        </p:grpSpPr>
+        <p:pic>
+          <p:nvPicPr>
+            <p:cNvPr id="28" name="Picture 2"/>
+            <p:cNvPicPr>
+              <a:picLocks noChangeAspect="1" noChangeArrowheads="1"/>
+            </p:cNvPicPr>
+            <p:nvPr/>
+          </p:nvPicPr>
+          <p:blipFill>
+            <a:blip r:embed="rId6">
+              <a:extLst>
+                <a:ext uri="{28A0092B-C50C-407E-A947-70E740481C1C}">
+                  <a14:useLocalDpi xmlns:a14="http://schemas.microsoft.com/office/drawing/2010/main" val="0"/>
+                </a:ext>
+              </a:extLst>
+            </a:blip>
+            <a:srcRect/>
+            <a:stretch>
+              <a:fillRect/>
+            </a:stretch>
+          </p:blipFill>
+          <p:spPr bwMode="auto">
+            <a:xfrm>
+              <a:off x="1331640" y="4008248"/>
+              <a:ext cx="589010" cy="422757"/>
+            </a:xfrm>
+            <a:prstGeom prst="rect">
+              <a:avLst/>
+            </a:prstGeom>
+            <a:noFill/>
+            <a:ln>
+              <a:noFill/>
+            </a:ln>
+            <a:extLst>
+              <a:ext uri="{909E8E84-426E-40DD-AFC4-6F175D3DCCD1}">
+                <a14:hiddenFill xmlns:a14="http://schemas.microsoft.com/office/drawing/2010/main">
+                  <a:solidFill>
+                    <a:schemeClr val="accent1"/>
+                  </a:solidFill>
+                </a14:hiddenFill>
+              </a:ext>
+              <a:ext uri="{91240B29-F687-4F45-9708-019B960494DF}">
+                <a14:hiddenLine xmlns:a14="http://schemas.microsoft.com/office/drawing/2010/main" w="9525">
+                  <a:solidFill>
+                    <a:schemeClr val="tx1"/>
+                  </a:solidFill>
+                  <a:miter lim="800000"/>
+                  <a:headEnd/>
+                  <a:tailEnd/>
+                </a14:hiddenLine>
+              </a:ext>
+            </a:extLst>
+          </p:spPr>
+        </p:pic>
+        <p:pic>
+          <p:nvPicPr>
+            <p:cNvPr id="1033" name="Picture 9"/>
+            <p:cNvPicPr>
+              <a:picLocks noChangeAspect="1" noChangeArrowheads="1"/>
+            </p:cNvPicPr>
+            <p:nvPr/>
+          </p:nvPicPr>
+          <p:blipFill>
+            <a:blip r:embed="rId13" cstate="print">
+              <a:extLst>
+                <a:ext uri="{28A0092B-C50C-407E-A947-70E740481C1C}">
+                  <a14:useLocalDpi xmlns:a14="http://schemas.microsoft.com/office/drawing/2010/main" val="0"/>
+                </a:ext>
+              </a:extLst>
+            </a:blip>
+            <a:srcRect/>
+            <a:stretch>
+              <a:fillRect/>
+            </a:stretch>
+          </p:blipFill>
+          <p:spPr bwMode="auto">
+            <a:xfrm>
+              <a:off x="1652147" y="4338133"/>
+              <a:ext cx="2646928" cy="1971187"/>
+            </a:xfrm>
+            <a:prstGeom prst="rect">
+              <a:avLst/>
+            </a:prstGeom>
+            <a:noFill/>
+            <a:ln>
+              <a:noFill/>
+            </a:ln>
+            <a:extLst>
+              <a:ext uri="{909E8E84-426E-40DD-AFC4-6F175D3DCCD1}">
+                <a14:hiddenFill xmlns:a14="http://schemas.microsoft.com/office/drawing/2010/main">
+                  <a:solidFill>
+                    <a:schemeClr val="accent1"/>
+                  </a:solidFill>
+                </a14:hiddenFill>
+              </a:ext>
+              <a:ext uri="{91240B29-F687-4F45-9708-019B960494DF}">
+                <a14:hiddenLine xmlns:a14="http://schemas.microsoft.com/office/drawing/2010/main" w="9525">
+                  <a:solidFill>
+                    <a:schemeClr val="tx1"/>
+                  </a:solidFill>
+                  <a:miter lim="800000"/>
+                  <a:headEnd/>
+                  <a:tailEnd/>
+                </a14:hiddenLine>
+              </a:ext>
+            </a:extLst>
+          </p:spPr>
+        </p:pic>
+        <p:grpSp>
+          <p:nvGrpSpPr>
+            <p:cNvPr id="3" name="Groupe 2"/>
+            <p:cNvGrpSpPr/>
+            <p:nvPr/>
+          </p:nvGrpSpPr>
+          <p:grpSpPr>
+            <a:xfrm>
+              <a:off x="2915815" y="3792224"/>
+              <a:ext cx="648073" cy="576063"/>
+              <a:chOff x="7369242" y="548680"/>
+              <a:chExt cx="1661769" cy="1371297"/>
+            </a:xfrm>
+          </p:grpSpPr>
+          <p:pic>
+            <p:nvPicPr>
+              <p:cNvPr id="8" name="Picture 2"/>
+              <p:cNvPicPr>
+                <a:picLocks noChangeAspect="1" noChangeArrowheads="1"/>
+              </p:cNvPicPr>
+              <p:nvPr/>
+            </p:nvPicPr>
+            <p:blipFill>
+              <a:blip r:embed="rId10" cstate="print">
+                <a:extLst>
+                  <a:ext uri="{28A0092B-C50C-407E-A947-70E740481C1C}">
+                    <a14:useLocalDpi xmlns:a14="http://schemas.microsoft.com/office/drawing/2010/main" val="0"/>
+                  </a:ext>
+                </a:extLst>
+              </a:blip>
+              <a:srcRect/>
+              <a:stretch>
+                <a:fillRect/>
+              </a:stretch>
+            </p:blipFill>
+            <p:spPr bwMode="auto">
+              <a:xfrm>
+                <a:off x="7369242" y="548680"/>
+                <a:ext cx="1661769" cy="1371297"/>
+              </a:xfrm>
+              <a:prstGeom prst="rect">
+                <a:avLst/>
+              </a:prstGeom>
+              <a:noFill/>
+              <a:ln>
+                <a:noFill/>
+              </a:ln>
+              <a:effectLst/>
+              <a:extLst>
+                <a:ext uri="{909E8E84-426E-40DD-AFC4-6F175D3DCCD1}">
+                  <a14:hiddenFill xmlns:a14="http://schemas.microsoft.com/office/drawing/2010/main">
+                    <a:solidFill>
+                      <a:schemeClr val="accent1"/>
+                    </a:solidFill>
+                  </a14:hiddenFill>
+                </a:ext>
+                <a:ext uri="{91240B29-F687-4F45-9708-019B960494DF}">
+                  <a14:hiddenLine xmlns:a14="http://schemas.microsoft.com/office/drawing/2010/main" w="9525">
+                    <a:solidFill>
+                      <a:schemeClr val="tx1"/>
+                    </a:solidFill>
+                    <a:miter lim="800000"/>
+                    <a:headEnd/>
+                    <a:tailEnd/>
+                  </a14:hiddenLine>
+                </a:ext>
+                <a:ext uri="{AF507438-7753-43E0-B8FC-AC1667EBCBE1}">
+                  <a14:hiddenEffects xmlns:a14="http://schemas.microsoft.com/office/drawing/2010/main">
+                    <a:effectLst>
+                      <a:outerShdw dist="35921" dir="2700000" algn="ctr" rotWithShape="0">
+                        <a:schemeClr val="bg2"/>
+                      </a:outerShdw>
+                    </a:effectLst>
+                  </a14:hiddenEffects>
+                </a:ext>
+              </a:extLst>
+            </p:spPr>
+          </p:pic>
+          <p:pic>
+            <p:nvPicPr>
+              <p:cNvPr id="9" name="Picture 3"/>
+              <p:cNvPicPr>
+                <a:picLocks noChangeAspect="1" noChangeArrowheads="1"/>
+              </p:cNvPicPr>
+              <p:nvPr/>
+            </p:nvPicPr>
+            <p:blipFill>
+              <a:blip r:embed="rId11" cstate="print">
+                <a:extLst>
+                  <a:ext uri="{28A0092B-C50C-407E-A947-70E740481C1C}">
+                    <a14:useLocalDpi xmlns:a14="http://schemas.microsoft.com/office/drawing/2010/main" val="0"/>
+                  </a:ext>
+                </a:extLst>
+              </a:blip>
+              <a:srcRect/>
+              <a:stretch>
+                <a:fillRect/>
+              </a:stretch>
+            </p:blipFill>
+            <p:spPr bwMode="auto">
+              <a:xfrm>
+                <a:off x="8546295" y="601451"/>
+                <a:ext cx="391052" cy="195526"/>
+              </a:xfrm>
+              <a:prstGeom prst="rect">
+                <a:avLst/>
+              </a:prstGeom>
+              <a:noFill/>
+              <a:ln>
+                <a:noFill/>
+              </a:ln>
+              <a:effectLst/>
+              <a:extLst>
+                <a:ext uri="{909E8E84-426E-40DD-AFC4-6F175D3DCCD1}">
+                  <a14:hiddenFill xmlns:a14="http://schemas.microsoft.com/office/drawing/2010/main">
+                    <a:solidFill>
+                      <a:schemeClr val="accent1"/>
+                    </a:solidFill>
+                  </a14:hiddenFill>
+                </a:ext>
+                <a:ext uri="{91240B29-F687-4F45-9708-019B960494DF}">
+                  <a14:hiddenLine xmlns:a14="http://schemas.microsoft.com/office/drawing/2010/main" w="9525">
+                    <a:solidFill>
+                      <a:schemeClr val="tx1"/>
+                    </a:solidFill>
+                    <a:miter lim="800000"/>
+                    <a:headEnd/>
+                    <a:tailEnd/>
+                  </a14:hiddenLine>
+                </a:ext>
+                <a:ext uri="{AF507438-7753-43E0-B8FC-AC1667EBCBE1}">
+                  <a14:hiddenEffects xmlns:a14="http://schemas.microsoft.com/office/drawing/2010/main">
+                    <a:effectLst>
+                      <a:outerShdw dist="35921" dir="2700000" algn="ctr" rotWithShape="0">
+                        <a:schemeClr val="bg2"/>
+                      </a:outerShdw>
+                    </a:effectLst>
+                  </a14:hiddenEffects>
+                </a:ext>
+              </a:extLst>
+            </p:spPr>
+          </p:pic>
+        </p:grpSp>
+        <p:sp>
+          <p:nvSpPr>
+            <p:cNvPr id="32" name="ZoneTexte 31"/>
+            <p:cNvSpPr txBox="1"/>
+            <p:nvPr/>
+          </p:nvSpPr>
+          <p:spPr>
+            <a:xfrm>
+              <a:off x="2398461" y="3961379"/>
+              <a:ext cx="535724" cy="369332"/>
+            </a:xfrm>
+            <a:prstGeom prst="rect">
+              <a:avLst/>
+            </a:prstGeom>
+            <a:noFill/>
+          </p:spPr>
+          <p:txBody>
+            <a:bodyPr wrap="none" rtlCol="0">
+              <a:spAutoFit/>
+            </a:bodyPr>
+            <a:lstStyle/>
+            <a:p>
+              <a:r>
+                <a:rPr lang="fr-FR" dirty="0" smtClean="0"/>
+                <a:t>125</a:t>
+              </a:r>
+              <a:endParaRPr lang="fr-FR" dirty="0"/>
+            </a:p>
+          </p:txBody>
+        </p:sp>
+        <p:cxnSp>
+          <p:nvCxnSpPr>
+            <p:cNvPr id="64" name="Connecteur droit avec flèche 63"/>
+            <p:cNvCxnSpPr/>
+            <p:nvPr/>
+          </p:nvCxnSpPr>
+          <p:spPr>
+            <a:xfrm flipV="1">
+              <a:off x="4168177" y="4383419"/>
+              <a:ext cx="0" cy="1505840"/>
+            </a:xfrm>
+            <a:prstGeom prst="straightConnector1">
+              <a:avLst/>
+            </a:prstGeom>
+            <a:ln w="38100">
+              <a:solidFill>
+                <a:schemeClr val="bg1">
+                  <a:lumMod val="50000"/>
+                </a:schemeClr>
+              </a:solidFill>
+              <a:tailEnd type="arrow"/>
+            </a:ln>
+          </p:spPr>
+          <p:style>
+            <a:lnRef idx="1">
+              <a:schemeClr val="accent1"/>
+            </a:lnRef>
+            <a:fillRef idx="0">
+              <a:schemeClr val="accent1"/>
+            </a:fillRef>
+            <a:effectRef idx="0">
+              <a:schemeClr val="accent1"/>
+            </a:effectRef>
+            <a:fontRef idx="minor">
+              <a:schemeClr val="tx1"/>
+            </a:fontRef>
+          </p:style>
+        </p:cxnSp>
+        <p:pic>
+          <p:nvPicPr>
+            <p:cNvPr id="65" name="Picture 3"/>
+            <p:cNvPicPr>
+              <a:picLocks noChangeAspect="1" noChangeArrowheads="1"/>
+            </p:cNvPicPr>
+            <p:nvPr/>
+          </p:nvPicPr>
+          <p:blipFill>
+            <a:blip r:embed="rId8" cstate="print">
+              <a:extLst>
+                <a:ext uri="{BEBA8EAE-BF5A-486C-A8C5-ECC9F3942E4B}">
+                  <a14:imgProps xmlns:a14="http://schemas.microsoft.com/office/drawing/2010/main">
+                    <a14:imgLayer r:embed="rId9">
+                      <a14:imgEffect>
+                        <a14:saturation sat="0"/>
+                      </a14:imgEffect>
+                    </a14:imgLayer>
+                  </a14:imgProps>
+                </a:ext>
+                <a:ext uri="{28A0092B-C50C-407E-A947-70E740481C1C}">
+                  <a14:useLocalDpi xmlns:a14="http://schemas.microsoft.com/office/drawing/2010/main" val="0"/>
+                </a:ext>
+              </a:extLst>
+            </a:blip>
+            <a:srcRect/>
+            <a:stretch>
+              <a:fillRect/>
+            </a:stretch>
+          </p:blipFill>
+          <p:spPr bwMode="auto">
+            <a:xfrm>
+              <a:off x="4043691" y="4008248"/>
+              <a:ext cx="302691" cy="320496"/>
+            </a:xfrm>
+            <a:prstGeom prst="rect">
+              <a:avLst/>
+            </a:prstGeom>
+            <a:noFill/>
+            <a:ln>
+              <a:noFill/>
+            </a:ln>
+            <a:effectLst/>
+            <a:extLst>
+              <a:ext uri="{909E8E84-426E-40DD-AFC4-6F175D3DCCD1}">
+                <a14:hiddenFill xmlns:a14="http://schemas.microsoft.com/office/drawing/2010/main">
+                  <a:solidFill>
+                    <a:schemeClr val="accent1"/>
+                  </a:solidFill>
+                </a14:hiddenFill>
+              </a:ext>
+              <a:ext uri="{91240B29-F687-4F45-9708-019B960494DF}">
+                <a14:hiddenLine xmlns:a14="http://schemas.microsoft.com/office/drawing/2010/main" w="9525">
+                  <a:solidFill>
+                    <a:schemeClr val="tx1"/>
+                  </a:solidFill>
+                  <a:miter lim="800000"/>
+                  <a:headEnd/>
+                  <a:tailEnd/>
+                </a14:hiddenLine>
+              </a:ext>
+              <a:ext uri="{AF507438-7753-43E0-B8FC-AC1667EBCBE1}">
+                <a14:hiddenEffects xmlns:a14="http://schemas.microsoft.com/office/drawing/2010/main">
+                  <a:effectLst>
+                    <a:outerShdw dist="35921" dir="2700000" algn="ctr" rotWithShape="0">
+                      <a:schemeClr val="bg2"/>
+                    </a:outerShdw>
+                  </a:effectLst>
+                </a14:hiddenEffects>
+              </a:ext>
+            </a:extLst>
+          </p:spPr>
+        </p:pic>
+      </p:grpSp>
+      <p:grpSp>
+        <p:nvGrpSpPr>
+          <p:cNvPr id="55" name="Groupe 54"/>
+          <p:cNvGrpSpPr/>
+          <p:nvPr/>
+        </p:nvGrpSpPr>
+        <p:grpSpPr>
+          <a:xfrm>
+            <a:off x="5783190" y="3068960"/>
+            <a:ext cx="3019526" cy="3303144"/>
+            <a:chOff x="5783190" y="3068960"/>
+            <a:chExt cx="3019526" cy="3303144"/>
+          </a:xfrm>
+        </p:grpSpPr>
+        <p:pic>
+          <p:nvPicPr>
+            <p:cNvPr id="11" name="Picture 2"/>
+            <p:cNvPicPr>
+              <a:picLocks noChangeAspect="1" noChangeArrowheads="1"/>
+            </p:cNvPicPr>
+            <p:nvPr/>
+          </p:nvPicPr>
+          <p:blipFill>
+            <a:blip r:embed="rId6">
+              <a:extLst>
+                <a:ext uri="{28A0092B-C50C-407E-A947-70E740481C1C}">
+                  <a14:useLocalDpi xmlns:a14="http://schemas.microsoft.com/office/drawing/2010/main" val="0"/>
+                </a:ext>
+              </a:extLst>
+            </a:blip>
+            <a:srcRect/>
+            <a:stretch>
+              <a:fillRect/>
+            </a:stretch>
+          </p:blipFill>
+          <p:spPr bwMode="auto">
+            <a:xfrm>
+              <a:off x="5783190" y="4175287"/>
+              <a:ext cx="589010" cy="422757"/>
+            </a:xfrm>
+            <a:prstGeom prst="rect">
+              <a:avLst/>
+            </a:prstGeom>
+            <a:noFill/>
+            <a:ln>
+              <a:noFill/>
+            </a:ln>
+            <a:extLst>
+              <a:ext uri="{909E8E84-426E-40DD-AFC4-6F175D3DCCD1}">
+                <a14:hiddenFill xmlns:a14="http://schemas.microsoft.com/office/drawing/2010/main">
+                  <a:solidFill>
+                    <a:schemeClr val="accent1"/>
+                  </a:solidFill>
+                </a14:hiddenFill>
+              </a:ext>
+              <a:ext uri="{91240B29-F687-4F45-9708-019B960494DF}">
+                <a14:hiddenLine xmlns:a14="http://schemas.microsoft.com/office/drawing/2010/main" w="9525">
+                  <a:solidFill>
+                    <a:schemeClr val="tx1"/>
+                  </a:solidFill>
+                  <a:miter lim="800000"/>
+                  <a:headEnd/>
+                  <a:tailEnd/>
+                </a14:hiddenLine>
+              </a:ext>
+            </a:extLst>
+          </p:spPr>
+        </p:pic>
+        <p:pic>
+          <p:nvPicPr>
+            <p:cNvPr id="1034" name="Picture 10"/>
+            <p:cNvPicPr>
+              <a:picLocks noChangeAspect="1" noChangeArrowheads="1"/>
+            </p:cNvPicPr>
+            <p:nvPr/>
+          </p:nvPicPr>
+          <p:blipFill>
+            <a:blip r:embed="rId14" cstate="print">
+              <a:extLst>
+                <a:ext uri="{28A0092B-C50C-407E-A947-70E740481C1C}">
+                  <a14:useLocalDpi xmlns:a14="http://schemas.microsoft.com/office/drawing/2010/main" val="0"/>
+                </a:ext>
+              </a:extLst>
+            </a:blip>
+            <a:srcRect/>
+            <a:stretch>
+              <a:fillRect/>
+            </a:stretch>
+          </p:blipFill>
+          <p:spPr bwMode="auto">
+            <a:xfrm>
+              <a:off x="6097974" y="4489916"/>
+              <a:ext cx="2617262" cy="1882188"/>
+            </a:xfrm>
+            <a:prstGeom prst="rect">
+              <a:avLst/>
+            </a:prstGeom>
+            <a:noFill/>
+            <a:ln>
+              <a:noFill/>
+            </a:ln>
+            <a:extLst>
+              <a:ext uri="{909E8E84-426E-40DD-AFC4-6F175D3DCCD1}">
+                <a14:hiddenFill xmlns:a14="http://schemas.microsoft.com/office/drawing/2010/main">
+                  <a:solidFill>
+                    <a:schemeClr val="accent1"/>
+                  </a:solidFill>
+                </a14:hiddenFill>
+              </a:ext>
+              <a:ext uri="{91240B29-F687-4F45-9708-019B960494DF}">
+                <a14:hiddenLine xmlns:a14="http://schemas.microsoft.com/office/drawing/2010/main" w="9525">
+                  <a:solidFill>
+                    <a:schemeClr val="tx1"/>
+                  </a:solidFill>
+                  <a:miter lim="800000"/>
+                  <a:headEnd/>
+                  <a:tailEnd/>
+                </a14:hiddenLine>
+              </a:ext>
+            </a:extLst>
+          </p:spPr>
+        </p:pic>
+        <p:sp>
+          <p:nvSpPr>
+            <p:cNvPr id="15" name="ZoneTexte 14"/>
+            <p:cNvSpPr txBox="1"/>
+            <p:nvPr/>
+          </p:nvSpPr>
+          <p:spPr>
+            <a:xfrm>
+              <a:off x="6859972" y="3068960"/>
+              <a:ext cx="1497654" cy="1477328"/>
+            </a:xfrm>
+            <a:prstGeom prst="rect">
+              <a:avLst/>
+            </a:prstGeom>
+            <a:noFill/>
+          </p:spPr>
+          <p:txBody>
+            <a:bodyPr wrap="none" rtlCol="0">
+              <a:spAutoFit/>
+            </a:bodyPr>
+            <a:lstStyle/>
+            <a:p>
+              <a:r>
+                <a:rPr lang="fr-FR" b="1" dirty="0" smtClean="0"/>
+                <a:t>Best situation</a:t>
+              </a:r>
+            </a:p>
+            <a:p>
+              <a:endParaRPr lang="fr-FR" dirty="0" smtClean="0"/>
+            </a:p>
+            <a:p>
+              <a:r>
+                <a:rPr lang="fr-FR" dirty="0" smtClean="0"/>
+                <a:t>50</a:t>
+              </a:r>
+            </a:p>
+            <a:p>
+              <a:r>
+                <a:rPr lang="fr-FR" dirty="0" smtClean="0"/>
+                <a:t>hIp1 = 0.7</a:t>
+              </a:r>
+            </a:p>
+            <a:p>
+              <a:r>
+                <a:rPr lang="fr-FR" dirty="0" smtClean="0"/>
+                <a:t>hRs1 = 0.4 </a:t>
+              </a:r>
+              <a:endParaRPr lang="fr-FR" dirty="0"/>
+            </a:p>
+          </p:txBody>
+        </p:sp>
+        <p:grpSp>
+          <p:nvGrpSpPr>
+            <p:cNvPr id="16" name="Groupe 15"/>
+            <p:cNvGrpSpPr/>
+            <p:nvPr/>
+          </p:nvGrpSpPr>
+          <p:grpSpPr>
+            <a:xfrm>
+              <a:off x="7236296" y="3429001"/>
+              <a:ext cx="648073" cy="576063"/>
+              <a:chOff x="7004183" y="720096"/>
+              <a:chExt cx="1661769" cy="1371296"/>
+            </a:xfrm>
+          </p:grpSpPr>
+          <p:pic>
+            <p:nvPicPr>
+              <p:cNvPr id="17" name="Picture 2"/>
+              <p:cNvPicPr>
+                <a:picLocks noChangeAspect="1" noChangeArrowheads="1"/>
+              </p:cNvPicPr>
+              <p:nvPr/>
+            </p:nvPicPr>
+            <p:blipFill>
+              <a:blip r:embed="rId10" cstate="print">
+                <a:extLst>
+                  <a:ext uri="{28A0092B-C50C-407E-A947-70E740481C1C}">
+                    <a14:useLocalDpi xmlns:a14="http://schemas.microsoft.com/office/drawing/2010/main" val="0"/>
+                  </a:ext>
+                </a:extLst>
+              </a:blip>
+              <a:srcRect/>
+              <a:stretch>
+                <a:fillRect/>
+              </a:stretch>
+            </p:blipFill>
+            <p:spPr bwMode="auto">
+              <a:xfrm>
+                <a:off x="7004183" y="720096"/>
+                <a:ext cx="1661769" cy="1371296"/>
+              </a:xfrm>
+              <a:prstGeom prst="rect">
+                <a:avLst/>
+              </a:prstGeom>
+              <a:noFill/>
+              <a:ln>
+                <a:noFill/>
+              </a:ln>
+              <a:effectLst/>
+              <a:extLst>
+                <a:ext uri="{909E8E84-426E-40DD-AFC4-6F175D3DCCD1}">
+                  <a14:hiddenFill xmlns:a14="http://schemas.microsoft.com/office/drawing/2010/main">
+                    <a:solidFill>
+                      <a:schemeClr val="accent1"/>
+                    </a:solidFill>
+                  </a14:hiddenFill>
+                </a:ext>
+                <a:ext uri="{91240B29-F687-4F45-9708-019B960494DF}">
+                  <a14:hiddenLine xmlns:a14="http://schemas.microsoft.com/office/drawing/2010/main" w="9525">
+                    <a:solidFill>
+                      <a:schemeClr val="tx1"/>
+                    </a:solidFill>
+                    <a:miter lim="800000"/>
+                    <a:headEnd/>
+                    <a:tailEnd/>
+                  </a14:hiddenLine>
+                </a:ext>
+                <a:ext uri="{AF507438-7753-43E0-B8FC-AC1667EBCBE1}">
+                  <a14:hiddenEffects xmlns:a14="http://schemas.microsoft.com/office/drawing/2010/main">
+                    <a:effectLst>
+                      <a:outerShdw dist="35921" dir="2700000" algn="ctr" rotWithShape="0">
+                        <a:schemeClr val="bg2"/>
+                      </a:outerShdw>
+                    </a:effectLst>
+                  </a14:hiddenEffects>
+                </a:ext>
+              </a:extLst>
+            </p:spPr>
+          </p:pic>
+          <p:pic>
+            <p:nvPicPr>
+              <p:cNvPr id="18" name="Picture 3"/>
+              <p:cNvPicPr>
+                <a:picLocks noChangeAspect="1" noChangeArrowheads="1"/>
+              </p:cNvPicPr>
+              <p:nvPr/>
+            </p:nvPicPr>
+            <p:blipFill>
+              <a:blip r:embed="rId11" cstate="print">
+                <a:extLst>
+                  <a:ext uri="{28A0092B-C50C-407E-A947-70E740481C1C}">
+                    <a14:useLocalDpi xmlns:a14="http://schemas.microsoft.com/office/drawing/2010/main" val="0"/>
+                  </a:ext>
+                </a:extLst>
+              </a:blip>
+              <a:srcRect/>
+              <a:stretch>
+                <a:fillRect/>
+              </a:stretch>
+            </p:blipFill>
+            <p:spPr bwMode="auto">
+              <a:xfrm>
+                <a:off x="8181234" y="772866"/>
+                <a:ext cx="391051" cy="195526"/>
+              </a:xfrm>
+              <a:prstGeom prst="rect">
+                <a:avLst/>
+              </a:prstGeom>
+              <a:noFill/>
+              <a:ln>
+                <a:noFill/>
+              </a:ln>
+              <a:effectLst/>
+              <a:extLst>
+                <a:ext uri="{909E8E84-426E-40DD-AFC4-6F175D3DCCD1}">
+                  <a14:hiddenFill xmlns:a14="http://schemas.microsoft.com/office/drawing/2010/main">
+                    <a:solidFill>
+                      <a:schemeClr val="accent1"/>
+                    </a:solidFill>
+                  </a14:hiddenFill>
+                </a:ext>
+                <a:ext uri="{91240B29-F687-4F45-9708-019B960494DF}">
+                  <a14:hiddenLine xmlns:a14="http://schemas.microsoft.com/office/drawing/2010/main" w="9525">
+                    <a:solidFill>
+                      <a:schemeClr val="tx1"/>
+                    </a:solidFill>
+                    <a:miter lim="800000"/>
+                    <a:headEnd/>
+                    <a:tailEnd/>
+                  </a14:hiddenLine>
+                </a:ext>
+                <a:ext uri="{AF507438-7753-43E0-B8FC-AC1667EBCBE1}">
+                  <a14:hiddenEffects xmlns:a14="http://schemas.microsoft.com/office/drawing/2010/main">
+                    <a:effectLst>
+                      <a:outerShdw dist="35921" dir="2700000" algn="ctr" rotWithShape="0">
+                        <a:schemeClr val="bg2"/>
+                      </a:outerShdw>
+                    </a:effectLst>
+                  </a14:hiddenEffects>
+                </a:ext>
+              </a:extLst>
+            </p:spPr>
+          </p:pic>
+        </p:grpSp>
+        <p:cxnSp>
+          <p:nvCxnSpPr>
+            <p:cNvPr id="66" name="Connecteur droit avec flèche 65"/>
+            <p:cNvCxnSpPr/>
+            <p:nvPr/>
+          </p:nvCxnSpPr>
+          <p:spPr>
+            <a:xfrm flipV="1">
+              <a:off x="8624511" y="4529193"/>
+              <a:ext cx="0" cy="1505840"/>
+            </a:xfrm>
+            <a:prstGeom prst="straightConnector1">
+              <a:avLst/>
+            </a:prstGeom>
+            <a:ln w="38100">
+              <a:solidFill>
+                <a:schemeClr val="bg1">
+                  <a:lumMod val="50000"/>
+                </a:schemeClr>
+              </a:solidFill>
+              <a:tailEnd type="arrow"/>
+            </a:ln>
+          </p:spPr>
+          <p:style>
+            <a:lnRef idx="1">
+              <a:schemeClr val="accent1"/>
+            </a:lnRef>
+            <a:fillRef idx="0">
+              <a:schemeClr val="accent1"/>
+            </a:fillRef>
+            <a:effectRef idx="0">
+              <a:schemeClr val="accent1"/>
+            </a:effectRef>
+            <a:fontRef idx="minor">
+              <a:schemeClr val="tx1"/>
+            </a:fontRef>
+          </p:style>
+        </p:cxnSp>
+        <p:pic>
+          <p:nvPicPr>
+            <p:cNvPr id="67" name="Picture 3"/>
+            <p:cNvPicPr>
+              <a:picLocks noChangeAspect="1" noChangeArrowheads="1"/>
+            </p:cNvPicPr>
+            <p:nvPr/>
+          </p:nvPicPr>
+          <p:blipFill>
+            <a:blip r:embed="rId8" cstate="print">
+              <a:extLst>
+                <a:ext uri="{BEBA8EAE-BF5A-486C-A8C5-ECC9F3942E4B}">
+                  <a14:imgProps xmlns:a14="http://schemas.microsoft.com/office/drawing/2010/main">
+                    <a14:imgLayer r:embed="rId9">
+                      <a14:imgEffect>
+                        <a14:saturation sat="0"/>
+                      </a14:imgEffect>
+                    </a14:imgLayer>
+                  </a14:imgProps>
+                </a:ext>
+                <a:ext uri="{28A0092B-C50C-407E-A947-70E740481C1C}">
+                  <a14:useLocalDpi xmlns:a14="http://schemas.microsoft.com/office/drawing/2010/main" val="0"/>
+                </a:ext>
+              </a:extLst>
+            </a:blip>
+            <a:srcRect/>
+            <a:stretch>
+              <a:fillRect/>
+            </a:stretch>
+          </p:blipFill>
+          <p:spPr bwMode="auto">
+            <a:xfrm>
+              <a:off x="8500025" y="4154022"/>
+              <a:ext cx="302691" cy="320496"/>
+            </a:xfrm>
+            <a:prstGeom prst="rect">
+              <a:avLst/>
+            </a:prstGeom>
+            <a:noFill/>
+            <a:ln>
+              <a:noFill/>
+            </a:ln>
+            <a:effectLst/>
+            <a:extLst>
+              <a:ext uri="{909E8E84-426E-40DD-AFC4-6F175D3DCCD1}">
+                <a14:hiddenFill xmlns:a14="http://schemas.microsoft.com/office/drawing/2010/main">
+                  <a:solidFill>
+                    <a:schemeClr val="accent1"/>
+                  </a:solidFill>
+                </a14:hiddenFill>
+              </a:ext>
+              <a:ext uri="{91240B29-F687-4F45-9708-019B960494DF}">
+                <a14:hiddenLine xmlns:a14="http://schemas.microsoft.com/office/drawing/2010/main" w="9525">
+                  <a:solidFill>
+                    <a:schemeClr val="tx1"/>
+                  </a:solidFill>
+                  <a:miter lim="800000"/>
+                  <a:headEnd/>
+                  <a:tailEnd/>
+                </a14:hiddenLine>
+              </a:ext>
+              <a:ext uri="{AF507438-7753-43E0-B8FC-AC1667EBCBE1}">
+                <a14:hiddenEffects xmlns:a14="http://schemas.microsoft.com/office/drawing/2010/main">
+                  <a:effectLst>
+                    <a:outerShdw dist="35921" dir="2700000" algn="ctr" rotWithShape="0">
+                      <a:schemeClr val="bg2"/>
+                    </a:outerShdw>
+                  </a:effectLst>
+                </a14:hiddenEffects>
+              </a:ext>
+            </a:extLst>
+          </p:spPr>
+        </p:pic>
+      </p:grpSp>
     </p:spTree>
     <p:extLst>
       <p:ext uri="{BB962C8B-B14F-4D97-AF65-F5344CB8AC3E}">
@@ -5994,7 +8653,171 @@
   <p:timing>
     <p:tnLst>
       <p:par>
-        <p:cTn id="1" dur="indefinite" restart="never" nodeType="tmRoot"/>
+        <p:cTn id="1" dur="indefinite" restart="never" nodeType="tmRoot">
+          <p:childTnLst>
+            <p:seq concurrent="1" nextAc="seek">
+              <p:cTn id="2" dur="indefinite" nodeType="mainSeq">
+                <p:childTnLst>
+                  <p:par>
+                    <p:cTn id="3" fill="hold">
+                      <p:stCondLst>
+                        <p:cond delay="indefinite"/>
+                      </p:stCondLst>
+                      <p:childTnLst>
+                        <p:par>
+                          <p:cTn id="4" fill="hold">
+                            <p:stCondLst>
+                              <p:cond delay="0"/>
+                            </p:stCondLst>
+                            <p:childTnLst>
+                              <p:par>
+                                <p:cTn id="5" presetID="10" presetClass="entr" presetSubtype="0" fill="hold" nodeType="clickEffect">
+                                  <p:stCondLst>
+                                    <p:cond delay="0"/>
+                                  </p:stCondLst>
+                                  <p:childTnLst>
+                                    <p:set>
+                                      <p:cBhvr>
+                                        <p:cTn id="6" dur="1" fill="hold">
+                                          <p:stCondLst>
+                                            <p:cond delay="0"/>
+                                          </p:stCondLst>
+                                        </p:cTn>
+                                        <p:tgtEl>
+                                          <p:spTgt spid="57"/>
+                                        </p:tgtEl>
+                                        <p:attrNameLst>
+                                          <p:attrName>style.visibility</p:attrName>
+                                        </p:attrNameLst>
+                                      </p:cBhvr>
+                                      <p:to>
+                                        <p:strVal val="visible"/>
+                                      </p:to>
+                                    </p:set>
+                                    <p:animEffect transition="in" filter="fade">
+                                      <p:cBhvr>
+                                        <p:cTn id="7" dur="500"/>
+                                        <p:tgtEl>
+                                          <p:spTgt spid="57"/>
+                                        </p:tgtEl>
+                                      </p:cBhvr>
+                                    </p:animEffect>
+                                  </p:childTnLst>
+                                </p:cTn>
+                              </p:par>
+                              <p:par>
+                                <p:cTn id="8" presetID="10" presetClass="entr" presetSubtype="0" fill="hold" nodeType="withEffect">
+                                  <p:stCondLst>
+                                    <p:cond delay="0"/>
+                                  </p:stCondLst>
+                                  <p:childTnLst>
+                                    <p:set>
+                                      <p:cBhvr>
+                                        <p:cTn id="9" dur="1" fill="hold">
+                                          <p:stCondLst>
+                                            <p:cond delay="0"/>
+                                          </p:stCondLst>
+                                        </p:cTn>
+                                        <p:tgtEl>
+                                          <p:spTgt spid="53"/>
+                                        </p:tgtEl>
+                                        <p:attrNameLst>
+                                          <p:attrName>style.visibility</p:attrName>
+                                        </p:attrNameLst>
+                                      </p:cBhvr>
+                                      <p:to>
+                                        <p:strVal val="visible"/>
+                                      </p:to>
+                                    </p:set>
+                                    <p:animEffect transition="in" filter="fade">
+                                      <p:cBhvr>
+                                        <p:cTn id="10" dur="500"/>
+                                        <p:tgtEl>
+                                          <p:spTgt spid="53"/>
+                                        </p:tgtEl>
+                                      </p:cBhvr>
+                                    </p:animEffect>
+                                  </p:childTnLst>
+                                </p:cTn>
+                              </p:par>
+                            </p:childTnLst>
+                          </p:cTn>
+                        </p:par>
+                      </p:childTnLst>
+                    </p:cTn>
+                  </p:par>
+                  <p:par>
+                    <p:cTn id="11" fill="hold">
+                      <p:stCondLst>
+                        <p:cond delay="indefinite"/>
+                      </p:stCondLst>
+                      <p:childTnLst>
+                        <p:par>
+                          <p:cTn id="12" fill="hold">
+                            <p:stCondLst>
+                              <p:cond delay="0"/>
+                            </p:stCondLst>
+                            <p:childTnLst>
+                              <p:par>
+                                <p:cTn id="13" presetID="10" presetClass="entr" presetSubtype="0" fill="hold" nodeType="clickEffect">
+                                  <p:stCondLst>
+                                    <p:cond delay="0"/>
+                                  </p:stCondLst>
+                                  <p:childTnLst>
+                                    <p:set>
+                                      <p:cBhvr>
+                                        <p:cTn id="14" dur="1" fill="hold">
+                                          <p:stCondLst>
+                                            <p:cond delay="0"/>
+                                          </p:stCondLst>
+                                        </p:cTn>
+                                        <p:tgtEl>
+                                          <p:spTgt spid="55"/>
+                                        </p:tgtEl>
+                                        <p:attrNameLst>
+                                          <p:attrName>style.visibility</p:attrName>
+                                        </p:attrNameLst>
+                                      </p:cBhvr>
+                                      <p:to>
+                                        <p:strVal val="visible"/>
+                                      </p:to>
+                                    </p:set>
+                                    <p:animEffect transition="in" filter="fade">
+                                      <p:cBhvr>
+                                        <p:cTn id="15" dur="500"/>
+                                        <p:tgtEl>
+                                          <p:spTgt spid="55"/>
+                                        </p:tgtEl>
+                                      </p:cBhvr>
+                                    </p:animEffect>
+                                  </p:childTnLst>
+                                </p:cTn>
+                              </p:par>
+                            </p:childTnLst>
+                          </p:cTn>
+                        </p:par>
+                      </p:childTnLst>
+                    </p:cTn>
+                  </p:par>
+                </p:childTnLst>
+              </p:cTn>
+              <p:prevCondLst>
+                <p:cond evt="onPrev" delay="0">
+                  <p:tgtEl>
+                    <p:sldTgt/>
+                  </p:tgtEl>
+                </p:cond>
+              </p:prevCondLst>
+              <p:nextCondLst>
+                <p:cond evt="onNext" delay="0">
+                  <p:tgtEl>
+                    <p:sldTgt/>
+                  </p:tgtEl>
+                </p:cond>
+              </p:nextCondLst>
+            </p:seq>
+          </p:childTnLst>
+        </p:cTn>
       </p:par>
     </p:tnLst>
   </p:timing>
@@ -6037,6 +8860,10 @@
               <a:rPr lang="fr-FR" dirty="0" err="1" smtClean="0"/>
               <a:t>Understandings</a:t>
             </a:r>
+            <a:r>
+              <a:rPr lang="fr-FR" dirty="0" smtClean="0"/>
+              <a:t> 1</a:t>
+            </a:r>
             <a:endParaRPr lang="fr-FR" dirty="0"/>
           </a:p>
         </p:txBody>
@@ -6056,7 +8883,32 @@
           <a:bodyPr/>
           <a:lstStyle/>
           <a:p>
-            <a:endParaRPr lang="fr-FR"/>
+            <a:r>
+              <a:rPr lang="fr-FR" dirty="0" smtClean="0"/>
+              <a:t>Importance of information </a:t>
+            </a:r>
+            <a:br>
+              <a:rPr lang="fr-FR" dirty="0" smtClean="0"/>
+            </a:br>
+            <a:r>
+              <a:rPr lang="fr-FR" dirty="0" smtClean="0"/>
+              <a:t>(No information = All </a:t>
+            </a:r>
+            <a:r>
+              <a:rPr lang="fr-FR" dirty="0" err="1" smtClean="0"/>
+              <a:t>zombified</a:t>
+            </a:r>
+            <a:r>
+              <a:rPr lang="fr-FR" dirty="0" smtClean="0"/>
+              <a:t>)</a:t>
+            </a:r>
+          </a:p>
+          <a:p>
+            <a:r>
+              <a:rPr lang="fr-FR" dirty="0" smtClean="0"/>
+              <a:t>No</a:t>
+            </a:r>
+            <a:endParaRPr lang="fr-FR" dirty="0"/>
           </a:p>
         </p:txBody>
       </p:sp>

</xml_diff>

<commit_message>
Update Social benefits of slow food.pptx
</commit_message>
<xml_diff>
--- a/Social benefits of slow food.pptx
+++ b/Social benefits of slow food.pptx
@@ -5,7 +5,7 @@
     <p:sldMasterId id="2147483648" r:id="rId1"/>
   </p:sldMasterIdLst>
   <p:notesMasterIdLst>
-    <p:notesMasterId r:id="rId11"/>
+    <p:notesMasterId r:id="rId12"/>
   </p:notesMasterIdLst>
   <p:sldIdLst>
     <p:sldId id="256" r:id="rId2"/>
@@ -17,6 +17,7 @@
     <p:sldId id="263" r:id="rId8"/>
     <p:sldId id="264" r:id="rId9"/>
     <p:sldId id="261" r:id="rId10"/>
+    <p:sldId id="265" r:id="rId11"/>
   </p:sldIdLst>
   <p:sldSz cx="9144000" cy="6858000" type="screen4x3"/>
   <p:notesSz cx="6858000" cy="9144000"/>
@@ -115,6 +116,22 @@
       </a:defRPr>
     </a:lvl9pPr>
   </p:defaultTextStyle>
+  <p:extLst>
+    <p:ext uri="{EFAFB233-063F-42B5-8137-9DF3F51BA10A}">
+      <p15:sldGuideLst xmlns:p15="http://schemas.microsoft.com/office/powerpoint/2012/main">
+        <p15:guide id="1" orient="horz" pos="2160">
+          <p15:clr>
+            <a:srgbClr val="A4A3A4"/>
+          </p15:clr>
+        </p15:guide>
+        <p15:guide id="2" pos="2880">
+          <p15:clr>
+            <a:srgbClr val="A4A3A4"/>
+          </p15:clr>
+        </p15:guide>
+      </p15:sldGuideLst>
+    </p:ext>
+  </p:extLst>
 </p:presentation>
 </file>
 
@@ -264,38 +281,37 @@
           <a:p>
             <a:pPr lvl="0"/>
             <a:r>
-              <a:rPr lang="fr-FR" smtClean="0"/>
+              <a:rPr lang="fr-FR"/>
               <a:t>Modifiez les styles du texte du masque</a:t>
             </a:r>
           </a:p>
           <a:p>
             <a:pPr lvl="1"/>
             <a:r>
-              <a:rPr lang="fr-FR" smtClean="0"/>
+              <a:rPr lang="fr-FR"/>
               <a:t>Deuxième niveau</a:t>
             </a:r>
           </a:p>
           <a:p>
             <a:pPr lvl="2"/>
             <a:r>
-              <a:rPr lang="fr-FR" smtClean="0"/>
+              <a:rPr lang="fr-FR"/>
               <a:t>Troisième niveau</a:t>
             </a:r>
           </a:p>
           <a:p>
             <a:pPr lvl="3"/>
             <a:r>
-              <a:rPr lang="fr-FR" smtClean="0"/>
+              <a:rPr lang="fr-FR"/>
               <a:t>Quatrième niveau</a:t>
             </a:r>
           </a:p>
           <a:p>
             <a:pPr lvl="4"/>
             <a:r>
-              <a:rPr lang="fr-FR" smtClean="0"/>
+              <a:rPr lang="fr-FR"/>
               <a:t>Cinquième niveau</a:t>
             </a:r>
-            <a:endParaRPr lang="fr-FR"/>
           </a:p>
         </p:txBody>
       </p:sp>
@@ -359,7 +375,7 @@
           <a:p>
             <a:fld id="{3AC042D1-47B9-4461-9CC1-4CF3D8848342}" type="slidenum">
               <a:rPr lang="fr-FR" smtClean="0"/>
-              <a:t>‹N°›</a:t>
+              <a:t>‹#›</a:t>
             </a:fld>
             <a:endParaRPr lang="fr-FR"/>
           </a:p>
@@ -513,14 +529,13 @@
           <a:lstStyle/>
           <a:p>
             <a:r>
-              <a:rPr lang="fr-FR" dirty="0" smtClean="0"/>
+              <a:rPr lang="fr-FR" dirty="0"/>
               <a:t>2155 </a:t>
             </a:r>
             <a:r>
-              <a:rPr lang="fr-FR" smtClean="0"/>
+              <a:rPr lang="fr-FR"/>
               <a:t>generations</a:t>
             </a:r>
-            <a:endParaRPr lang="fr-FR"/>
           </a:p>
         </p:txBody>
       </p:sp>
@@ -598,10 +613,9 @@
           <a:lstStyle/>
           <a:p>
             <a:r>
-              <a:rPr lang="fr-FR" smtClean="0"/>
+              <a:rPr lang="fr-FR"/>
               <a:t>Modifiez le style du titre</a:t>
             </a:r>
-            <a:endParaRPr lang="fr-FR"/>
           </a:p>
         </p:txBody>
       </p:sp>
@@ -717,10 +731,9 @@
           </a:lstStyle>
           <a:p>
             <a:r>
-              <a:rPr lang="fr-FR" smtClean="0"/>
+              <a:rPr lang="fr-FR"/>
               <a:t>Modifiez le style des sous-titres du masque</a:t>
             </a:r>
-            <a:endParaRPr lang="fr-FR"/>
           </a:p>
         </p:txBody>
       </p:sp>
@@ -741,7 +754,7 @@
           <a:p>
             <a:fld id="{6589E675-B608-40FC-9A11-F47021A3FB4E}" type="datetimeFigureOut">
               <a:rPr lang="fr-FR" smtClean="0"/>
-              <a:t>27/06/2019</a:t>
+              <a:t>28/06/2019</a:t>
             </a:fld>
             <a:endParaRPr lang="fr-FR"/>
           </a:p>
@@ -783,7 +796,7 @@
           <a:p>
             <a:fld id="{A1E65BF9-7A8D-417B-AB72-F483C51F4DD3}" type="slidenum">
               <a:rPr lang="fr-FR" smtClean="0"/>
-              <a:t>‹N°›</a:t>
+              <a:t>‹#›</a:t>
             </a:fld>
             <a:endParaRPr lang="fr-FR"/>
           </a:p>
@@ -835,10 +848,9 @@
           <a:lstStyle/>
           <a:p>
             <a:r>
-              <a:rPr lang="fr-FR" smtClean="0"/>
+              <a:rPr lang="fr-FR"/>
               <a:t>Modifiez le style du titre</a:t>
             </a:r>
-            <a:endParaRPr lang="fr-FR"/>
           </a:p>
         </p:txBody>
       </p:sp>
@@ -859,38 +871,37 @@
           <a:p>
             <a:pPr lvl="0"/>
             <a:r>
-              <a:rPr lang="fr-FR" smtClean="0"/>
+              <a:rPr lang="fr-FR"/>
               <a:t>Modifiez les styles du texte du masque</a:t>
             </a:r>
           </a:p>
           <a:p>
             <a:pPr lvl="1"/>
             <a:r>
-              <a:rPr lang="fr-FR" smtClean="0"/>
+              <a:rPr lang="fr-FR"/>
               <a:t>Deuxième niveau</a:t>
             </a:r>
           </a:p>
           <a:p>
             <a:pPr lvl="2"/>
             <a:r>
-              <a:rPr lang="fr-FR" smtClean="0"/>
+              <a:rPr lang="fr-FR"/>
               <a:t>Troisième niveau</a:t>
             </a:r>
           </a:p>
           <a:p>
             <a:pPr lvl="3"/>
             <a:r>
-              <a:rPr lang="fr-FR" smtClean="0"/>
+              <a:rPr lang="fr-FR"/>
               <a:t>Quatrième niveau</a:t>
             </a:r>
           </a:p>
           <a:p>
             <a:pPr lvl="4"/>
             <a:r>
-              <a:rPr lang="fr-FR" smtClean="0"/>
+              <a:rPr lang="fr-FR"/>
               <a:t>Cinquième niveau</a:t>
             </a:r>
-            <a:endParaRPr lang="fr-FR"/>
           </a:p>
         </p:txBody>
       </p:sp>
@@ -911,7 +922,7 @@
           <a:p>
             <a:fld id="{6589E675-B608-40FC-9A11-F47021A3FB4E}" type="datetimeFigureOut">
               <a:rPr lang="fr-FR" smtClean="0"/>
-              <a:t>27/06/2019</a:t>
+              <a:t>28/06/2019</a:t>
             </a:fld>
             <a:endParaRPr lang="fr-FR"/>
           </a:p>
@@ -953,7 +964,7 @@
           <a:p>
             <a:fld id="{A1E65BF9-7A8D-417B-AB72-F483C51F4DD3}" type="slidenum">
               <a:rPr lang="fr-FR" smtClean="0"/>
-              <a:t>‹N°›</a:t>
+              <a:t>‹#›</a:t>
             </a:fld>
             <a:endParaRPr lang="fr-FR"/>
           </a:p>
@@ -1010,10 +1021,9 @@
           <a:lstStyle/>
           <a:p>
             <a:r>
-              <a:rPr lang="fr-FR" smtClean="0"/>
+              <a:rPr lang="fr-FR"/>
               <a:t>Modifiez le style du titre</a:t>
             </a:r>
-            <a:endParaRPr lang="fr-FR"/>
           </a:p>
         </p:txBody>
       </p:sp>
@@ -1039,38 +1049,37 @@
           <a:p>
             <a:pPr lvl="0"/>
             <a:r>
-              <a:rPr lang="fr-FR" smtClean="0"/>
+              <a:rPr lang="fr-FR"/>
               <a:t>Modifiez les styles du texte du masque</a:t>
             </a:r>
           </a:p>
           <a:p>
             <a:pPr lvl="1"/>
             <a:r>
-              <a:rPr lang="fr-FR" smtClean="0"/>
+              <a:rPr lang="fr-FR"/>
               <a:t>Deuxième niveau</a:t>
             </a:r>
           </a:p>
           <a:p>
             <a:pPr lvl="2"/>
             <a:r>
-              <a:rPr lang="fr-FR" smtClean="0"/>
+              <a:rPr lang="fr-FR"/>
               <a:t>Troisième niveau</a:t>
             </a:r>
           </a:p>
           <a:p>
             <a:pPr lvl="3"/>
             <a:r>
-              <a:rPr lang="fr-FR" smtClean="0"/>
+              <a:rPr lang="fr-FR"/>
               <a:t>Quatrième niveau</a:t>
             </a:r>
           </a:p>
           <a:p>
             <a:pPr lvl="4"/>
             <a:r>
-              <a:rPr lang="fr-FR" smtClean="0"/>
+              <a:rPr lang="fr-FR"/>
               <a:t>Cinquième niveau</a:t>
             </a:r>
-            <a:endParaRPr lang="fr-FR"/>
           </a:p>
         </p:txBody>
       </p:sp>
@@ -1091,7 +1100,7 @@
           <a:p>
             <a:fld id="{6589E675-B608-40FC-9A11-F47021A3FB4E}" type="datetimeFigureOut">
               <a:rPr lang="fr-FR" smtClean="0"/>
-              <a:t>27/06/2019</a:t>
+              <a:t>28/06/2019</a:t>
             </a:fld>
             <a:endParaRPr lang="fr-FR"/>
           </a:p>
@@ -1133,7 +1142,7 @@
           <a:p>
             <a:fld id="{A1E65BF9-7A8D-417B-AB72-F483C51F4DD3}" type="slidenum">
               <a:rPr lang="fr-FR" smtClean="0"/>
-              <a:t>‹N°›</a:t>
+              <a:t>‹#›</a:t>
             </a:fld>
             <a:endParaRPr lang="fr-FR"/>
           </a:p>
@@ -1185,10 +1194,9 @@
           <a:lstStyle/>
           <a:p>
             <a:r>
-              <a:rPr lang="fr-FR" smtClean="0"/>
+              <a:rPr lang="fr-FR"/>
               <a:t>Modifiez le style du titre</a:t>
             </a:r>
-            <a:endParaRPr lang="fr-FR"/>
           </a:p>
         </p:txBody>
       </p:sp>
@@ -1209,38 +1217,37 @@
           <a:p>
             <a:pPr lvl="0"/>
             <a:r>
-              <a:rPr lang="fr-FR" smtClean="0"/>
+              <a:rPr lang="fr-FR"/>
               <a:t>Modifiez les styles du texte du masque</a:t>
             </a:r>
           </a:p>
           <a:p>
             <a:pPr lvl="1"/>
             <a:r>
-              <a:rPr lang="fr-FR" smtClean="0"/>
+              <a:rPr lang="fr-FR"/>
               <a:t>Deuxième niveau</a:t>
             </a:r>
           </a:p>
           <a:p>
             <a:pPr lvl="2"/>
             <a:r>
-              <a:rPr lang="fr-FR" smtClean="0"/>
+              <a:rPr lang="fr-FR"/>
               <a:t>Troisième niveau</a:t>
             </a:r>
           </a:p>
           <a:p>
             <a:pPr lvl="3"/>
             <a:r>
-              <a:rPr lang="fr-FR" smtClean="0"/>
+              <a:rPr lang="fr-FR"/>
               <a:t>Quatrième niveau</a:t>
             </a:r>
           </a:p>
           <a:p>
             <a:pPr lvl="4"/>
             <a:r>
-              <a:rPr lang="fr-FR" smtClean="0"/>
+              <a:rPr lang="fr-FR"/>
               <a:t>Cinquième niveau</a:t>
             </a:r>
-            <a:endParaRPr lang="fr-FR"/>
           </a:p>
         </p:txBody>
       </p:sp>
@@ -1261,7 +1268,7 @@
           <a:p>
             <a:fld id="{6589E675-B608-40FC-9A11-F47021A3FB4E}" type="datetimeFigureOut">
               <a:rPr lang="fr-FR" smtClean="0"/>
-              <a:t>27/06/2019</a:t>
+              <a:t>28/06/2019</a:t>
             </a:fld>
             <a:endParaRPr lang="fr-FR"/>
           </a:p>
@@ -1303,7 +1310,7 @@
           <a:p>
             <a:fld id="{A1E65BF9-7A8D-417B-AB72-F483C51F4DD3}" type="slidenum">
               <a:rPr lang="fr-FR" smtClean="0"/>
-              <a:t>‹N°›</a:t>
+              <a:t>‹#›</a:t>
             </a:fld>
             <a:endParaRPr lang="fr-FR"/>
           </a:p>
@@ -1364,10 +1371,9 @@
           </a:lstStyle>
           <a:p>
             <a:r>
-              <a:rPr lang="fr-FR" smtClean="0"/>
+              <a:rPr lang="fr-FR"/>
               <a:t>Modifiez le style du titre</a:t>
             </a:r>
-            <a:endParaRPr lang="fr-FR"/>
           </a:p>
         </p:txBody>
       </p:sp>
@@ -1484,7 +1490,7 @@
           <a:p>
             <a:pPr lvl="0"/>
             <a:r>
-              <a:rPr lang="fr-FR" smtClean="0"/>
+              <a:rPr lang="fr-FR"/>
               <a:t>Modifiez les styles du texte du masque</a:t>
             </a:r>
           </a:p>
@@ -1507,7 +1513,7 @@
           <a:p>
             <a:fld id="{6589E675-B608-40FC-9A11-F47021A3FB4E}" type="datetimeFigureOut">
               <a:rPr lang="fr-FR" smtClean="0"/>
-              <a:t>27/06/2019</a:t>
+              <a:t>28/06/2019</a:t>
             </a:fld>
             <a:endParaRPr lang="fr-FR"/>
           </a:p>
@@ -1549,7 +1555,7 @@
           <a:p>
             <a:fld id="{A1E65BF9-7A8D-417B-AB72-F483C51F4DD3}" type="slidenum">
               <a:rPr lang="fr-FR" smtClean="0"/>
-              <a:t>‹N°›</a:t>
+              <a:t>‹#›</a:t>
             </a:fld>
             <a:endParaRPr lang="fr-FR"/>
           </a:p>
@@ -1601,10 +1607,9 @@
           <a:lstStyle/>
           <a:p>
             <a:r>
-              <a:rPr lang="fr-FR" smtClean="0"/>
+              <a:rPr lang="fr-FR"/>
               <a:t>Modifiez le style du titre</a:t>
             </a:r>
-            <a:endParaRPr lang="fr-FR"/>
           </a:p>
         </p:txBody>
       </p:sp>
@@ -1658,38 +1663,37 @@
           <a:p>
             <a:pPr lvl="0"/>
             <a:r>
-              <a:rPr lang="fr-FR" smtClean="0"/>
+              <a:rPr lang="fr-FR"/>
               <a:t>Modifiez les styles du texte du masque</a:t>
             </a:r>
           </a:p>
           <a:p>
             <a:pPr lvl="1"/>
             <a:r>
-              <a:rPr lang="fr-FR" smtClean="0"/>
+              <a:rPr lang="fr-FR"/>
               <a:t>Deuxième niveau</a:t>
             </a:r>
           </a:p>
           <a:p>
             <a:pPr lvl="2"/>
             <a:r>
-              <a:rPr lang="fr-FR" smtClean="0"/>
+              <a:rPr lang="fr-FR"/>
               <a:t>Troisième niveau</a:t>
             </a:r>
           </a:p>
           <a:p>
             <a:pPr lvl="3"/>
             <a:r>
-              <a:rPr lang="fr-FR" smtClean="0"/>
+              <a:rPr lang="fr-FR"/>
               <a:t>Quatrième niveau</a:t>
             </a:r>
           </a:p>
           <a:p>
             <a:pPr lvl="4"/>
             <a:r>
-              <a:rPr lang="fr-FR" smtClean="0"/>
+              <a:rPr lang="fr-FR"/>
               <a:t>Cinquième niveau</a:t>
             </a:r>
-            <a:endParaRPr lang="fr-FR"/>
           </a:p>
         </p:txBody>
       </p:sp>
@@ -1743,38 +1747,37 @@
           <a:p>
             <a:pPr lvl="0"/>
             <a:r>
-              <a:rPr lang="fr-FR" smtClean="0"/>
+              <a:rPr lang="fr-FR"/>
               <a:t>Modifiez les styles du texte du masque</a:t>
             </a:r>
           </a:p>
           <a:p>
             <a:pPr lvl="1"/>
             <a:r>
-              <a:rPr lang="fr-FR" smtClean="0"/>
+              <a:rPr lang="fr-FR"/>
               <a:t>Deuxième niveau</a:t>
             </a:r>
           </a:p>
           <a:p>
             <a:pPr lvl="2"/>
             <a:r>
-              <a:rPr lang="fr-FR" smtClean="0"/>
+              <a:rPr lang="fr-FR"/>
               <a:t>Troisième niveau</a:t>
             </a:r>
           </a:p>
           <a:p>
             <a:pPr lvl="3"/>
             <a:r>
-              <a:rPr lang="fr-FR" smtClean="0"/>
+              <a:rPr lang="fr-FR"/>
               <a:t>Quatrième niveau</a:t>
             </a:r>
           </a:p>
           <a:p>
             <a:pPr lvl="4"/>
             <a:r>
-              <a:rPr lang="fr-FR" smtClean="0"/>
+              <a:rPr lang="fr-FR"/>
               <a:t>Cinquième niveau</a:t>
             </a:r>
-            <a:endParaRPr lang="fr-FR"/>
           </a:p>
         </p:txBody>
       </p:sp>
@@ -1795,7 +1798,7 @@
           <a:p>
             <a:fld id="{6589E675-B608-40FC-9A11-F47021A3FB4E}" type="datetimeFigureOut">
               <a:rPr lang="fr-FR" smtClean="0"/>
-              <a:t>27/06/2019</a:t>
+              <a:t>28/06/2019</a:t>
             </a:fld>
             <a:endParaRPr lang="fr-FR"/>
           </a:p>
@@ -1837,7 +1840,7 @@
           <a:p>
             <a:fld id="{A1E65BF9-7A8D-417B-AB72-F483C51F4DD3}" type="slidenum">
               <a:rPr lang="fr-FR" smtClean="0"/>
-              <a:t>‹N°›</a:t>
+              <a:t>‹#›</a:t>
             </a:fld>
             <a:endParaRPr lang="fr-FR"/>
           </a:p>
@@ -1893,10 +1896,9 @@
           </a:lstStyle>
           <a:p>
             <a:r>
-              <a:rPr lang="fr-FR" smtClean="0"/>
+              <a:rPr lang="fr-FR"/>
               <a:t>Modifiez le style du titre</a:t>
             </a:r>
-            <a:endParaRPr lang="fr-FR"/>
           </a:p>
         </p:txBody>
       </p:sp>
@@ -1959,7 +1961,7 @@
           <a:p>
             <a:pPr lvl="0"/>
             <a:r>
-              <a:rPr lang="fr-FR" smtClean="0"/>
+              <a:rPr lang="fr-FR"/>
               <a:t>Modifiez les styles du texte du masque</a:t>
             </a:r>
           </a:p>
@@ -2015,38 +2017,37 @@
           <a:p>
             <a:pPr lvl="0"/>
             <a:r>
-              <a:rPr lang="fr-FR" smtClean="0"/>
+              <a:rPr lang="fr-FR"/>
               <a:t>Modifiez les styles du texte du masque</a:t>
             </a:r>
           </a:p>
           <a:p>
             <a:pPr lvl="1"/>
             <a:r>
-              <a:rPr lang="fr-FR" smtClean="0"/>
+              <a:rPr lang="fr-FR"/>
               <a:t>Deuxième niveau</a:t>
             </a:r>
           </a:p>
           <a:p>
             <a:pPr lvl="2"/>
             <a:r>
-              <a:rPr lang="fr-FR" smtClean="0"/>
+              <a:rPr lang="fr-FR"/>
               <a:t>Troisième niveau</a:t>
             </a:r>
           </a:p>
           <a:p>
             <a:pPr lvl="3"/>
             <a:r>
-              <a:rPr lang="fr-FR" smtClean="0"/>
+              <a:rPr lang="fr-FR"/>
               <a:t>Quatrième niveau</a:t>
             </a:r>
           </a:p>
           <a:p>
             <a:pPr lvl="4"/>
             <a:r>
-              <a:rPr lang="fr-FR" smtClean="0"/>
+              <a:rPr lang="fr-FR"/>
               <a:t>Cinquième niveau</a:t>
             </a:r>
-            <a:endParaRPr lang="fr-FR"/>
           </a:p>
         </p:txBody>
       </p:sp>
@@ -2109,7 +2110,7 @@
           <a:p>
             <a:pPr lvl="0"/>
             <a:r>
-              <a:rPr lang="fr-FR" smtClean="0"/>
+              <a:rPr lang="fr-FR"/>
               <a:t>Modifiez les styles du texte du masque</a:t>
             </a:r>
           </a:p>
@@ -2165,38 +2166,37 @@
           <a:p>
             <a:pPr lvl="0"/>
             <a:r>
-              <a:rPr lang="fr-FR" smtClean="0"/>
+              <a:rPr lang="fr-FR"/>
               <a:t>Modifiez les styles du texte du masque</a:t>
             </a:r>
           </a:p>
           <a:p>
             <a:pPr lvl="1"/>
             <a:r>
-              <a:rPr lang="fr-FR" smtClean="0"/>
+              <a:rPr lang="fr-FR"/>
               <a:t>Deuxième niveau</a:t>
             </a:r>
           </a:p>
           <a:p>
             <a:pPr lvl="2"/>
             <a:r>
-              <a:rPr lang="fr-FR" smtClean="0"/>
+              <a:rPr lang="fr-FR"/>
               <a:t>Troisième niveau</a:t>
             </a:r>
           </a:p>
           <a:p>
             <a:pPr lvl="3"/>
             <a:r>
-              <a:rPr lang="fr-FR" smtClean="0"/>
+              <a:rPr lang="fr-FR"/>
               <a:t>Quatrième niveau</a:t>
             </a:r>
           </a:p>
           <a:p>
             <a:pPr lvl="4"/>
             <a:r>
-              <a:rPr lang="fr-FR" smtClean="0"/>
+              <a:rPr lang="fr-FR"/>
               <a:t>Cinquième niveau</a:t>
             </a:r>
-            <a:endParaRPr lang="fr-FR"/>
           </a:p>
         </p:txBody>
       </p:sp>
@@ -2217,7 +2217,7 @@
           <a:p>
             <a:fld id="{6589E675-B608-40FC-9A11-F47021A3FB4E}" type="datetimeFigureOut">
               <a:rPr lang="fr-FR" smtClean="0"/>
-              <a:t>27/06/2019</a:t>
+              <a:t>28/06/2019</a:t>
             </a:fld>
             <a:endParaRPr lang="fr-FR"/>
           </a:p>
@@ -2259,7 +2259,7 @@
           <a:p>
             <a:fld id="{A1E65BF9-7A8D-417B-AB72-F483C51F4DD3}" type="slidenum">
               <a:rPr lang="fr-FR" smtClean="0"/>
-              <a:t>‹N°›</a:t>
+              <a:t>‹#›</a:t>
             </a:fld>
             <a:endParaRPr lang="fr-FR"/>
           </a:p>
@@ -2311,10 +2311,9 @@
           <a:lstStyle/>
           <a:p>
             <a:r>
-              <a:rPr lang="fr-FR" smtClean="0"/>
+              <a:rPr lang="fr-FR"/>
               <a:t>Modifiez le style du titre</a:t>
             </a:r>
-            <a:endParaRPr lang="fr-FR"/>
           </a:p>
         </p:txBody>
       </p:sp>
@@ -2335,7 +2334,7 @@
           <a:p>
             <a:fld id="{6589E675-B608-40FC-9A11-F47021A3FB4E}" type="datetimeFigureOut">
               <a:rPr lang="fr-FR" smtClean="0"/>
-              <a:t>27/06/2019</a:t>
+              <a:t>28/06/2019</a:t>
             </a:fld>
             <a:endParaRPr lang="fr-FR"/>
           </a:p>
@@ -2377,7 +2376,7 @@
           <a:p>
             <a:fld id="{A1E65BF9-7A8D-417B-AB72-F483C51F4DD3}" type="slidenum">
               <a:rPr lang="fr-FR" smtClean="0"/>
-              <a:t>‹N°›</a:t>
+              <a:t>‹#›</a:t>
             </a:fld>
             <a:endParaRPr lang="fr-FR"/>
           </a:p>
@@ -2430,7 +2429,7 @@
           <a:p>
             <a:fld id="{6589E675-B608-40FC-9A11-F47021A3FB4E}" type="datetimeFigureOut">
               <a:rPr lang="fr-FR" smtClean="0"/>
-              <a:t>27/06/2019</a:t>
+              <a:t>28/06/2019</a:t>
             </a:fld>
             <a:endParaRPr lang="fr-FR"/>
           </a:p>
@@ -2472,7 +2471,7 @@
           <a:p>
             <a:fld id="{A1E65BF9-7A8D-417B-AB72-F483C51F4DD3}" type="slidenum">
               <a:rPr lang="fr-FR" smtClean="0"/>
-              <a:t>‹N°›</a:t>
+              <a:t>‹#›</a:t>
             </a:fld>
             <a:endParaRPr lang="fr-FR"/>
           </a:p>
@@ -2533,10 +2532,9 @@
           </a:lstStyle>
           <a:p>
             <a:r>
-              <a:rPr lang="fr-FR" smtClean="0"/>
+              <a:rPr lang="fr-FR"/>
               <a:t>Modifiez le style du titre</a:t>
             </a:r>
-            <a:endParaRPr lang="fr-FR"/>
           </a:p>
         </p:txBody>
       </p:sp>
@@ -2590,38 +2588,37 @@
           <a:p>
             <a:pPr lvl="0"/>
             <a:r>
-              <a:rPr lang="fr-FR" smtClean="0"/>
+              <a:rPr lang="fr-FR"/>
               <a:t>Modifiez les styles du texte du masque</a:t>
             </a:r>
           </a:p>
           <a:p>
             <a:pPr lvl="1"/>
             <a:r>
-              <a:rPr lang="fr-FR" smtClean="0"/>
+              <a:rPr lang="fr-FR"/>
               <a:t>Deuxième niveau</a:t>
             </a:r>
           </a:p>
           <a:p>
             <a:pPr lvl="2"/>
             <a:r>
-              <a:rPr lang="fr-FR" smtClean="0"/>
+              <a:rPr lang="fr-FR"/>
               <a:t>Troisième niveau</a:t>
             </a:r>
           </a:p>
           <a:p>
             <a:pPr lvl="3"/>
             <a:r>
-              <a:rPr lang="fr-FR" smtClean="0"/>
+              <a:rPr lang="fr-FR"/>
               <a:t>Quatrième niveau</a:t>
             </a:r>
           </a:p>
           <a:p>
             <a:pPr lvl="4"/>
             <a:r>
-              <a:rPr lang="fr-FR" smtClean="0"/>
+              <a:rPr lang="fr-FR"/>
               <a:t>Cinquième niveau</a:t>
             </a:r>
-            <a:endParaRPr lang="fr-FR"/>
           </a:p>
         </p:txBody>
       </p:sp>
@@ -2684,7 +2681,7 @@
           <a:p>
             <a:pPr lvl="0"/>
             <a:r>
-              <a:rPr lang="fr-FR" smtClean="0"/>
+              <a:rPr lang="fr-FR"/>
               <a:t>Modifiez les styles du texte du masque</a:t>
             </a:r>
           </a:p>
@@ -2707,7 +2704,7 @@
           <a:p>
             <a:fld id="{6589E675-B608-40FC-9A11-F47021A3FB4E}" type="datetimeFigureOut">
               <a:rPr lang="fr-FR" smtClean="0"/>
-              <a:t>27/06/2019</a:t>
+              <a:t>28/06/2019</a:t>
             </a:fld>
             <a:endParaRPr lang="fr-FR"/>
           </a:p>
@@ -2749,7 +2746,7 @@
           <a:p>
             <a:fld id="{A1E65BF9-7A8D-417B-AB72-F483C51F4DD3}" type="slidenum">
               <a:rPr lang="fr-FR" smtClean="0"/>
-              <a:t>‹N°›</a:t>
+              <a:t>‹#›</a:t>
             </a:fld>
             <a:endParaRPr lang="fr-FR"/>
           </a:p>
@@ -2810,10 +2807,9 @@
           </a:lstStyle>
           <a:p>
             <a:r>
-              <a:rPr lang="fr-FR" smtClean="0"/>
+              <a:rPr lang="fr-FR"/>
               <a:t>Modifiez le style du titre</a:t>
             </a:r>
-            <a:endParaRPr lang="fr-FR"/>
           </a:p>
         </p:txBody>
       </p:sp>
@@ -2937,7 +2933,7 @@
           <a:p>
             <a:pPr lvl="0"/>
             <a:r>
-              <a:rPr lang="fr-FR" smtClean="0"/>
+              <a:rPr lang="fr-FR"/>
               <a:t>Modifiez les styles du texte du masque</a:t>
             </a:r>
           </a:p>
@@ -2960,7 +2956,7 @@
           <a:p>
             <a:fld id="{6589E675-B608-40FC-9A11-F47021A3FB4E}" type="datetimeFigureOut">
               <a:rPr lang="fr-FR" smtClean="0"/>
-              <a:t>27/06/2019</a:t>
+              <a:t>28/06/2019</a:t>
             </a:fld>
             <a:endParaRPr lang="fr-FR"/>
           </a:p>
@@ -3002,7 +2998,7 @@
           <a:p>
             <a:fld id="{A1E65BF9-7A8D-417B-AB72-F483C51F4DD3}" type="slidenum">
               <a:rPr lang="fr-FR" smtClean="0"/>
-              <a:t>‹N°›</a:t>
+              <a:t>‹#›</a:t>
             </a:fld>
             <a:endParaRPr lang="fr-FR"/>
           </a:p>
@@ -3069,10 +3065,9 @@
           <a:lstStyle/>
           <a:p>
             <a:r>
-              <a:rPr lang="fr-FR" smtClean="0"/>
+              <a:rPr lang="fr-FR"/>
               <a:t>Modifiez le style du titre</a:t>
             </a:r>
-            <a:endParaRPr lang="fr-FR"/>
           </a:p>
         </p:txBody>
       </p:sp>
@@ -3103,38 +3098,37 @@
           <a:p>
             <a:pPr lvl="0"/>
             <a:r>
-              <a:rPr lang="fr-FR" smtClean="0"/>
+              <a:rPr lang="fr-FR"/>
               <a:t>Modifiez les styles du texte du masque</a:t>
             </a:r>
           </a:p>
           <a:p>
             <a:pPr lvl="1"/>
             <a:r>
-              <a:rPr lang="fr-FR" smtClean="0"/>
+              <a:rPr lang="fr-FR"/>
               <a:t>Deuxième niveau</a:t>
             </a:r>
           </a:p>
           <a:p>
             <a:pPr lvl="2"/>
             <a:r>
-              <a:rPr lang="fr-FR" smtClean="0"/>
+              <a:rPr lang="fr-FR"/>
               <a:t>Troisième niveau</a:t>
             </a:r>
           </a:p>
           <a:p>
             <a:pPr lvl="3"/>
             <a:r>
-              <a:rPr lang="fr-FR" smtClean="0"/>
+              <a:rPr lang="fr-FR"/>
               <a:t>Quatrième niveau</a:t>
             </a:r>
           </a:p>
           <a:p>
             <a:pPr lvl="4"/>
             <a:r>
-              <a:rPr lang="fr-FR" smtClean="0"/>
+              <a:rPr lang="fr-FR"/>
               <a:t>Cinquième niveau</a:t>
             </a:r>
-            <a:endParaRPr lang="fr-FR"/>
           </a:p>
         </p:txBody>
       </p:sp>
@@ -3173,7 +3167,7 @@
           <a:p>
             <a:fld id="{6589E675-B608-40FC-9A11-F47021A3FB4E}" type="datetimeFigureOut">
               <a:rPr lang="fr-FR" smtClean="0"/>
-              <a:t>27/06/2019</a:t>
+              <a:t>28/06/2019</a:t>
             </a:fld>
             <a:endParaRPr lang="fr-FR"/>
           </a:p>
@@ -3251,7 +3245,7 @@
           <a:p>
             <a:fld id="{A1E65BF9-7A8D-417B-AB72-F483C51F4DD3}" type="slidenum">
               <a:rPr lang="fr-FR" smtClean="0"/>
-              <a:t>‹N°›</a:t>
+              <a:t>‹#›</a:t>
             </a:fld>
             <a:endParaRPr lang="fr-FR"/>
           </a:p>
@@ -3571,7 +3565,7 @@
           <a:lstStyle/>
           <a:p>
             <a:r>
-              <a:rPr lang="en-US" dirty="0" smtClean="0"/>
+              <a:rPr lang="en-US" dirty="0"/>
               <a:t>Social benefits of slow food</a:t>
             </a:r>
             <a:endParaRPr lang="fr-FR" dirty="0"/>
@@ -3601,33 +3595,29 @@
           <a:lstStyle/>
           <a:p>
             <a:r>
-              <a:rPr lang="en-US" dirty="0" smtClean="0"/>
+              <a:rPr lang="en-US" dirty="0"/>
               <a:t>Group 4 Project </a:t>
             </a:r>
             <a:br>
-              <a:rPr lang="en-US" dirty="0" smtClean="0"/>
+              <a:rPr lang="en-US" dirty="0"/>
             </a:br>
-            <a:r>
-              <a:rPr lang="en-US" dirty="0" smtClean="0"/>
-              <a:t/>
-            </a:r>
             <a:br>
-              <a:rPr lang="en-US" dirty="0" smtClean="0"/>
+              <a:rPr lang="en-US" dirty="0"/>
             </a:br>
             <a:r>
-              <a:rPr lang="en-US" dirty="0" smtClean="0"/>
+              <a:rPr lang="en-US" dirty="0"/>
               <a:t>Katarina, </a:t>
             </a:r>
             <a:r>
-              <a:rPr lang="en-US" dirty="0" err="1" smtClean="0"/>
+              <a:rPr lang="en-US" dirty="0" err="1"/>
               <a:t>Kirana</a:t>
             </a:r>
             <a:r>
-              <a:rPr lang="en-US" dirty="0" smtClean="0"/>
+              <a:rPr lang="en-US" dirty="0"/>
               <a:t>, Adrien, Cyril, </a:t>
             </a:r>
             <a:r>
-              <a:rPr lang="en-US" dirty="0" err="1" smtClean="0"/>
+              <a:rPr lang="en-US" dirty="0" err="1"/>
               <a:t>Thibaud</a:t>
             </a:r>
             <a:endParaRPr lang="fr-FR" dirty="0"/>
@@ -3685,13 +3675,122 @@
   <p:clrMapOvr>
     <a:masterClrMapping/>
   </p:clrMapOvr>
-  <p:timing>
-    <p:tnLst>
-      <p:par>
-        <p:cTn id="1" dur="indefinite" restart="never" nodeType="tmRoot"/>
-      </p:par>
-    </p:tnLst>
-  </p:timing>
+</p:sld>
+</file>
+
+<file path=ppt/slides/slide10.xml><?xml version="1.0" encoding="utf-8"?>
+<p:sld xmlns:a="http://schemas.openxmlformats.org/drawingml/2006/main" xmlns:r="http://schemas.openxmlformats.org/officeDocument/2006/relationships" xmlns:p="http://schemas.openxmlformats.org/presentationml/2006/main">
+  <p:cSld>
+    <p:spTree>
+      <p:nvGrpSpPr>
+        <p:cNvPr id="1" name=""/>
+        <p:cNvGrpSpPr/>
+        <p:nvPr/>
+      </p:nvGrpSpPr>
+      <p:grpSpPr>
+        <a:xfrm>
+          <a:off x="0" y="0"/>
+          <a:ext cx="0" cy="0"/>
+          <a:chOff x="0" y="0"/>
+          <a:chExt cx="0" cy="0"/>
+        </a:xfrm>
+      </p:grpSpPr>
+      <p:sp>
+        <p:nvSpPr>
+          <p:cNvPr id="2" name="Title 1">
+            <a:extLst>
+              <a:ext uri="{FF2B5EF4-FFF2-40B4-BE49-F238E27FC236}">
+                <a16:creationId xmlns:a16="http://schemas.microsoft.com/office/drawing/2014/main" id="{2EC4A19E-9EAD-471C-B447-64DA25E17D39}"/>
+              </a:ext>
+            </a:extLst>
+          </p:cNvPr>
+          <p:cNvSpPr>
+            <a:spLocks noGrp="1"/>
+          </p:cNvSpPr>
+          <p:nvPr>
+            <p:ph type="title"/>
+          </p:nvPr>
+        </p:nvSpPr>
+        <p:spPr>
+          <a:xfrm>
+            <a:off x="421619" y="1268760"/>
+            <a:ext cx="8229600" cy="1143000"/>
+          </a:xfrm>
+        </p:spPr>
+        <p:txBody>
+          <a:bodyPr/>
+          <a:lstStyle/>
+          <a:p>
+            <a:r>
+              <a:rPr lang="en-GB" dirty="0"/>
+              <a:t>Thank You</a:t>
+            </a:r>
+            <a:endParaRPr lang="en-DE" dirty="0"/>
+          </a:p>
+        </p:txBody>
+      </p:sp>
+      <p:sp>
+        <p:nvSpPr>
+          <p:cNvPr id="3" name="Content Placeholder 2">
+            <a:extLst>
+              <a:ext uri="{FF2B5EF4-FFF2-40B4-BE49-F238E27FC236}">
+                <a16:creationId xmlns:a16="http://schemas.microsoft.com/office/drawing/2014/main" id="{78331420-9502-40C0-8E31-FE7EC6060B0E}"/>
+              </a:ext>
+            </a:extLst>
+          </p:cNvPr>
+          <p:cNvSpPr>
+            <a:spLocks noGrp="1"/>
+          </p:cNvSpPr>
+          <p:nvPr>
+            <p:ph idx="1"/>
+          </p:nvPr>
+        </p:nvSpPr>
+        <p:spPr>
+          <a:xfrm>
+            <a:off x="439680" y="4280219"/>
+            <a:ext cx="8229600" cy="732957"/>
+          </a:xfrm>
+        </p:spPr>
+        <p:txBody>
+          <a:bodyPr>
+            <a:normAutofit fontScale="70000" lnSpcReduction="20000"/>
+          </a:bodyPr>
+          <a:lstStyle/>
+          <a:p>
+            <a:pPr marL="0" indent="0">
+              <a:buNone/>
+            </a:pPr>
+            <a:r>
+              <a:rPr lang="en-GB" dirty="0"/>
+              <a:t>Acknowledgement: </a:t>
+            </a:r>
+          </a:p>
+          <a:p>
+            <a:pPr marL="0" indent="0">
+              <a:buNone/>
+            </a:pPr>
+            <a:r>
+              <a:rPr lang="en-GB" dirty="0" err="1"/>
+              <a:t>ExModelo</a:t>
+            </a:r>
+            <a:r>
+              <a:rPr lang="en-GB" dirty="0"/>
+              <a:t> Team</a:t>
+            </a:r>
+            <a:endParaRPr lang="en-DE" dirty="0"/>
+          </a:p>
+        </p:txBody>
+      </p:sp>
+    </p:spTree>
+    <p:extLst>
+      <p:ext uri="{BB962C8B-B14F-4D97-AF65-F5344CB8AC3E}">
+        <p14:creationId xmlns:p14="http://schemas.microsoft.com/office/powerpoint/2010/main" val="2280395364"/>
+      </p:ext>
+    </p:extLst>
+  </p:cSld>
+  <p:clrMapOvr>
+    <a:masterClrMapping/>
+  </p:clrMapOvr>
 </p:sld>
 </file>
 
@@ -3728,10 +3827,9 @@
           <a:lstStyle/>
           <a:p>
             <a:r>
-              <a:rPr lang="fr-FR" dirty="0" smtClean="0"/>
+              <a:rPr lang="fr-FR" dirty="0"/>
               <a:t>Question</a:t>
             </a:r>
-            <a:endParaRPr lang="fr-FR" dirty="0"/>
           </a:p>
         </p:txBody>
       </p:sp>
@@ -3753,7 +3851,7 @@
           <a:lstStyle/>
           <a:p>
             <a:r>
-              <a:rPr lang="en-US" dirty="0" smtClean="0"/>
+              <a:rPr lang="en-US" dirty="0"/>
               <a:t>Cooperation imply costs…</a:t>
             </a:r>
           </a:p>
@@ -3761,26 +3859,26 @@
             <a:endParaRPr lang="en-US" dirty="0"/>
           </a:p>
           <a:p>
-            <a:endParaRPr lang="en-US" dirty="0" smtClean="0"/>
-          </a:p>
-          <a:p>
             <a:endParaRPr lang="en-US" dirty="0"/>
           </a:p>
           <a:p>
-            <a:endParaRPr lang="en-US" dirty="0" smtClean="0"/>
-          </a:p>
-          <a:p>
             <a:endParaRPr lang="en-US" dirty="0"/>
           </a:p>
           <a:p>
-            <a:endParaRPr lang="en-US" dirty="0" smtClean="0"/>
+            <a:endParaRPr lang="en-US" dirty="0"/>
+          </a:p>
+          <a:p>
+            <a:endParaRPr lang="en-US" dirty="0"/>
+          </a:p>
+          <a:p>
+            <a:endParaRPr lang="en-US" dirty="0"/>
           </a:p>
           <a:p>
             <a:pPr marL="0" indent="0">
               <a:buNone/>
             </a:pPr>
             <a:r>
-              <a:rPr lang="en-US" dirty="0" smtClean="0">
+              <a:rPr lang="en-US" dirty="0">
                 <a:solidFill>
                   <a:schemeClr val="bg1"/>
                 </a:solidFill>
@@ -3996,13 +4094,6 @@
   <p:clrMapOvr>
     <a:masterClrMapping/>
   </p:clrMapOvr>
-  <p:timing>
-    <p:tnLst>
-      <p:par>
-        <p:cTn id="1" dur="indefinite" restart="never" nodeType="tmRoot"/>
-      </p:par>
-    </p:tnLst>
-  </p:timing>
 </p:sld>
 </file>
 
@@ -4105,7 +4196,7 @@
           <a:lstStyle/>
           <a:p>
             <a:r>
-              <a:rPr lang="en-US" dirty="0" smtClean="0"/>
+              <a:rPr lang="en-US" dirty="0"/>
               <a:t>Cooperation imply costs…</a:t>
             </a:r>
           </a:p>
@@ -4113,26 +4204,26 @@
             <a:endParaRPr lang="en-US" dirty="0"/>
           </a:p>
           <a:p>
-            <a:endParaRPr lang="en-US" dirty="0" smtClean="0"/>
-          </a:p>
-          <a:p>
             <a:endParaRPr lang="en-US" dirty="0"/>
           </a:p>
           <a:p>
-            <a:endParaRPr lang="en-US" dirty="0" smtClean="0"/>
-          </a:p>
-          <a:p>
             <a:endParaRPr lang="en-US" dirty="0"/>
           </a:p>
           <a:p>
-            <a:endParaRPr lang="en-US" dirty="0" smtClean="0"/>
+            <a:endParaRPr lang="en-US" dirty="0"/>
+          </a:p>
+          <a:p>
+            <a:endParaRPr lang="en-US" dirty="0"/>
+          </a:p>
+          <a:p>
+            <a:endParaRPr lang="en-US" dirty="0"/>
           </a:p>
           <a:p>
             <a:pPr marL="0" indent="0">
               <a:buNone/>
             </a:pPr>
             <a:r>
-              <a:rPr lang="en-US" dirty="0" smtClean="0"/>
+              <a:rPr lang="en-US" dirty="0"/>
               <a:t>… what is the social benefit of cooperating against zombies?</a:t>
             </a:r>
           </a:p>
@@ -4158,10 +4249,9 @@
           <a:lstStyle/>
           <a:p>
             <a:r>
-              <a:rPr lang="fr-FR" dirty="0" smtClean="0"/>
+              <a:rPr lang="fr-FR" dirty="0"/>
               <a:t>Question</a:t>
             </a:r>
-            <a:endParaRPr lang="fr-FR" dirty="0"/>
           </a:p>
         </p:txBody>
       </p:sp>
@@ -4567,10 +4657,9 @@
             <a:lstStyle/>
             <a:p>
               <a:r>
-                <a:rPr lang="fr-FR" dirty="0" smtClean="0"/>
+                <a:rPr lang="fr-FR" dirty="0"/>
                 <a:t>= 1</a:t>
               </a:r>
-              <a:endParaRPr lang="fr-FR" dirty="0"/>
             </a:p>
           </p:txBody>
         </p:sp>
@@ -4662,14 +4751,13 @@
           <a:lstStyle/>
           <a:p>
             <a:r>
-              <a:rPr lang="fr-FR" dirty="0" err="1" smtClean="0"/>
+              <a:rPr lang="fr-FR" dirty="0" err="1"/>
               <a:t>hRs</a:t>
             </a:r>
             <a:r>
-              <a:rPr lang="fr-FR" dirty="0" smtClean="0"/>
+              <a:rPr lang="fr-FR" dirty="0"/>
               <a:t> = 0.49</a:t>
             </a:r>
-            <a:endParaRPr lang="fr-FR" dirty="0"/>
           </a:p>
         </p:txBody>
       </p:sp>
@@ -4760,7 +4848,7 @@
           <a:lstStyle/>
           <a:p>
             <a:r>
-              <a:rPr lang="fr-FR" dirty="0" smtClean="0">
+              <a:rPr lang="fr-FR" dirty="0">
                 <a:solidFill>
                   <a:srgbClr val="FF0000"/>
                 </a:solidFill>
@@ -4768,7 +4856,7 @@
               <a:t>hRs1 &lt; </a:t>
             </a:r>
             <a:r>
-              <a:rPr lang="fr-FR" dirty="0" err="1" smtClean="0">
+              <a:rPr lang="fr-FR" dirty="0" err="1">
                 <a:solidFill>
                   <a:srgbClr val="FF0000"/>
                 </a:solidFill>
@@ -4808,10 +4896,9 @@
           <a:lstStyle/>
           <a:p>
             <a:r>
-              <a:rPr lang="fr-FR" dirty="0" smtClean="0"/>
+              <a:rPr lang="fr-FR" dirty="0"/>
               <a:t>= 0     </a:t>
             </a:r>
-            <a:endParaRPr lang="fr-FR" dirty="0"/>
           </a:p>
         </p:txBody>
       </p:sp>
@@ -4886,7 +4973,7 @@
           <a:lstStyle/>
           <a:p>
             <a:r>
-              <a:rPr lang="fr-FR" dirty="0" smtClean="0">
+              <a:rPr lang="fr-FR" dirty="0">
                 <a:solidFill>
                   <a:srgbClr val="FF0000"/>
                 </a:solidFill>
@@ -4894,7 +4981,7 @@
               <a:t>hIp1 &gt; </a:t>
             </a:r>
             <a:r>
-              <a:rPr lang="fr-FR" dirty="0" err="1" smtClean="0">
+              <a:rPr lang="fr-FR" dirty="0" err="1">
                 <a:solidFill>
                   <a:srgbClr val="FF0000"/>
                 </a:solidFill>
@@ -4932,18 +5019,13 @@
           <a:lstStyle/>
           <a:p>
             <a:r>
-              <a:rPr lang="fr-FR" dirty="0" smtClean="0">
+              <a:rPr lang="fr-FR" dirty="0">
                 <a:solidFill>
                   <a:srgbClr val="FF0000"/>
                 </a:solidFill>
               </a:rPr>
               <a:t>hIp1</a:t>
             </a:r>
-            <a:endParaRPr lang="fr-FR" dirty="0">
-              <a:solidFill>
-                <a:srgbClr val="FF0000"/>
-              </a:solidFill>
-            </a:endParaRPr>
           </a:p>
         </p:txBody>
       </p:sp>
@@ -4957,13 +5039,6 @@
   <p:clrMapOvr>
     <a:masterClrMapping/>
   </p:clrMapOvr>
-  <p:timing>
-    <p:tnLst>
-      <p:par>
-        <p:cTn id="1" dur="indefinite" restart="never" nodeType="tmRoot"/>
-      </p:par>
-    </p:tnLst>
-  </p:timing>
 </p:sld>
 </file>
 
@@ -5195,41 +5270,41 @@
           <a:lstStyle/>
           <a:p>
             <a:r>
-              <a:rPr lang="fr-FR" dirty="0" err="1" smtClean="0"/>
+              <a:rPr lang="fr-FR" dirty="0" err="1"/>
               <a:t>ScalaTask</a:t>
             </a:r>
             <a:r>
-              <a:rPr lang="fr-FR" dirty="0" smtClean="0"/>
+              <a:rPr lang="fr-FR" dirty="0"/>
               <a:t>("""</a:t>
             </a:r>
           </a:p>
           <a:p>
             <a:r>
-              <a:rPr lang="fr-FR" dirty="0" smtClean="0"/>
+              <a:rPr lang="fr-FR" dirty="0"/>
               <a:t>    import zombies._</a:t>
             </a:r>
           </a:p>
           <a:p>
             <a:r>
-              <a:rPr lang="fr-FR" dirty="0" smtClean="0"/>
+              <a:rPr lang="fr-FR" dirty="0"/>
               <a:t>    val agents = </a:t>
             </a:r>
           </a:p>
           <a:p>
             <a:r>
-              <a:rPr lang="fr-FR" dirty="0" smtClean="0"/>
+              <a:rPr lang="fr-FR" dirty="0"/>
               <a:t>      (0 </a:t>
             </a:r>
             <a:r>
-              <a:rPr lang="fr-FR" dirty="0" err="1" smtClean="0"/>
+              <a:rPr lang="fr-FR" dirty="0" err="1"/>
               <a:t>until</a:t>
             </a:r>
             <a:r>
-              <a:rPr lang="fr-FR" dirty="0" smtClean="0"/>
+              <a:rPr lang="fr-FR" dirty="0"/>
               <a:t> </a:t>
             </a:r>
             <a:r>
-              <a:rPr lang="fr-FR" b="1" dirty="0" err="1" smtClean="0">
+              <a:rPr lang="fr-FR" b="1" dirty="0" err="1">
                 <a:solidFill>
                   <a:srgbClr val="FF0000"/>
                 </a:solidFill>
@@ -5237,35 +5312,35 @@
               <a:t>nbSlow</a:t>
             </a:r>
             <a:r>
-              <a:rPr lang="fr-FR" dirty="0" smtClean="0"/>
+              <a:rPr lang="fr-FR" dirty="0"/>
               <a:t>).</a:t>
             </a:r>
             <a:r>
-              <a:rPr lang="fr-FR" dirty="0" err="1" smtClean="0"/>
+              <a:rPr lang="fr-FR" dirty="0" err="1"/>
               <a:t>map</a:t>
             </a:r>
             <a:r>
-              <a:rPr lang="fr-FR" dirty="0" smtClean="0"/>
+              <a:rPr lang="fr-FR" dirty="0"/>
               <a:t>(_ =&gt; </a:t>
             </a:r>
             <a:r>
-              <a:rPr lang="fr-FR" dirty="0" err="1" smtClean="0"/>
+              <a:rPr lang="fr-FR" dirty="0" err="1"/>
               <a:t>Human</a:t>
             </a:r>
             <a:r>
-              <a:rPr lang="fr-FR" dirty="0" smtClean="0"/>
+              <a:rPr lang="fr-FR" dirty="0"/>
               <a:t>(</a:t>
             </a:r>
             <a:r>
-              <a:rPr lang="fr-FR" dirty="0" err="1" smtClean="0"/>
+              <a:rPr lang="fr-FR" dirty="0" err="1"/>
               <a:t>informProbability</a:t>
             </a:r>
             <a:r>
-              <a:rPr lang="fr-FR" dirty="0" smtClean="0"/>
+              <a:rPr lang="fr-FR" dirty="0"/>
               <a:t> = </a:t>
             </a:r>
             <a:r>
-              <a:rPr lang="fr-FR" b="1" dirty="0" smtClean="0">
+              <a:rPr lang="fr-FR" b="1" dirty="0">
                 <a:solidFill>
                   <a:srgbClr val="FF0000"/>
                 </a:solidFill>
@@ -5273,19 +5348,19 @@
               <a:t>hIp1</a:t>
             </a:r>
             <a:r>
-              <a:rPr lang="fr-FR" dirty="0" smtClean="0"/>
+              <a:rPr lang="fr-FR" dirty="0"/>
               <a:t>, </a:t>
             </a:r>
             <a:r>
-              <a:rPr lang="fr-FR" dirty="0" err="1" smtClean="0"/>
+              <a:rPr lang="fr-FR" dirty="0" err="1"/>
               <a:t>runSpeed</a:t>
             </a:r>
             <a:r>
-              <a:rPr lang="fr-FR" dirty="0" smtClean="0"/>
+              <a:rPr lang="fr-FR" dirty="0"/>
               <a:t> = </a:t>
             </a:r>
             <a:r>
-              <a:rPr lang="fr-FR" b="1" dirty="0" smtClean="0">
+              <a:rPr lang="fr-FR" b="1" dirty="0">
                 <a:solidFill>
                   <a:srgbClr val="FF0000"/>
                 </a:solidFill>
@@ -5293,99 +5368,99 @@
               <a:t>hRs1</a:t>
             </a:r>
             <a:r>
-              <a:rPr lang="fr-FR" dirty="0" smtClean="0"/>
+              <a:rPr lang="fr-FR" dirty="0"/>
               <a:t>, </a:t>
             </a:r>
             <a:r>
-              <a:rPr lang="fr-FR" i="1" dirty="0" err="1" smtClean="0"/>
+              <a:rPr lang="fr-FR" i="1" dirty="0" err="1"/>
               <a:t>informed</a:t>
             </a:r>
             <a:r>
-              <a:rPr lang="fr-FR" i="1" dirty="0" smtClean="0"/>
+              <a:rPr lang="fr-FR" i="1" dirty="0"/>
               <a:t>=</a:t>
             </a:r>
             <a:r>
-              <a:rPr lang="fr-FR" i="1" dirty="0" err="1" smtClean="0"/>
+              <a:rPr lang="fr-FR" i="1" dirty="0" err="1"/>
               <a:t>true</a:t>
             </a:r>
             <a:r>
-              <a:rPr lang="fr-FR" dirty="0" smtClean="0"/>
+              <a:rPr lang="fr-FR" dirty="0"/>
               <a:t>))</a:t>
             </a:r>
           </a:p>
           <a:p>
             <a:r>
-              <a:rPr lang="fr-FR" dirty="0" smtClean="0"/>
+              <a:rPr lang="fr-FR" dirty="0"/>
               <a:t>    val </a:t>
             </a:r>
             <a:r>
-              <a:rPr lang="fr-FR" dirty="0" err="1" smtClean="0"/>
+              <a:rPr lang="fr-FR" dirty="0" err="1"/>
               <a:t>rng</a:t>
             </a:r>
             <a:r>
-              <a:rPr lang="fr-FR" dirty="0" smtClean="0"/>
+              <a:rPr lang="fr-FR" dirty="0"/>
               <a:t> = </a:t>
             </a:r>
             <a:r>
-              <a:rPr lang="fr-FR" dirty="0" err="1" smtClean="0"/>
+              <a:rPr lang="fr-FR" dirty="0" err="1"/>
               <a:t>Random</a:t>
             </a:r>
             <a:r>
-              <a:rPr lang="fr-FR" dirty="0" smtClean="0"/>
+              <a:rPr lang="fr-FR" dirty="0"/>
               <a:t>(</a:t>
             </a:r>
             <a:r>
-              <a:rPr lang="fr-FR" dirty="0" err="1" smtClean="0"/>
+              <a:rPr lang="fr-FR" dirty="0" err="1"/>
               <a:t>seed</a:t>
             </a:r>
             <a:r>
-              <a:rPr lang="fr-FR" dirty="0" smtClean="0"/>
+              <a:rPr lang="fr-FR" dirty="0"/>
               <a:t>)</a:t>
             </a:r>
           </a:p>
           <a:p>
             <a:r>
-              <a:rPr lang="fr-FR" dirty="0" smtClean="0"/>
+              <a:rPr lang="fr-FR" dirty="0"/>
               <a:t>    val </a:t>
             </a:r>
             <a:r>
-              <a:rPr lang="fr-FR" dirty="0" err="1" smtClean="0"/>
+              <a:rPr lang="fr-FR" dirty="0" err="1"/>
               <a:t>result</a:t>
             </a:r>
             <a:r>
-              <a:rPr lang="fr-FR" dirty="0" smtClean="0"/>
+              <a:rPr lang="fr-FR" dirty="0"/>
               <a:t> = </a:t>
             </a:r>
             <a:r>
-              <a:rPr lang="fr-FR" dirty="0" err="1" smtClean="0"/>
+              <a:rPr lang="fr-FR" dirty="0" err="1"/>
               <a:t>zombieInvasion</a:t>
             </a:r>
             <a:r>
-              <a:rPr lang="fr-FR" dirty="0" smtClean="0"/>
+              <a:rPr lang="fr-FR" dirty="0"/>
               <a:t>(</a:t>
             </a:r>
           </a:p>
           <a:p>
             <a:r>
-              <a:rPr lang="fr-FR" dirty="0" smtClean="0"/>
+              <a:rPr lang="fr-FR" dirty="0"/>
               <a:t>      zombies = 4,</a:t>
             </a:r>
           </a:p>
           <a:p>
             <a:r>
-              <a:rPr lang="fr-FR" dirty="0" smtClean="0"/>
+              <a:rPr lang="fr-FR" dirty="0"/>
               <a:t>      </a:t>
             </a:r>
             <a:r>
-              <a:rPr lang="fr-FR" dirty="0" err="1" smtClean="0"/>
+              <a:rPr lang="fr-FR" dirty="0" err="1"/>
               <a:t>humans</a:t>
             </a:r>
             <a:r>
-              <a:rPr lang="fr-FR" dirty="0" smtClean="0"/>
+              <a:rPr lang="fr-FR" dirty="0"/>
               <a:t> = 250 - </a:t>
             </a:r>
             <a:r>
-              <a:rPr lang="fr-FR" b="1" dirty="0" err="1" smtClean="0">
+              <a:rPr lang="fr-FR" b="1" dirty="0" err="1">
                 <a:solidFill>
                   <a:srgbClr val="FF0000"/>
                 </a:solidFill>
@@ -5393,103 +5468,103 @@
               <a:t>nbSlow</a:t>
             </a:r>
             <a:r>
-              <a:rPr lang="fr-FR" dirty="0" smtClean="0"/>
+              <a:rPr lang="fr-FR" dirty="0"/>
               <a:t>, // </a:t>
             </a:r>
             <a:r>
-              <a:rPr lang="fr-FR" dirty="0" err="1" smtClean="0"/>
+              <a:rPr lang="fr-FR" dirty="0" err="1"/>
               <a:t>with</a:t>
             </a:r>
             <a:r>
-              <a:rPr lang="fr-FR" dirty="0" smtClean="0"/>
+              <a:rPr lang="fr-FR" dirty="0"/>
               <a:t> default values</a:t>
             </a:r>
           </a:p>
           <a:p>
             <a:r>
-              <a:rPr lang="fr-FR" dirty="0" smtClean="0"/>
+              <a:rPr lang="fr-FR" dirty="0"/>
               <a:t>      agents = agents,</a:t>
             </a:r>
           </a:p>
           <a:p>
             <a:r>
-              <a:rPr lang="fr-FR" dirty="0" smtClean="0"/>
+              <a:rPr lang="fr-FR" dirty="0"/>
               <a:t>      </a:t>
             </a:r>
             <a:r>
-              <a:rPr lang="fr-FR" dirty="0" err="1" smtClean="0"/>
+              <a:rPr lang="fr-FR" dirty="0" err="1"/>
               <a:t>steps</a:t>
             </a:r>
             <a:r>
-              <a:rPr lang="fr-FR" dirty="0" smtClean="0"/>
+              <a:rPr lang="fr-FR" dirty="0"/>
               <a:t> = 500,</a:t>
             </a:r>
           </a:p>
           <a:p>
             <a:r>
-              <a:rPr lang="fr-FR" dirty="0" smtClean="0"/>
+              <a:rPr lang="fr-FR" dirty="0"/>
               <a:t>      </a:t>
             </a:r>
             <a:r>
-              <a:rPr lang="fr-FR" dirty="0" err="1" smtClean="0"/>
+              <a:rPr lang="fr-FR" dirty="0" err="1"/>
               <a:t>random</a:t>
             </a:r>
             <a:r>
-              <a:rPr lang="fr-FR" dirty="0" smtClean="0"/>
+              <a:rPr lang="fr-FR" dirty="0"/>
               <a:t> = </a:t>
             </a:r>
             <a:r>
-              <a:rPr lang="fr-FR" dirty="0" err="1" smtClean="0"/>
+              <a:rPr lang="fr-FR" dirty="0" err="1"/>
               <a:t>rng</a:t>
             </a:r>
             <a:r>
-              <a:rPr lang="fr-FR" dirty="0" smtClean="0"/>
+              <a:rPr lang="fr-FR" dirty="0"/>
               <a:t>,</a:t>
             </a:r>
           </a:p>
           <a:p>
             <a:r>
-              <a:rPr lang="fr-FR" dirty="0" smtClean="0"/>
+              <a:rPr lang="fr-FR" dirty="0"/>
               <a:t>      </a:t>
             </a:r>
             <a:r>
-              <a:rPr lang="fr-FR" i="1" dirty="0" err="1" smtClean="0"/>
+              <a:rPr lang="fr-FR" i="1" dirty="0" err="1"/>
               <a:t>humanInformedRatio</a:t>
             </a:r>
             <a:r>
-              <a:rPr lang="fr-FR" i="1" dirty="0" smtClean="0"/>
+              <a:rPr lang="fr-FR" i="1" dirty="0"/>
               <a:t>=0.0</a:t>
             </a:r>
             <a:r>
-              <a:rPr lang="fr-FR" dirty="0" smtClean="0"/>
+              <a:rPr lang="fr-FR" dirty="0"/>
               <a:t>)</a:t>
             </a:r>
           </a:p>
           <a:p>
             <a:r>
-              <a:rPr lang="fr-FR" dirty="0" smtClean="0"/>
+              <a:rPr lang="fr-FR" dirty="0"/>
               <a:t>    val </a:t>
             </a:r>
             <a:r>
-              <a:rPr lang="fr-FR" dirty="0" err="1" smtClean="0"/>
+              <a:rPr lang="fr-FR" dirty="0" err="1"/>
               <a:t>rescuedDynamic</a:t>
             </a:r>
             <a:r>
-              <a:rPr lang="fr-FR" dirty="0" smtClean="0"/>
+              <a:rPr lang="fr-FR" dirty="0"/>
               <a:t> = </a:t>
             </a:r>
             <a:r>
-              <a:rPr lang="fr-FR" dirty="0" err="1" smtClean="0"/>
+              <a:rPr lang="fr-FR" dirty="0" err="1"/>
               <a:t>result.rescuedDynamic</a:t>
             </a:r>
             <a:r>
-              <a:rPr lang="fr-FR" dirty="0" smtClean="0"/>
+              <a:rPr lang="fr-FR" dirty="0"/>
               <a:t>()</a:t>
             </a:r>
           </a:p>
           <a:p>
             <a:r>
-              <a:rPr lang="fr-FR" i="1" dirty="0" smtClean="0">
+              <a:rPr lang="fr-FR" i="1" dirty="0">
                 <a:solidFill>
                   <a:schemeClr val="tx2">
                     <a:lumMod val="60000"/>
@@ -5500,7 +5575,7 @@
               <a:t>    val </a:t>
             </a:r>
             <a:r>
-              <a:rPr lang="fr-FR" i="1" dirty="0" err="1" smtClean="0">
+              <a:rPr lang="fr-FR" i="1" dirty="0" err="1">
                 <a:solidFill>
                   <a:schemeClr val="tx2">
                     <a:lumMod val="60000"/>
@@ -5511,7 +5586,7 @@
               <a:t>rescuedDynamicSlow</a:t>
             </a:r>
             <a:r>
-              <a:rPr lang="fr-FR" i="1" dirty="0" smtClean="0">
+              <a:rPr lang="fr-FR" i="1" dirty="0">
                 <a:solidFill>
                   <a:schemeClr val="tx2">
                     <a:lumMod val="60000"/>
@@ -5522,7 +5597,7 @@
               <a:t> = </a:t>
             </a:r>
             <a:r>
-              <a:rPr lang="fr-FR" i="1" dirty="0" err="1" smtClean="0">
+              <a:rPr lang="fr-FR" i="1" dirty="0" err="1">
                 <a:solidFill>
                   <a:schemeClr val="tx2">
                     <a:lumMod val="60000"/>
@@ -5533,7 +5608,7 @@
               <a:t>result.filteredRescuedDynamic</a:t>
             </a:r>
             <a:r>
-              <a:rPr lang="fr-FR" i="1" dirty="0" smtClean="0">
+              <a:rPr lang="fr-FR" i="1" dirty="0">
                 <a:solidFill>
                   <a:schemeClr val="tx2">
                     <a:lumMod val="60000"/>
@@ -5544,7 +5619,7 @@
               <a:t>(</a:t>
             </a:r>
             <a:r>
-              <a:rPr lang="fr-FR" i="1" dirty="0" err="1" smtClean="0">
+              <a:rPr lang="fr-FR" i="1" dirty="0" err="1">
                 <a:solidFill>
                   <a:schemeClr val="tx2">
                     <a:lumMod val="60000"/>
@@ -5555,7 +5630,7 @@
               <a:t>runSpeed</a:t>
             </a:r>
             <a:r>
-              <a:rPr lang="fr-FR" i="1" dirty="0" smtClean="0">
+              <a:rPr lang="fr-FR" i="1" dirty="0">
                 <a:solidFill>
                   <a:schemeClr val="tx2">
                     <a:lumMod val="60000"/>
@@ -5566,7 +5641,7 @@
               <a:t> = </a:t>
             </a:r>
             <a:r>
-              <a:rPr lang="fr-FR" i="1" dirty="0" err="1" smtClean="0">
+              <a:rPr lang="fr-FR" i="1" dirty="0" err="1">
                 <a:solidFill>
                   <a:schemeClr val="tx2">
                     <a:lumMod val="60000"/>
@@ -5577,7 +5652,7 @@
               <a:t>Some</a:t>
             </a:r>
             <a:r>
-              <a:rPr lang="fr-FR" i="1" dirty="0" smtClean="0">
+              <a:rPr lang="fr-FR" i="1" dirty="0">
                 <a:solidFill>
                   <a:schemeClr val="tx2">
                     <a:lumMod val="60000"/>
@@ -5590,7 +5665,7 @@
           </a:p>
           <a:p>
             <a:r>
-              <a:rPr lang="fr-FR" i="1" dirty="0" smtClean="0">
+              <a:rPr lang="fr-FR" i="1" dirty="0">
                 <a:solidFill>
                   <a:schemeClr val="tx2">
                     <a:lumMod val="60000"/>
@@ -5601,7 +5676,7 @@
               <a:t>    val </a:t>
             </a:r>
             <a:r>
-              <a:rPr lang="fr-FR" i="1" dirty="0" err="1" smtClean="0">
+              <a:rPr lang="fr-FR" i="1" dirty="0" err="1">
                 <a:solidFill>
                   <a:schemeClr val="tx2">
                     <a:lumMod val="60000"/>
@@ -5612,7 +5687,7 @@
               <a:t>rescuedDynamicFast</a:t>
             </a:r>
             <a:r>
-              <a:rPr lang="fr-FR" i="1" dirty="0" smtClean="0">
+              <a:rPr lang="fr-FR" i="1" dirty="0">
                 <a:solidFill>
                   <a:schemeClr val="tx2">
                     <a:lumMod val="60000"/>
@@ -5623,7 +5698,7 @@
               <a:t> = </a:t>
             </a:r>
             <a:r>
-              <a:rPr lang="fr-FR" i="1" dirty="0" err="1" smtClean="0">
+              <a:rPr lang="fr-FR" i="1" dirty="0" err="1">
                 <a:solidFill>
                   <a:schemeClr val="tx2">
                     <a:lumMod val="60000"/>
@@ -5634,7 +5709,7 @@
               <a:t>result.filteredRescuedDynamic</a:t>
             </a:r>
             <a:r>
-              <a:rPr lang="fr-FR" i="1" dirty="0" smtClean="0">
+              <a:rPr lang="fr-FR" i="1" dirty="0">
                 <a:solidFill>
                   <a:schemeClr val="tx2">
                     <a:lumMod val="60000"/>
@@ -5645,7 +5720,7 @@
               <a:t>(</a:t>
             </a:r>
             <a:r>
-              <a:rPr lang="fr-FR" i="1" dirty="0" err="1" smtClean="0">
+              <a:rPr lang="fr-FR" i="1" dirty="0" err="1">
                 <a:solidFill>
                   <a:schemeClr val="tx2">
                     <a:lumMod val="60000"/>
@@ -5656,7 +5731,7 @@
               <a:t>runSpeed</a:t>
             </a:r>
             <a:r>
-              <a:rPr lang="fr-FR" i="1" dirty="0" smtClean="0">
+              <a:rPr lang="fr-FR" i="1" dirty="0">
                 <a:solidFill>
                   <a:schemeClr val="tx2">
                     <a:lumMod val="60000"/>
@@ -5667,7 +5742,7 @@
               <a:t> = </a:t>
             </a:r>
             <a:r>
-              <a:rPr lang="fr-FR" i="1" dirty="0" err="1" smtClean="0">
+              <a:rPr lang="fr-FR" i="1" dirty="0" err="1">
                 <a:solidFill>
                   <a:schemeClr val="tx2">
                     <a:lumMod val="60000"/>
@@ -5678,7 +5753,7 @@
               <a:t>Some</a:t>
             </a:r>
             <a:r>
-              <a:rPr lang="fr-FR" i="1" dirty="0" smtClean="0">
+              <a:rPr lang="fr-FR" i="1" dirty="0">
                 <a:solidFill>
                   <a:schemeClr val="tx2">
                     <a:lumMod val="60000"/>
@@ -5691,10 +5766,9 @@
           </a:p>
           <a:p>
             <a:r>
-              <a:rPr lang="fr-FR" dirty="0" smtClean="0"/>
+              <a:rPr lang="fr-FR" dirty="0"/>
               <a:t>  """)</a:t>
             </a:r>
-            <a:endParaRPr lang="fr-FR" dirty="0"/>
           </a:p>
         </p:txBody>
       </p:sp>
@@ -5714,10 +5788,9 @@
           <a:lstStyle/>
           <a:p>
             <a:r>
-              <a:rPr lang="fr-FR" dirty="0" smtClean="0"/>
+              <a:rPr lang="fr-FR" dirty="0"/>
               <a:t>Modification of the code</a:t>
             </a:r>
-            <a:endParaRPr lang="fr-FR" dirty="0"/>
           </a:p>
         </p:txBody>
       </p:sp>
@@ -5744,7 +5817,7 @@
           <a:lstStyle/>
           <a:p>
             <a:r>
-              <a:rPr lang="fr-FR" dirty="0" err="1" smtClean="0">
+              <a:rPr lang="fr-FR" dirty="0" err="1">
                 <a:solidFill>
                   <a:srgbClr val="FF0000"/>
                 </a:solidFill>
@@ -5752,7 +5825,7 @@
               <a:t>Creation</a:t>
             </a:r>
             <a:r>
-              <a:rPr lang="fr-FR" dirty="0" smtClean="0">
+              <a:rPr lang="fr-FR" dirty="0">
                 <a:solidFill>
                   <a:srgbClr val="FF0000"/>
                 </a:solidFill>
@@ -5760,7 +5833,7 @@
               <a:t> of slow </a:t>
             </a:r>
             <a:r>
-              <a:rPr lang="fr-FR" dirty="0" err="1" smtClean="0">
+              <a:rPr lang="fr-FR" dirty="0" err="1">
                 <a:solidFill>
                   <a:srgbClr val="FF0000"/>
                 </a:solidFill>
@@ -5844,7 +5917,7 @@
           <a:lstStyle/>
           <a:p>
             <a:r>
-              <a:rPr lang="fr-FR" dirty="0" err="1" smtClean="0">
+              <a:rPr lang="fr-FR" dirty="0" err="1">
                 <a:solidFill>
                   <a:schemeClr val="accent1"/>
                 </a:solidFill>
@@ -5852,7 +5925,7 @@
               <a:t>Filtering</a:t>
             </a:r>
             <a:r>
-              <a:rPr lang="fr-FR" dirty="0" smtClean="0">
+              <a:rPr lang="fr-FR" dirty="0">
                 <a:solidFill>
                   <a:schemeClr val="accent1"/>
                 </a:solidFill>
@@ -5860,7 +5933,7 @@
               <a:t> of </a:t>
             </a:r>
             <a:r>
-              <a:rPr lang="fr-FR" dirty="0" err="1" smtClean="0">
+              <a:rPr lang="fr-FR" dirty="0" err="1">
                 <a:solidFill>
                   <a:schemeClr val="accent1"/>
                 </a:solidFill>
@@ -5868,7 +5941,7 @@
               <a:t>rescuedDynamic</a:t>
             </a:r>
             <a:r>
-              <a:rPr lang="fr-FR" dirty="0" smtClean="0">
+              <a:rPr lang="fr-FR" dirty="0">
                 <a:solidFill>
                   <a:schemeClr val="accent1"/>
                 </a:solidFill>
@@ -5876,7 +5949,7 @@
               <a:t> (</a:t>
             </a:r>
             <a:r>
-              <a:rPr lang="fr-FR" dirty="0" err="1" smtClean="0">
+              <a:rPr lang="fr-FR" dirty="0" err="1">
                 <a:solidFill>
                   <a:schemeClr val="accent1"/>
                 </a:solidFill>
@@ -5884,18 +5957,13 @@
               <a:t>thanks</a:t>
             </a:r>
             <a:r>
-              <a:rPr lang="fr-FR" dirty="0" smtClean="0">
+              <a:rPr lang="fr-FR" dirty="0">
                 <a:solidFill>
                   <a:schemeClr val="accent1"/>
                 </a:solidFill>
               </a:rPr>
               <a:t> Romain!)</a:t>
             </a:r>
-            <a:endParaRPr lang="fr-FR" dirty="0">
-              <a:solidFill>
-                <a:schemeClr val="accent1"/>
-              </a:solidFill>
-            </a:endParaRPr>
           </a:p>
         </p:txBody>
       </p:sp>
@@ -5922,7 +5990,7 @@
           <a:lstStyle/>
           <a:p>
             <a:r>
-              <a:rPr lang="fr-FR" dirty="0" err="1" smtClean="0">
+              <a:rPr lang="fr-FR" dirty="0" err="1">
                 <a:solidFill>
                   <a:srgbClr val="FF0000"/>
                 </a:solidFill>
@@ -5930,7 +5998,7 @@
               <a:t>Three</a:t>
             </a:r>
             <a:r>
-              <a:rPr lang="fr-FR" dirty="0" smtClean="0">
+              <a:rPr lang="fr-FR" dirty="0">
                 <a:solidFill>
                   <a:srgbClr val="FF0000"/>
                 </a:solidFill>
@@ -5938,7 +6006,7 @@
               <a:t> </a:t>
             </a:r>
             <a:r>
-              <a:rPr lang="fr-FR" dirty="0" err="1" smtClean="0">
+              <a:rPr lang="fr-FR" dirty="0" err="1">
                 <a:solidFill>
                   <a:srgbClr val="FF0000"/>
                 </a:solidFill>
@@ -5946,18 +6014,13 @@
               <a:t>parameters</a:t>
             </a:r>
             <a:r>
-              <a:rPr lang="fr-FR" dirty="0" smtClean="0">
+              <a:rPr lang="fr-FR" dirty="0">
                 <a:solidFill>
                   <a:srgbClr val="FF0000"/>
                 </a:solidFill>
               </a:rPr>
               <a:t> to explore</a:t>
             </a:r>
-            <a:endParaRPr lang="fr-FR" dirty="0">
-              <a:solidFill>
-                <a:srgbClr val="FF0000"/>
-              </a:solidFill>
-            </a:endParaRPr>
           </a:p>
         </p:txBody>
       </p:sp>
@@ -5998,22 +6061,21 @@
             <a:lstStyle/>
             <a:p>
               <a:r>
-                <a:rPr lang="fr-FR" i="1" dirty="0" err="1" smtClean="0"/>
+                <a:rPr lang="fr-FR" i="1" dirty="0" err="1"/>
                 <a:t>Modified</a:t>
               </a:r>
               <a:r>
-                <a:rPr lang="fr-FR" i="1" dirty="0" smtClean="0"/>
+                <a:rPr lang="fr-FR" i="1" dirty="0"/>
                 <a:t> the </a:t>
               </a:r>
               <a:r>
-                <a:rPr lang="fr-FR" i="1" dirty="0" err="1" smtClean="0"/>
+                <a:rPr lang="fr-FR" i="1" dirty="0" err="1"/>
                 <a:t>informed</a:t>
               </a:r>
               <a:r>
-                <a:rPr lang="fr-FR" i="1" dirty="0" smtClean="0"/>
+                <a:rPr lang="fr-FR" i="1" dirty="0"/>
                 <a:t> agents</a:t>
               </a:r>
-              <a:endParaRPr lang="fr-FR" i="1" dirty="0"/>
             </a:p>
           </p:txBody>
         </p:sp>
@@ -6686,26 +6748,21 @@
           <a:lstStyle/>
           <a:p>
             <a:r>
-              <a:rPr lang="fr-FR" dirty="0" err="1" smtClean="0"/>
+              <a:rPr lang="fr-FR" dirty="0" err="1"/>
               <a:t>Exploratory</a:t>
             </a:r>
             <a:r>
-              <a:rPr lang="fr-FR" dirty="0" smtClean="0"/>
+              <a:rPr lang="fr-FR" dirty="0"/>
               <a:t> </a:t>
             </a:r>
             <a:r>
-              <a:rPr lang="fr-FR" dirty="0" err="1" smtClean="0"/>
+              <a:rPr lang="fr-FR" dirty="0" err="1"/>
               <a:t>analysis</a:t>
             </a:r>
             <a:r>
-              <a:rPr lang="fr-FR" dirty="0" smtClean="0"/>
-              <a:t> </a:t>
-            </a:r>
-            <a:r>
-              <a:rPr lang="fr-FR" dirty="0" smtClean="0"/>
-              <a:t>1</a:t>
-            </a:r>
-            <a:endParaRPr lang="fr-FR" dirty="0"/>
+              <a:rPr lang="fr-FR" dirty="0"/>
+              <a:t> 1</a:t>
+            </a:r>
           </a:p>
         </p:txBody>
       </p:sp>
@@ -6725,19 +6782,19 @@
           <a:lstStyle/>
           <a:p>
             <a:r>
-              <a:rPr lang="fr-FR" dirty="0" smtClean="0"/>
+              <a:rPr lang="fr-FR" dirty="0"/>
               <a:t>Direct </a:t>
             </a:r>
             <a:r>
-              <a:rPr lang="fr-FR" dirty="0" err="1" smtClean="0"/>
+              <a:rPr lang="fr-FR" dirty="0" err="1"/>
               <a:t>sampling</a:t>
             </a:r>
-            <a:endParaRPr lang="fr-FR" dirty="0" smtClean="0"/>
+            <a:endParaRPr lang="fr-FR" dirty="0"/>
           </a:p>
           <a:p>
             <a:pPr lvl="1"/>
             <a:r>
-              <a:rPr lang="en-US" dirty="0" err="1" smtClean="0">
+              <a:rPr lang="en-US" dirty="0" err="1">
                 <a:solidFill>
                   <a:srgbClr val="FF0000"/>
                 </a:solidFill>
@@ -6745,7 +6802,7 @@
               <a:t>nbSlow</a:t>
             </a:r>
             <a:r>
-              <a:rPr lang="en-US" dirty="0" smtClean="0">
+              <a:rPr lang="en-US" dirty="0">
                 <a:solidFill>
                   <a:srgbClr val="FF0000"/>
                 </a:solidFill>
@@ -6754,17 +6811,13 @@
             </a:r>
             <a:r>
               <a:rPr lang="en-US" dirty="0"/>
-              <a:t>in (0 to 125 by </a:t>
-            </a:r>
-            <a:r>
-              <a:rPr lang="en-US" dirty="0" smtClean="0"/>
-              <a:t>25) 	(Number of         )</a:t>
+              <a:t>in (0 to 125 by 25) 	(Number of         )</a:t>
             </a:r>
           </a:p>
           <a:p>
             <a:pPr lvl="1"/>
             <a:r>
-              <a:rPr lang="en-US" dirty="0" smtClean="0">
+              <a:rPr lang="en-US" dirty="0">
                 <a:solidFill>
                   <a:srgbClr val="FF0000"/>
                 </a:solidFill>
@@ -6772,22 +6825,14 @@
               <a:t>hRs1</a:t>
             </a:r>
             <a:r>
-              <a:rPr lang="en-US" dirty="0" smtClean="0"/>
-              <a:t> </a:t>
-            </a:r>
-            <a:r>
               <a:rPr lang="en-US" dirty="0"/>
-              <a:t>in (0.1 to 0.4 by 0.1</a:t>
-            </a:r>
-            <a:r>
-              <a:rPr lang="en-US" dirty="0" smtClean="0"/>
-              <a:t>)		(Run speed of     )</a:t>
+              <a:t> in (0.1 to 0.4 by 0.1)		(Run speed of     )</a:t>
             </a:r>
           </a:p>
           <a:p>
             <a:pPr lvl="1"/>
             <a:r>
-              <a:rPr lang="en-US" dirty="0" smtClean="0">
+              <a:rPr lang="en-US" dirty="0">
                 <a:solidFill>
                   <a:srgbClr val="FF0000"/>
                 </a:solidFill>
@@ -6795,20 +6840,8 @@
               <a:t>hIp1</a:t>
             </a:r>
             <a:r>
-              <a:rPr lang="en-US" dirty="0" smtClean="0"/>
-              <a:t> </a:t>
-            </a:r>
-            <a:r>
               <a:rPr lang="en-US" dirty="0"/>
-              <a:t>in (0.1 to 1.0 by 0.1) </a:t>
-            </a:r>
-            <a:r>
-              <a:rPr lang="en-US" dirty="0" smtClean="0"/>
-              <a:t>             (P(inform)   </a:t>
-            </a:r>
-            <a:r>
-              <a:rPr lang="en-US" dirty="0"/>
-              <a:t>of     )</a:t>
+              <a:t> in (0.1 to 1.0 by 0.1)              (P(inform)   of     )</a:t>
             </a:r>
             <a:endParaRPr lang="fr-FR" dirty="0"/>
           </a:p>
@@ -6824,13 +6857,6 @@
   <p:clrMapOvr>
     <a:masterClrMapping/>
   </p:clrMapOvr>
-  <p:timing>
-    <p:tnLst>
-      <p:par>
-        <p:cTn id="1" dur="indefinite" restart="never" nodeType="tmRoot"/>
-      </p:par>
-    </p:tnLst>
-  </p:timing>
 </p:sld>
 </file>
 
@@ -6867,14 +6893,13 @@
           <a:lstStyle/>
           <a:p>
             <a:r>
-              <a:rPr lang="fr-FR" dirty="0" err="1" smtClean="0"/>
+              <a:rPr lang="fr-FR" dirty="0" err="1"/>
               <a:t>Results</a:t>
             </a:r>
             <a:r>
-              <a:rPr lang="fr-FR" dirty="0" smtClean="0"/>
+              <a:rPr lang="fr-FR" dirty="0"/>
               <a:t> 1</a:t>
             </a:r>
-            <a:endParaRPr lang="fr-FR" dirty="0"/>
           </a:p>
         </p:txBody>
       </p:sp>
@@ -7128,10 +7153,9 @@
               <a:lstStyle/>
               <a:p>
                 <a:r>
-                  <a:rPr lang="fr-FR" dirty="0" smtClean="0"/>
+                  <a:rPr lang="fr-FR" dirty="0"/>
                   <a:t>All</a:t>
                 </a:r>
-                <a:endParaRPr lang="fr-FR" dirty="0"/>
               </a:p>
             </p:txBody>
           </p:sp>
@@ -7376,7 +7400,7 @@
               <a:lstStyle/>
               <a:p>
                 <a:r>
-                  <a:rPr lang="fr-FR" dirty="0" err="1" smtClean="0"/>
+                  <a:rPr lang="fr-FR" dirty="0" err="1"/>
                   <a:t>Rescued</a:t>
                 </a:r>
                 <a:endParaRPr lang="fr-FR" dirty="0"/>
@@ -7406,7 +7430,7 @@
               <a:lstStyle/>
               <a:p>
                 <a:r>
-                  <a:rPr lang="fr-FR" dirty="0" err="1" smtClean="0"/>
+                  <a:rPr lang="fr-FR" dirty="0" err="1"/>
                   <a:t>Zombified</a:t>
                 </a:r>
                 <a:endParaRPr lang="fr-FR" dirty="0"/>
@@ -7657,10 +7681,9 @@
               <a:lstStyle/>
               <a:p>
                 <a:r>
-                  <a:rPr lang="fr-FR" dirty="0" smtClean="0"/>
+                  <a:rPr lang="fr-FR" dirty="0"/>
                   <a:t>No </a:t>
                 </a:r>
-                <a:endParaRPr lang="fr-FR" dirty="0"/>
               </a:p>
             </p:txBody>
           </p:sp>
@@ -8135,10 +8158,9 @@
             <a:lstStyle/>
             <a:p>
               <a:r>
-                <a:rPr lang="fr-FR" dirty="0" smtClean="0"/>
+                <a:rPr lang="fr-FR" dirty="0"/>
                 <a:t>25</a:t>
               </a:r>
-              <a:endParaRPr lang="fr-FR" dirty="0"/>
             </a:p>
           </p:txBody>
         </p:sp>
@@ -8542,10 +8564,9 @@
             <a:lstStyle/>
             <a:p>
               <a:r>
-                <a:rPr lang="fr-FR" dirty="0" smtClean="0"/>
+                <a:rPr lang="fr-FR" dirty="0"/>
                 <a:t>125</a:t>
               </a:r>
-              <a:endParaRPr lang="fr-FR" dirty="0"/>
             </a:p>
           </p:txBody>
         </p:sp>
@@ -8806,31 +8827,30 @@
             <a:lstStyle/>
             <a:p>
               <a:r>
-                <a:rPr lang="fr-FR" b="1" dirty="0" smtClean="0"/>
+                <a:rPr lang="fr-FR" b="1" dirty="0"/>
                 <a:t>Best situation</a:t>
               </a:r>
             </a:p>
             <a:p>
-              <a:endParaRPr lang="fr-FR" dirty="0" smtClean="0"/>
+              <a:endParaRPr lang="fr-FR" dirty="0"/>
             </a:p>
             <a:p>
               <a:r>
-                <a:rPr lang="fr-FR" dirty="0" smtClean="0"/>
+                <a:rPr lang="fr-FR" dirty="0"/>
                 <a:t>50</a:t>
               </a:r>
             </a:p>
             <a:p>
               <a:r>
-                <a:rPr lang="fr-FR" dirty="0" smtClean="0"/>
+                <a:rPr lang="fr-FR" dirty="0"/>
                 <a:t>hIp1 = 0.7</a:t>
               </a:r>
             </a:p>
             <a:p>
               <a:r>
-                <a:rPr lang="fr-FR" dirty="0" smtClean="0"/>
+                <a:rPr lang="fr-FR" dirty="0"/>
                 <a:t>hRs1 = 0.4 </a:t>
               </a:r>
-              <a:endParaRPr lang="fr-FR" dirty="0"/>
             </a:p>
           </p:txBody>
         </p:sp>
@@ -9319,13 +9339,8 @@
             </a:r>
             <a:r>
               <a:rPr lang="fr-FR" dirty="0"/>
-              <a:t> </a:t>
-            </a:r>
-            <a:r>
-              <a:rPr lang="fr-FR" dirty="0" smtClean="0"/>
-              <a:t>2</a:t>
-            </a:r>
-            <a:endParaRPr lang="fr-FR" dirty="0"/>
+              <a:t> 2</a:t>
+            </a:r>
           </a:p>
         </p:txBody>
       </p:sp>
@@ -9487,23 +9502,23 @@
           </a:lstStyle>
           <a:p>
             <a:r>
-              <a:rPr lang="fr-FR" dirty="0" err="1" smtClean="0"/>
+              <a:rPr lang="fr-FR" dirty="0" err="1"/>
               <a:t>Genetic</a:t>
             </a:r>
             <a:r>
-              <a:rPr lang="fr-FR" dirty="0" smtClean="0"/>
+              <a:rPr lang="fr-FR" dirty="0"/>
               <a:t> </a:t>
             </a:r>
             <a:r>
-              <a:rPr lang="fr-FR" dirty="0" err="1" smtClean="0"/>
+              <a:rPr lang="fr-FR" dirty="0" err="1"/>
               <a:t>algorithm</a:t>
             </a:r>
-            <a:endParaRPr lang="fr-FR" dirty="0" smtClean="0"/>
+            <a:endParaRPr lang="fr-FR" dirty="0"/>
           </a:p>
           <a:p>
             <a:pPr lvl="1"/>
             <a:r>
-              <a:rPr lang="en-US" dirty="0" err="1" smtClean="0">
+              <a:rPr lang="en-US" dirty="0" err="1">
                 <a:solidFill>
                   <a:srgbClr val="FF0000"/>
                 </a:solidFill>
@@ -9511,7 +9526,7 @@
               <a:t>nbSlow</a:t>
             </a:r>
             <a:r>
-              <a:rPr lang="en-US" dirty="0" smtClean="0">
+              <a:rPr lang="en-US" dirty="0">
                 <a:solidFill>
                   <a:srgbClr val="FF0000"/>
                 </a:solidFill>
@@ -9519,14 +9534,14 @@
               <a:t> </a:t>
             </a:r>
             <a:r>
-              <a:rPr lang="en-US" dirty="0" smtClean="0"/>
+              <a:rPr lang="en-US" dirty="0"/>
               <a:t>in (0 to 125) 	</a:t>
             </a:r>
           </a:p>
           <a:p>
             <a:pPr lvl="1"/>
             <a:r>
-              <a:rPr lang="en-US" dirty="0" smtClean="0">
+              <a:rPr lang="en-US" dirty="0">
                 <a:solidFill>
                   <a:srgbClr val="FF0000"/>
                 </a:solidFill>
@@ -9534,14 +9549,14 @@
               <a:t>hRs1</a:t>
             </a:r>
             <a:r>
-              <a:rPr lang="en-US" dirty="0" smtClean="0"/>
+              <a:rPr lang="en-US" dirty="0"/>
               <a:t> in (0.1 to 0.4)		</a:t>
             </a:r>
           </a:p>
           <a:p>
             <a:pPr lvl="1"/>
             <a:r>
-              <a:rPr lang="en-US" dirty="0" smtClean="0">
+              <a:rPr lang="en-US" dirty="0">
                 <a:solidFill>
                   <a:srgbClr val="FF0000"/>
                 </a:solidFill>
@@ -9549,13 +9564,13 @@
               <a:t>hIp1</a:t>
             </a:r>
             <a:r>
-              <a:rPr lang="en-US" dirty="0" smtClean="0"/>
+              <a:rPr lang="en-US" dirty="0"/>
               <a:t> in (0.1 to 1.0)</a:t>
             </a:r>
           </a:p>
           <a:p>
             <a:r>
-              <a:rPr lang="en-US" dirty="0" smtClean="0"/>
+              <a:rPr lang="en-US" dirty="0"/>
               <a:t>(not on local!)</a:t>
             </a:r>
           </a:p>
@@ -9574,13 +9589,6 @@
   <p:clrMapOvr>
     <a:masterClrMapping/>
   </p:clrMapOvr>
-  <p:timing>
-    <p:tnLst>
-      <p:par>
-        <p:cTn id="1" dur="indefinite" restart="never" nodeType="tmRoot"/>
-      </p:par>
-    </p:tnLst>
-  </p:timing>
 </p:sld>
 </file>
 
@@ -9671,14 +9679,13 @@
           <a:lstStyle/>
           <a:p>
             <a:r>
-              <a:rPr lang="fr-FR" dirty="0" err="1" smtClean="0"/>
+              <a:rPr lang="fr-FR" dirty="0" err="1"/>
               <a:t>Results</a:t>
             </a:r>
             <a:r>
-              <a:rPr lang="fr-FR" dirty="0" smtClean="0"/>
+              <a:rPr lang="fr-FR" dirty="0"/>
               <a:t> 2</a:t>
             </a:r>
-            <a:endParaRPr lang="fr-FR" dirty="0"/>
           </a:p>
         </p:txBody>
       </p:sp>
@@ -9704,7 +9711,7 @@
           <a:lstStyle/>
           <a:p>
             <a:r>
-              <a:rPr lang="fr-FR" dirty="0" err="1" smtClean="0">
+              <a:rPr lang="fr-FR" dirty="0" err="1">
                 <a:solidFill>
                   <a:srgbClr val="FF0000"/>
                 </a:solidFill>
@@ -9712,7 +9719,7 @@
               <a:t>nbSlow</a:t>
             </a:r>
             <a:r>
-              <a:rPr lang="fr-FR" dirty="0" smtClean="0">
+              <a:rPr lang="fr-FR" dirty="0">
                 <a:solidFill>
                   <a:srgbClr val="FF0000"/>
                 </a:solidFill>
@@ -9720,7 +9727,7 @@
               <a:t>	hRs1	hIp1	</a:t>
             </a:r>
             <a:r>
-              <a:rPr lang="fr-FR" dirty="0" err="1" smtClean="0">
+              <a:rPr lang="fr-FR" dirty="0" err="1">
                 <a:solidFill>
                   <a:srgbClr val="FF0000"/>
                 </a:solidFill>
@@ -9728,7 +9735,7 @@
               <a:t>rescuedDynamicFast</a:t>
             </a:r>
             <a:r>
-              <a:rPr lang="fr-FR" dirty="0" smtClean="0">
+              <a:rPr lang="fr-FR" dirty="0">
                 <a:solidFill>
                   <a:srgbClr val="FF0000"/>
                 </a:solidFill>
@@ -9736,7 +9743,7 @@
               <a:t>	</a:t>
             </a:r>
             <a:r>
-              <a:rPr lang="fr-FR" dirty="0" err="1" smtClean="0">
+              <a:rPr lang="fr-FR" dirty="0" err="1">
                 <a:solidFill>
                   <a:srgbClr val="FF0000"/>
                 </a:solidFill>
@@ -9751,12 +9758,102 @@
           </a:p>
           <a:p>
             <a:r>
-              <a:rPr lang="fr-FR" dirty="0" smtClean="0">
+              <a:rPr lang="fr-FR" dirty="0">
                 <a:solidFill>
                   <a:srgbClr val="FF0000"/>
                 </a:solidFill>
               </a:rPr>
               <a:t>72	0.379	0.559	44.0			0.0</a:t>
+            </a:r>
+          </a:p>
+          <a:p>
+            <a:r>
+              <a:rPr lang="fr-FR" dirty="0">
+                <a:solidFill>
+                  <a:srgbClr val="FF0000"/>
+                </a:solidFill>
+              </a:rPr>
+              <a:t>83	0.219	0.525	35.5			12.0</a:t>
+            </a:r>
+          </a:p>
+          <a:p>
+            <a:r>
+              <a:rPr lang="fr-FR" dirty="0">
+                <a:solidFill>
+                  <a:srgbClr val="FF0000"/>
+                </a:solidFill>
+              </a:rPr>
+              <a:t>121	0.274	0.843	35.0			25.5</a:t>
+            </a:r>
+          </a:p>
+        </p:txBody>
+      </p:sp>
+      <p:sp>
+        <p:nvSpPr>
+          <p:cNvPr id="5" name="Rectangle 4">
+            <a:extLst>
+              <a:ext uri="{FF2B5EF4-FFF2-40B4-BE49-F238E27FC236}">
+                <a16:creationId xmlns:a16="http://schemas.microsoft.com/office/drawing/2014/main" id="{BB091391-3144-49BA-9700-85EA9198B3C6}"/>
+              </a:ext>
+            </a:extLst>
+          </p:cNvPr>
+          <p:cNvSpPr/>
+          <p:nvPr/>
+        </p:nvSpPr>
+        <p:spPr>
+          <a:xfrm>
+            <a:off x="6457512" y="4581128"/>
+            <a:ext cx="8982744" cy="1200329"/>
+          </a:xfrm>
+          <a:prstGeom prst="rect">
+            <a:avLst/>
+          </a:prstGeom>
+        </p:spPr>
+        <p:txBody>
+          <a:bodyPr wrap="square">
+            <a:spAutoFit/>
+          </a:bodyPr>
+          <a:lstStyle/>
+          <a:p>
+            <a:r>
+              <a:rPr lang="fr-FR" dirty="0" err="1">
+                <a:solidFill>
+                  <a:srgbClr val="FF0000"/>
+                </a:solidFill>
+              </a:rPr>
+              <a:t>nbSlow</a:t>
+            </a:r>
+            <a:r>
+              <a:rPr lang="fr-FR" dirty="0">
+                <a:solidFill>
+                  <a:srgbClr val="FF0000"/>
+                </a:solidFill>
+              </a:rPr>
+              <a:t>	hRs1	hIp1	</a:t>
+            </a:r>
+            <a:r>
+              <a:rPr lang="fr-FR" dirty="0" err="1">
+                <a:solidFill>
+                  <a:srgbClr val="FF0000"/>
+                </a:solidFill>
+              </a:rPr>
+              <a:t>rescuedDynamicFast</a:t>
+            </a:r>
+            <a:r>
+              <a:rPr lang="fr-FR" dirty="0">
+                <a:solidFill>
+                  <a:srgbClr val="FF0000"/>
+                </a:solidFill>
+              </a:rPr>
+              <a:t>	</a:t>
+            </a:r>
+            <a:r>
+              <a:rPr lang="fr-FR" dirty="0" err="1">
+                <a:solidFill>
+                  <a:srgbClr val="FF0000"/>
+                </a:solidFill>
+              </a:rPr>
+              <a:t>rescuedDynamicSlow</a:t>
             </a:r>
             <a:endParaRPr lang="fr-FR" dirty="0">
               <a:solidFill>
@@ -9766,33 +9863,105 @@
           </a:p>
           <a:p>
             <a:r>
-              <a:rPr lang="fr-FR" dirty="0" smtClean="0">
+              <a:rPr lang="fr-FR" dirty="0">
                 <a:solidFill>
                   <a:srgbClr val="FF0000"/>
                 </a:solidFill>
               </a:rPr>
-              <a:t>83	0.219	0.525	35.5			12.0</a:t>
-            </a:r>
-            <a:endParaRPr lang="fr-FR" dirty="0">
-              <a:solidFill>
-                <a:srgbClr val="FF0000"/>
-              </a:solidFill>
-            </a:endParaRPr>
-          </a:p>
-          <a:p>
-            <a:r>
-              <a:rPr lang="fr-FR" dirty="0" smtClean="0">
+              <a:t>118	0.292	0.840	26.5			0.0</a:t>
+            </a:r>
+          </a:p>
+          <a:p>
+            <a:r>
+              <a:rPr lang="fr-FR" dirty="0">
                 <a:solidFill>
                   <a:srgbClr val="FF0000"/>
                 </a:solidFill>
               </a:rPr>
-              <a:t>121	0.274	0.843	35.0			25.5</a:t>
-            </a:r>
-            <a:endParaRPr lang="fr-FR" dirty="0">
-              <a:solidFill>
-                <a:srgbClr val="FF0000"/>
-              </a:solidFill>
-            </a:endParaRPr>
+              <a:t>40	0.396	0.773	56.5			12.0</a:t>
+            </a:r>
+          </a:p>
+          <a:p>
+            <a:r>
+              <a:rPr lang="fr-FR" dirty="0">
+                <a:solidFill>
+                  <a:srgbClr val="FF0000"/>
+                </a:solidFill>
+              </a:rPr>
+              <a:t>121	0.274	0.843	37.5			25.5</a:t>
+            </a:r>
+          </a:p>
+        </p:txBody>
+      </p:sp>
+      <p:sp>
+        <p:nvSpPr>
+          <p:cNvPr id="4" name="TextBox 3">
+            <a:extLst>
+              <a:ext uri="{FF2B5EF4-FFF2-40B4-BE49-F238E27FC236}">
+                <a16:creationId xmlns:a16="http://schemas.microsoft.com/office/drawing/2014/main" id="{9D34BFC8-319A-418D-9357-2F266D4C9E41}"/>
+              </a:ext>
+            </a:extLst>
+          </p:cNvPr>
+          <p:cNvSpPr txBox="1"/>
+          <p:nvPr/>
+        </p:nvSpPr>
+        <p:spPr>
+          <a:xfrm>
+            <a:off x="6456429" y="1076543"/>
+            <a:ext cx="1720023" cy="369332"/>
+          </a:xfrm>
+          <a:prstGeom prst="rect">
+            <a:avLst/>
+          </a:prstGeom>
+          <a:noFill/>
+        </p:spPr>
+        <p:txBody>
+          <a:bodyPr wrap="none" rtlCol="0">
+            <a:spAutoFit/>
+          </a:bodyPr>
+          <a:lstStyle/>
+          <a:p>
+            <a:r>
+              <a:rPr lang="en-GB" dirty="0"/>
+              <a:t>Population 2155</a:t>
+            </a:r>
+            <a:endParaRPr lang="en-DE" dirty="0"/>
+          </a:p>
+        </p:txBody>
+      </p:sp>
+      <p:sp>
+        <p:nvSpPr>
+          <p:cNvPr id="7" name="TextBox 6">
+            <a:extLst>
+              <a:ext uri="{FF2B5EF4-FFF2-40B4-BE49-F238E27FC236}">
+                <a16:creationId xmlns:a16="http://schemas.microsoft.com/office/drawing/2014/main" id="{042C01A5-46B8-4B9F-9B03-B8A5417E4E26}"/>
+              </a:ext>
+            </a:extLst>
+          </p:cNvPr>
+          <p:cNvSpPr txBox="1"/>
+          <p:nvPr/>
+        </p:nvSpPr>
+        <p:spPr>
+          <a:xfrm>
+            <a:off x="6456429" y="4212979"/>
+            <a:ext cx="1837041" cy="369332"/>
+          </a:xfrm>
+          <a:prstGeom prst="rect">
+            <a:avLst/>
+          </a:prstGeom>
+          <a:noFill/>
+        </p:spPr>
+        <p:txBody>
+          <a:bodyPr wrap="none" rtlCol="0">
+            <a:spAutoFit/>
+          </a:bodyPr>
+          <a:lstStyle/>
+          <a:p>
+            <a:r>
+              <a:rPr lang="en-GB" dirty="0"/>
+              <a:t>Population 10000</a:t>
+            </a:r>
+            <a:endParaRPr lang="en-DE" dirty="0"/>
           </a:p>
         </p:txBody>
       </p:sp>
@@ -9806,13 +9975,6 @@
   <p:clrMapOvr>
     <a:masterClrMapping/>
   </p:clrMapOvr>
-  <p:timing>
-    <p:tnLst>
-      <p:par>
-        <p:cTn id="1" dur="indefinite" restart="never" nodeType="tmRoot"/>
-      </p:par>
-    </p:tnLst>
-  </p:timing>
 </p:sld>
 </file>
 
@@ -9992,10 +10154,9 @@
           <a:lstStyle/>
           <a:p>
             <a:r>
-              <a:rPr lang="fr-FR" dirty="0" smtClean="0"/>
+              <a:rPr lang="fr-FR" dirty="0"/>
               <a:t>Conclusion</a:t>
             </a:r>
-            <a:endParaRPr lang="fr-FR" dirty="0"/>
           </a:p>
         </p:txBody>
       </p:sp>
@@ -10017,54 +10178,54 @@
           <a:lstStyle/>
           <a:p>
             <a:r>
-              <a:rPr lang="en-US" dirty="0" smtClean="0"/>
+              <a:rPr lang="en-US" dirty="0"/>
               <a:t>Importance of information </a:t>
             </a:r>
             <a:br>
-              <a:rPr lang="en-US" dirty="0" smtClean="0"/>
+              <a:rPr lang="en-US" dirty="0"/>
             </a:br>
             <a:r>
-              <a:rPr lang="en-US" dirty="0" smtClean="0"/>
+              <a:rPr lang="en-US" dirty="0"/>
               <a:t>(No information = All </a:t>
             </a:r>
             <a:r>
-              <a:rPr lang="en-US" dirty="0" err="1" smtClean="0"/>
+              <a:rPr lang="en-US" dirty="0" err="1"/>
               <a:t>zombified</a:t>
             </a:r>
             <a:r>
-              <a:rPr lang="en-US" dirty="0" smtClean="0"/>
+              <a:rPr lang="en-US" dirty="0"/>
               <a:t>)</a:t>
             </a:r>
           </a:p>
           <a:p>
             <a:r>
-              <a:rPr lang="en-US" dirty="0" smtClean="0"/>
+              <a:rPr lang="en-US" dirty="0"/>
               <a:t>Benefits and costs in cooperation do not impact the same people here </a:t>
             </a:r>
             <a:br>
-              <a:rPr lang="en-US" dirty="0" smtClean="0"/>
+              <a:rPr lang="en-US" dirty="0"/>
             </a:br>
             <a:r>
-              <a:rPr lang="en-US" dirty="0" smtClean="0"/>
+              <a:rPr lang="en-US" dirty="0"/>
               <a:t>(the slow incur the costs vs. the fast benefits)</a:t>
             </a:r>
           </a:p>
           <a:p>
             <a:r>
-              <a:rPr lang="en-US" dirty="0" smtClean="0"/>
+              <a:rPr lang="en-US" dirty="0"/>
               <a:t>Convergence is noisy because of stochasticity in the model</a:t>
             </a:r>
           </a:p>
           <a:p>
             <a:r>
-              <a:rPr lang="en-US" dirty="0" smtClean="0"/>
+              <a:rPr lang="en-US" dirty="0"/>
               <a:t>Does anyone volunteer to become</a:t>
             </a:r>
             <a:br>
-              <a:rPr lang="en-US" dirty="0" smtClean="0"/>
+              <a:rPr lang="en-US" dirty="0"/>
             </a:br>
             <a:r>
-              <a:rPr lang="en-US" dirty="0" smtClean="0"/>
+              <a:rPr lang="en-US" dirty="0"/>
               <a:t>slow food and save the world?</a:t>
             </a:r>
           </a:p>

</xml_diff>